<commit_message>
zmagania z ostatnią tabelą vol.2 - rozwiązanie poprzez połączenie 2 tabeli
</commit_message>
<xml_diff>
--- a/Analiza obciążenia przedsiębiorstwa produkcyjnego.pptx
+++ b/Analiza obciążenia przedsiębiorstwa produkcyjnego.pptx
@@ -229,7 +229,7 @@
           <a:p>
             <a:fld id="{CE97F08F-2219-43E3-81C5-1455C16A763E}" type="datetimeFigureOut">
               <a:rPr lang="pl-PL" smtClean="0"/>
-              <a:t>10.05.2021</a:t>
+              <a:t>25.05.2021</a:t>
             </a:fld>
             <a:endParaRPr lang="pl-PL"/>
           </a:p>
@@ -553,7 +553,7 @@
           <a:noFill/>
           <a:extLst>
             <a:ext uri="{909E8E84-426E-40dd-AFC4-6F175D3DCCD1}">
-              <a14:hiddenFill xmlns:a14="http://schemas.microsoft.com/office/drawing/2010/main" xmlns="">
+              <a14:hiddenFill xmlns="" xmlns:a14="http://schemas.microsoft.com/office/drawing/2010/main">
                 <a:solidFill>
                   <a:srgbClr val="FFFFFF"/>
                 </a:solidFill>
@@ -613,7 +613,7 @@
             </a:ln>
             <a:extLst>
               <a:ext uri="{91240B29-F687-4f45-9708-019B960494DF}">
-                <a14:hiddenLine xmlns:a14="http://schemas.microsoft.com/office/drawing/2010/main" xmlns="" w="9525">
+                <a14:hiddenLine xmlns="" xmlns:a14="http://schemas.microsoft.com/office/drawing/2010/main" w="9525">
                   <a:solidFill>
                     <a:srgbClr val="000000"/>
                   </a:solidFill>
@@ -703,7 +703,7 @@
             </a:ln>
             <a:extLst>
               <a:ext uri="{91240B29-F687-4f45-9708-019B960494DF}">
-                <a14:hiddenLine xmlns:a14="http://schemas.microsoft.com/office/drawing/2010/main" xmlns="" w="9525">
+                <a14:hiddenLine xmlns="" xmlns:a14="http://schemas.microsoft.com/office/drawing/2010/main" w="9525">
                   <a:solidFill>
                     <a:srgbClr val="000000"/>
                   </a:solidFill>
@@ -793,7 +793,7 @@
             </a:ln>
             <a:extLst>
               <a:ext uri="{91240B29-F687-4f45-9708-019B960494DF}">
-                <a14:hiddenLine xmlns:a14="http://schemas.microsoft.com/office/drawing/2010/main" xmlns="" w="9525">
+                <a14:hiddenLine xmlns="" xmlns:a14="http://schemas.microsoft.com/office/drawing/2010/main" w="9525">
                   <a:solidFill>
                     <a:srgbClr val="000000"/>
                   </a:solidFill>
@@ -827,7 +827,7 @@
             </a:ln>
             <a:extLst>
               <a:ext uri="{91240B29-F687-4f45-9708-019B960494DF}">
-                <a14:hiddenLine xmlns:a14="http://schemas.microsoft.com/office/drawing/2010/main" xmlns="" w="9525">
+                <a14:hiddenLine xmlns="" xmlns:a14="http://schemas.microsoft.com/office/drawing/2010/main" w="9525">
                   <a:solidFill>
                     <a:srgbClr val="000000"/>
                   </a:solidFill>
@@ -917,7 +917,7 @@
             </a:ln>
             <a:extLst>
               <a:ext uri="{91240B29-F687-4f45-9708-019B960494DF}">
-                <a14:hiddenLine xmlns:a14="http://schemas.microsoft.com/office/drawing/2010/main" xmlns="" w="9525">
+                <a14:hiddenLine xmlns="" xmlns:a14="http://schemas.microsoft.com/office/drawing/2010/main" w="9525">
                   <a:solidFill>
                     <a:srgbClr val="000000"/>
                   </a:solidFill>
@@ -979,7 +979,7 @@
             </a:ln>
             <a:extLst>
               <a:ext uri="{91240B29-F687-4f45-9708-019B960494DF}">
-                <a14:hiddenLine xmlns:a14="http://schemas.microsoft.com/office/drawing/2010/main" xmlns="" w="9525">
+                <a14:hiddenLine xmlns="" xmlns:a14="http://schemas.microsoft.com/office/drawing/2010/main" w="9525">
                   <a:solidFill>
                     <a:srgbClr val="000000"/>
                   </a:solidFill>
@@ -1041,7 +1041,7 @@
             </a:ln>
             <a:extLst>
               <a:ext uri="{91240B29-F687-4f45-9708-019B960494DF}">
-                <a14:hiddenLine xmlns:a14="http://schemas.microsoft.com/office/drawing/2010/main" xmlns="" w="9525">
+                <a14:hiddenLine xmlns="" xmlns:a14="http://schemas.microsoft.com/office/drawing/2010/main" w="9525">
                   <a:solidFill>
                     <a:srgbClr val="000000"/>
                   </a:solidFill>
@@ -1131,7 +1131,7 @@
             </a:ln>
             <a:extLst>
               <a:ext uri="{91240B29-F687-4f45-9708-019B960494DF}">
-                <a14:hiddenLine xmlns:a14="http://schemas.microsoft.com/office/drawing/2010/main" xmlns="" w="9525">
+                <a14:hiddenLine xmlns="" xmlns:a14="http://schemas.microsoft.com/office/drawing/2010/main" w="9525">
                   <a:solidFill>
                     <a:srgbClr val="000000"/>
                   </a:solidFill>
@@ -1193,7 +1193,7 @@
             </a:ln>
             <a:extLst>
               <a:ext uri="{91240B29-F687-4f45-9708-019B960494DF}">
-                <a14:hiddenLine xmlns:a14="http://schemas.microsoft.com/office/drawing/2010/main" xmlns="" w="9525">
+                <a14:hiddenLine xmlns="" xmlns:a14="http://schemas.microsoft.com/office/drawing/2010/main" w="9525">
                   <a:solidFill>
                     <a:srgbClr val="000000"/>
                   </a:solidFill>
@@ -1255,7 +1255,7 @@
             </a:ln>
             <a:extLst>
               <a:ext uri="{91240B29-F687-4f45-9708-019B960494DF}">
-                <a14:hiddenLine xmlns:a14="http://schemas.microsoft.com/office/drawing/2010/main" xmlns="" w="9525">
+                <a14:hiddenLine xmlns="" xmlns:a14="http://schemas.microsoft.com/office/drawing/2010/main" w="9525">
                   <a:solidFill>
                     <a:srgbClr val="000000"/>
                   </a:solidFill>
@@ -1345,7 +1345,7 @@
             </a:ln>
             <a:extLst>
               <a:ext uri="{91240B29-F687-4f45-9708-019B960494DF}">
-                <a14:hiddenLine xmlns:a14="http://schemas.microsoft.com/office/drawing/2010/main" xmlns="" w="9525">
+                <a14:hiddenLine xmlns="" xmlns:a14="http://schemas.microsoft.com/office/drawing/2010/main" w="9525">
                   <a:solidFill>
                     <a:srgbClr val="000000"/>
                   </a:solidFill>
@@ -1435,7 +1435,7 @@
             </a:ln>
             <a:extLst>
               <a:ext uri="{91240B29-F687-4f45-9708-019B960494DF}">
-                <a14:hiddenLine xmlns:a14="http://schemas.microsoft.com/office/drawing/2010/main" xmlns="" w="9525">
+                <a14:hiddenLine xmlns="" xmlns:a14="http://schemas.microsoft.com/office/drawing/2010/main" w="9525">
                   <a:solidFill>
                     <a:srgbClr val="000000"/>
                   </a:solidFill>
@@ -1497,7 +1497,7 @@
             </a:ln>
             <a:extLst>
               <a:ext uri="{91240B29-F687-4f45-9708-019B960494DF}">
-                <a14:hiddenLine xmlns:a14="http://schemas.microsoft.com/office/drawing/2010/main" xmlns="" w="9525">
+                <a14:hiddenLine xmlns="" xmlns:a14="http://schemas.microsoft.com/office/drawing/2010/main" w="9525">
                   <a:solidFill>
                     <a:srgbClr val="000000"/>
                   </a:solidFill>
@@ -1607,7 +1607,7 @@
             </a:ln>
             <a:extLst>
               <a:ext uri="{91240B29-F687-4f45-9708-019B960494DF}">
-                <a14:hiddenLine xmlns:a14="http://schemas.microsoft.com/office/drawing/2010/main" xmlns="" w="9525">
+                <a14:hiddenLine xmlns="" xmlns:a14="http://schemas.microsoft.com/office/drawing/2010/main" w="9525">
                   <a:solidFill>
                     <a:srgbClr val="000000"/>
                   </a:solidFill>
@@ -1669,7 +1669,7 @@
             </a:ln>
             <a:extLst>
               <a:ext uri="{91240B29-F687-4f45-9708-019B960494DF}">
-                <a14:hiddenLine xmlns:a14="http://schemas.microsoft.com/office/drawing/2010/main" xmlns="" w="9525">
+                <a14:hiddenLine xmlns="" xmlns:a14="http://schemas.microsoft.com/office/drawing/2010/main" w="9525">
                   <a:solidFill>
                     <a:srgbClr val="000000"/>
                   </a:solidFill>
@@ -1759,7 +1759,7 @@
             </a:ln>
             <a:extLst>
               <a:ext uri="{91240B29-F687-4f45-9708-019B960494DF}">
-                <a14:hiddenLine xmlns:a14="http://schemas.microsoft.com/office/drawing/2010/main" xmlns="" w="9525">
+                <a14:hiddenLine xmlns="" xmlns:a14="http://schemas.microsoft.com/office/drawing/2010/main" w="9525">
                   <a:solidFill>
                     <a:srgbClr val="000000"/>
                   </a:solidFill>
@@ -1849,7 +1849,7 @@
             </a:ln>
             <a:extLst>
               <a:ext uri="{91240B29-F687-4f45-9708-019B960494DF}">
-                <a14:hiddenLine xmlns:a14="http://schemas.microsoft.com/office/drawing/2010/main" xmlns="" w="9525">
+                <a14:hiddenLine xmlns="" xmlns:a14="http://schemas.microsoft.com/office/drawing/2010/main" w="9525">
                   <a:solidFill>
                     <a:srgbClr val="000000"/>
                   </a:solidFill>
@@ -1911,7 +1911,7 @@
             </a:ln>
             <a:extLst>
               <a:ext uri="{91240B29-F687-4f45-9708-019B960494DF}">
-                <a14:hiddenLine xmlns:a14="http://schemas.microsoft.com/office/drawing/2010/main" xmlns="" w="9525">
+                <a14:hiddenLine xmlns="" xmlns:a14="http://schemas.microsoft.com/office/drawing/2010/main" w="9525">
                   <a:solidFill>
                     <a:srgbClr val="000000"/>
                   </a:solidFill>
@@ -2001,7 +2001,7 @@
             </a:ln>
             <a:extLst>
               <a:ext uri="{91240B29-F687-4f45-9708-019B960494DF}">
-                <a14:hiddenLine xmlns:a14="http://schemas.microsoft.com/office/drawing/2010/main" xmlns="" w="9525">
+                <a14:hiddenLine xmlns="" xmlns:a14="http://schemas.microsoft.com/office/drawing/2010/main" w="9525">
                   <a:solidFill>
                     <a:srgbClr val="000000"/>
                   </a:solidFill>
@@ -2091,7 +2091,7 @@
             </a:ln>
             <a:extLst>
               <a:ext uri="{91240B29-F687-4f45-9708-019B960494DF}">
-                <a14:hiddenLine xmlns:a14="http://schemas.microsoft.com/office/drawing/2010/main" xmlns="" w="9525">
+                <a14:hiddenLine xmlns="" xmlns:a14="http://schemas.microsoft.com/office/drawing/2010/main" w="9525">
                   <a:solidFill>
                     <a:srgbClr val="000000"/>
                   </a:solidFill>
@@ -2147,7 +2147,7 @@
             </a:ln>
             <a:extLst>
               <a:ext uri="{91240B29-F687-4f45-9708-019B960494DF}">
-                <a14:hiddenLine xmlns:a14="http://schemas.microsoft.com/office/drawing/2010/main" xmlns="" w="9525">
+                <a14:hiddenLine xmlns="" xmlns:a14="http://schemas.microsoft.com/office/drawing/2010/main" w="9525">
                   <a:solidFill>
                     <a:srgbClr val="000000"/>
                   </a:solidFill>
@@ -2237,7 +2237,7 @@
             </a:ln>
             <a:extLst>
               <a:ext uri="{91240B29-F687-4f45-9708-019B960494DF}">
-                <a14:hiddenLine xmlns:a14="http://schemas.microsoft.com/office/drawing/2010/main" xmlns="" w="9525">
+                <a14:hiddenLine xmlns="" xmlns:a14="http://schemas.microsoft.com/office/drawing/2010/main" w="9525">
                   <a:solidFill>
                     <a:srgbClr val="000000"/>
                   </a:solidFill>
@@ -2293,7 +2293,7 @@
             </a:ln>
             <a:extLst>
               <a:ext uri="{91240B29-F687-4f45-9708-019B960494DF}">
-                <a14:hiddenLine xmlns:a14="http://schemas.microsoft.com/office/drawing/2010/main" xmlns="" w="9525">
+                <a14:hiddenLine xmlns="" xmlns:a14="http://schemas.microsoft.com/office/drawing/2010/main" w="9525">
                   <a:solidFill>
                     <a:srgbClr val="000000"/>
                   </a:solidFill>
@@ -2383,7 +2383,7 @@
             </a:ln>
             <a:extLst>
               <a:ext uri="{91240B29-F687-4f45-9708-019B960494DF}">
-                <a14:hiddenLine xmlns:a14="http://schemas.microsoft.com/office/drawing/2010/main" xmlns="" w="9525">
+                <a14:hiddenLine xmlns="" xmlns:a14="http://schemas.microsoft.com/office/drawing/2010/main" w="9525">
                   <a:solidFill>
                     <a:srgbClr val="000000"/>
                   </a:solidFill>
@@ -2451,7 +2451,7 @@
             </a:ln>
             <a:extLst>
               <a:ext uri="{91240B29-F687-4f45-9708-019B960494DF}">
-                <a14:hiddenLine xmlns:a14="http://schemas.microsoft.com/office/drawing/2010/main" xmlns="" w="9525">
+                <a14:hiddenLine xmlns="" xmlns:a14="http://schemas.microsoft.com/office/drawing/2010/main" w="9525">
                   <a:solidFill>
                     <a:srgbClr val="000000"/>
                   </a:solidFill>
@@ -2541,7 +2541,7 @@
             </a:ln>
             <a:extLst>
               <a:ext uri="{91240B29-F687-4f45-9708-019B960494DF}">
-                <a14:hiddenLine xmlns:a14="http://schemas.microsoft.com/office/drawing/2010/main" xmlns="" w="9525">
+                <a14:hiddenLine xmlns="" xmlns:a14="http://schemas.microsoft.com/office/drawing/2010/main" w="9525">
                   <a:solidFill>
                     <a:srgbClr val="000000"/>
                   </a:solidFill>
@@ -2609,7 +2609,7 @@
             </a:ln>
             <a:extLst>
               <a:ext uri="{91240B29-F687-4f45-9708-019B960494DF}">
-                <a14:hiddenLine xmlns:a14="http://schemas.microsoft.com/office/drawing/2010/main" xmlns="" w="9525">
+                <a14:hiddenLine xmlns="" xmlns:a14="http://schemas.microsoft.com/office/drawing/2010/main" w="9525">
                   <a:solidFill>
                     <a:srgbClr val="000000"/>
                   </a:solidFill>
@@ -2699,7 +2699,7 @@
             </a:ln>
             <a:extLst>
               <a:ext uri="{91240B29-F687-4f45-9708-019B960494DF}">
-                <a14:hiddenLine xmlns:a14="http://schemas.microsoft.com/office/drawing/2010/main" xmlns="" w="9525">
+                <a14:hiddenLine xmlns="" xmlns:a14="http://schemas.microsoft.com/office/drawing/2010/main" w="9525">
                   <a:solidFill>
                     <a:srgbClr val="000000"/>
                   </a:solidFill>
@@ -2733,7 +2733,7 @@
             </a:ln>
             <a:extLst>
               <a:ext uri="{91240B29-F687-4f45-9708-019B960494DF}">
-                <a14:hiddenLine xmlns:a14="http://schemas.microsoft.com/office/drawing/2010/main" xmlns="" w="9525">
+                <a14:hiddenLine xmlns="" xmlns:a14="http://schemas.microsoft.com/office/drawing/2010/main" w="9525">
                   <a:solidFill>
                     <a:srgbClr val="000000"/>
                   </a:solidFill>
@@ -2823,7 +2823,7 @@
             </a:ln>
             <a:extLst>
               <a:ext uri="{91240B29-F687-4f45-9708-019B960494DF}">
-                <a14:hiddenLine xmlns:a14="http://schemas.microsoft.com/office/drawing/2010/main" xmlns="" w="9525">
+                <a14:hiddenLine xmlns="" xmlns:a14="http://schemas.microsoft.com/office/drawing/2010/main" w="9525">
                   <a:solidFill>
                     <a:srgbClr val="000000"/>
                   </a:solidFill>
@@ -2885,7 +2885,7 @@
             </a:ln>
             <a:extLst>
               <a:ext uri="{91240B29-F687-4f45-9708-019B960494DF}">
-                <a14:hiddenLine xmlns:a14="http://schemas.microsoft.com/office/drawing/2010/main" xmlns="" w="9525">
+                <a14:hiddenLine xmlns="" xmlns:a14="http://schemas.microsoft.com/office/drawing/2010/main" w="9525">
                   <a:solidFill>
                     <a:srgbClr val="000000"/>
                   </a:solidFill>
@@ -2947,7 +2947,7 @@
             </a:ln>
             <a:extLst>
               <a:ext uri="{91240B29-F687-4f45-9708-019B960494DF}">
-                <a14:hiddenLine xmlns:a14="http://schemas.microsoft.com/office/drawing/2010/main" xmlns="" w="9525">
+                <a14:hiddenLine xmlns="" xmlns:a14="http://schemas.microsoft.com/office/drawing/2010/main" w="9525">
                   <a:solidFill>
                     <a:srgbClr val="000000"/>
                   </a:solidFill>
@@ -3037,7 +3037,7 @@
             </a:ln>
             <a:extLst>
               <a:ext uri="{91240B29-F687-4f45-9708-019B960494DF}">
-                <a14:hiddenLine xmlns:a14="http://schemas.microsoft.com/office/drawing/2010/main" xmlns="" w="9525">
+                <a14:hiddenLine xmlns="" xmlns:a14="http://schemas.microsoft.com/office/drawing/2010/main" w="9525">
                   <a:solidFill>
                     <a:srgbClr val="000000"/>
                   </a:solidFill>
@@ -3105,7 +3105,7 @@
             </a:ln>
             <a:extLst>
               <a:ext uri="{91240B29-F687-4f45-9708-019B960494DF}">
-                <a14:hiddenLine xmlns:a14="http://schemas.microsoft.com/office/drawing/2010/main" xmlns="" w="9525">
+                <a14:hiddenLine xmlns="" xmlns:a14="http://schemas.microsoft.com/office/drawing/2010/main" w="9525">
                   <a:solidFill>
                     <a:srgbClr val="000000"/>
                   </a:solidFill>
@@ -3167,7 +3167,7 @@
             </a:ln>
             <a:extLst>
               <a:ext uri="{91240B29-F687-4f45-9708-019B960494DF}">
-                <a14:hiddenLine xmlns:a14="http://schemas.microsoft.com/office/drawing/2010/main" xmlns="" w="9525">
+                <a14:hiddenLine xmlns="" xmlns:a14="http://schemas.microsoft.com/office/drawing/2010/main" w="9525">
                   <a:solidFill>
                     <a:srgbClr val="000000"/>
                   </a:solidFill>
@@ -3257,7 +3257,7 @@
             </a:ln>
             <a:extLst>
               <a:ext uri="{91240B29-F687-4f45-9708-019B960494DF}">
-                <a14:hiddenLine xmlns:a14="http://schemas.microsoft.com/office/drawing/2010/main" xmlns="" w="9525">
+                <a14:hiddenLine xmlns="" xmlns:a14="http://schemas.microsoft.com/office/drawing/2010/main" w="9525">
                   <a:solidFill>
                     <a:srgbClr val="000000"/>
                   </a:solidFill>
@@ -3319,7 +3319,7 @@
             </a:ln>
             <a:extLst>
               <a:ext uri="{91240B29-F687-4f45-9708-019B960494DF}">
-                <a14:hiddenLine xmlns:a14="http://schemas.microsoft.com/office/drawing/2010/main" xmlns="" w="9525">
+                <a14:hiddenLine xmlns="" xmlns:a14="http://schemas.microsoft.com/office/drawing/2010/main" w="9525">
                   <a:solidFill>
                     <a:srgbClr val="000000"/>
                   </a:solidFill>
@@ -3409,7 +3409,7 @@
             </a:ln>
             <a:extLst>
               <a:ext uri="{91240B29-F687-4f45-9708-019B960494DF}">
-                <a14:hiddenLine xmlns:a14="http://schemas.microsoft.com/office/drawing/2010/main" xmlns="" w="9525">
+                <a14:hiddenLine xmlns="" xmlns:a14="http://schemas.microsoft.com/office/drawing/2010/main" w="9525">
                   <a:solidFill>
                     <a:srgbClr val="000000"/>
                   </a:solidFill>
@@ -3471,7 +3471,7 @@
             </a:ln>
             <a:extLst>
               <a:ext uri="{91240B29-F687-4f45-9708-019B960494DF}">
-                <a14:hiddenLine xmlns:a14="http://schemas.microsoft.com/office/drawing/2010/main" xmlns="" w="9525">
+                <a14:hiddenLine xmlns="" xmlns:a14="http://schemas.microsoft.com/office/drawing/2010/main" w="9525">
                   <a:solidFill>
                     <a:srgbClr val="000000"/>
                   </a:solidFill>
@@ -3561,7 +3561,7 @@
             </a:ln>
             <a:extLst>
               <a:ext uri="{91240B29-F687-4f45-9708-019B960494DF}">
-                <a14:hiddenLine xmlns:a14="http://schemas.microsoft.com/office/drawing/2010/main" xmlns="" w="9525">
+                <a14:hiddenLine xmlns="" xmlns:a14="http://schemas.microsoft.com/office/drawing/2010/main" w="9525">
                   <a:solidFill>
                     <a:srgbClr val="000000"/>
                   </a:solidFill>
@@ -3595,7 +3595,7 @@
             </a:ln>
             <a:extLst>
               <a:ext uri="{91240B29-F687-4f45-9708-019B960494DF}">
-                <a14:hiddenLine xmlns:a14="http://schemas.microsoft.com/office/drawing/2010/main" xmlns="" w="9525">
+                <a14:hiddenLine xmlns="" xmlns:a14="http://schemas.microsoft.com/office/drawing/2010/main" w="9525">
                   <a:solidFill>
                     <a:srgbClr val="000000"/>
                   </a:solidFill>
@@ -3660,7 +3660,7 @@
             </a:ln>
             <a:extLst>
               <a:ext uri="{91240B29-F687-4f45-9708-019B960494DF}">
-                <a14:hiddenLine xmlns:a14="http://schemas.microsoft.com/office/drawing/2010/main" xmlns="" w="9525">
+                <a14:hiddenLine xmlns="" xmlns:a14="http://schemas.microsoft.com/office/drawing/2010/main" w="9525">
                   <a:solidFill>
                     <a:srgbClr val="000000"/>
                   </a:solidFill>
@@ -3750,7 +3750,7 @@
             </a:ln>
             <a:extLst>
               <a:ext uri="{91240B29-F687-4f45-9708-019B960494DF}">
-                <a14:hiddenLine xmlns:a14="http://schemas.microsoft.com/office/drawing/2010/main" xmlns="" w="9525">
+                <a14:hiddenLine xmlns="" xmlns:a14="http://schemas.microsoft.com/office/drawing/2010/main" w="9525">
                   <a:solidFill>
                     <a:srgbClr val="000000"/>
                   </a:solidFill>
@@ -3812,7 +3812,7 @@
             </a:ln>
             <a:extLst>
               <a:ext uri="{91240B29-F687-4f45-9708-019B960494DF}">
-                <a14:hiddenLine xmlns:a14="http://schemas.microsoft.com/office/drawing/2010/main" xmlns="" w="9525">
+                <a14:hiddenLine xmlns="" xmlns:a14="http://schemas.microsoft.com/office/drawing/2010/main" w="9525">
                   <a:solidFill>
                     <a:srgbClr val="000000"/>
                   </a:solidFill>
@@ -3902,7 +3902,7 @@
             </a:ln>
             <a:extLst>
               <a:ext uri="{91240B29-F687-4f45-9708-019B960494DF}">
-                <a14:hiddenLine xmlns:a14="http://schemas.microsoft.com/office/drawing/2010/main" xmlns="" w="9525">
+                <a14:hiddenLine xmlns="" xmlns:a14="http://schemas.microsoft.com/office/drawing/2010/main" w="9525">
                   <a:solidFill>
                     <a:srgbClr val="000000"/>
                   </a:solidFill>
@@ -3992,7 +3992,7 @@
             </a:ln>
             <a:extLst>
               <a:ext uri="{91240B29-F687-4f45-9708-019B960494DF}">
-                <a14:hiddenLine xmlns:a14="http://schemas.microsoft.com/office/drawing/2010/main" xmlns="" w="9525">
+                <a14:hiddenLine xmlns="" xmlns:a14="http://schemas.microsoft.com/office/drawing/2010/main" w="9525">
                   <a:solidFill>
                     <a:srgbClr val="000000"/>
                   </a:solidFill>
@@ -4057,7 +4057,7 @@
             </a:ln>
             <a:extLst>
               <a:ext uri="{91240B29-F687-4f45-9708-019B960494DF}">
-                <a14:hiddenLine xmlns:a14="http://schemas.microsoft.com/office/drawing/2010/main" xmlns="" w="9525">
+                <a14:hiddenLine xmlns="" xmlns:a14="http://schemas.microsoft.com/office/drawing/2010/main" w="9525">
                   <a:solidFill>
                     <a:srgbClr val="000000"/>
                   </a:solidFill>
@@ -4119,7 +4119,7 @@
             </a:ln>
             <a:extLst>
               <a:ext uri="{91240B29-F687-4f45-9708-019B960494DF}">
-                <a14:hiddenLine xmlns:a14="http://schemas.microsoft.com/office/drawing/2010/main" xmlns="" w="9525">
+                <a14:hiddenLine xmlns="" xmlns:a14="http://schemas.microsoft.com/office/drawing/2010/main" w="9525">
                   <a:solidFill>
                     <a:srgbClr val="000000"/>
                   </a:solidFill>
@@ -4209,7 +4209,7 @@
             </a:ln>
             <a:extLst>
               <a:ext uri="{91240B29-F687-4f45-9708-019B960494DF}">
-                <a14:hiddenLine xmlns:a14="http://schemas.microsoft.com/office/drawing/2010/main" xmlns="" w="9525">
+                <a14:hiddenLine xmlns="" xmlns:a14="http://schemas.microsoft.com/office/drawing/2010/main" w="9525">
                   <a:solidFill>
                     <a:srgbClr val="000000"/>
                   </a:solidFill>
@@ -4299,7 +4299,7 @@
             </a:ln>
             <a:extLst>
               <a:ext uri="{91240B29-F687-4f45-9708-019B960494DF}">
-                <a14:hiddenLine xmlns:a14="http://schemas.microsoft.com/office/drawing/2010/main" xmlns="" w="9525">
+                <a14:hiddenLine xmlns="" xmlns:a14="http://schemas.microsoft.com/office/drawing/2010/main" w="9525">
                   <a:solidFill>
                     <a:srgbClr val="000000"/>
                   </a:solidFill>
@@ -4361,7 +4361,7 @@
             </a:ln>
             <a:extLst>
               <a:ext uri="{91240B29-F687-4f45-9708-019B960494DF}">
-                <a14:hiddenLine xmlns:a14="http://schemas.microsoft.com/office/drawing/2010/main" xmlns="" w="9525">
+                <a14:hiddenLine xmlns="" xmlns:a14="http://schemas.microsoft.com/office/drawing/2010/main" w="9525">
                   <a:solidFill>
                     <a:srgbClr val="000000"/>
                   </a:solidFill>
@@ -4481,7 +4481,7 @@
             </a:ln>
             <a:extLst>
               <a:ext uri="{91240B29-F687-4f45-9708-019B960494DF}">
-                <a14:hiddenLine xmlns:a14="http://schemas.microsoft.com/office/drawing/2010/main" xmlns="" w="9525">
+                <a14:hiddenLine xmlns="" xmlns:a14="http://schemas.microsoft.com/office/drawing/2010/main" w="9525">
                   <a:solidFill>
                     <a:srgbClr val="000000"/>
                   </a:solidFill>
@@ -4549,7 +4549,7 @@
             </a:ln>
             <a:extLst>
               <a:ext uri="{91240B29-F687-4f45-9708-019B960494DF}">
-                <a14:hiddenLine xmlns:a14="http://schemas.microsoft.com/office/drawing/2010/main" xmlns="" w="9525">
+                <a14:hiddenLine xmlns="" xmlns:a14="http://schemas.microsoft.com/office/drawing/2010/main" w="9525">
                   <a:solidFill>
                     <a:srgbClr val="000000"/>
                   </a:solidFill>
@@ -4639,7 +4639,7 @@
             </a:ln>
             <a:extLst>
               <a:ext uri="{91240B29-F687-4f45-9708-019B960494DF}">
-                <a14:hiddenLine xmlns:a14="http://schemas.microsoft.com/office/drawing/2010/main" xmlns="" w="9525">
+                <a14:hiddenLine xmlns="" xmlns:a14="http://schemas.microsoft.com/office/drawing/2010/main" w="9525">
                   <a:solidFill>
                     <a:srgbClr val="000000"/>
                   </a:solidFill>
@@ -4779,7 +4779,7 @@
           <a:p>
             <a:fld id="{7AA8B1A8-7298-432A-9421-DA649848F7F2}" type="datetime1">
               <a:rPr lang="pl-PL" smtClean="0"/>
-              <a:t>10.05.2021</a:t>
+              <a:t>25.05.2021</a:t>
             </a:fld>
             <a:endParaRPr lang="pl-PL"/>
           </a:p>
@@ -5049,7 +5049,7 @@
           <a:p>
             <a:fld id="{07A1F85B-9A3D-4DFF-89ED-BAA0541C52EB}" type="datetime1">
               <a:rPr lang="pl-PL" smtClean="0"/>
-              <a:t>10.05.2021</a:t>
+              <a:t>25.05.2021</a:t>
             </a:fld>
             <a:endParaRPr lang="pl-PL"/>
           </a:p>
@@ -5248,7 +5248,7 @@
           <a:p>
             <a:fld id="{7E0C974E-F68C-4B4C-8CBD-10D1C18EF0D7}" type="datetime1">
               <a:rPr lang="pl-PL" smtClean="0"/>
-              <a:t>10.05.2021</a:t>
+              <a:t>25.05.2021</a:t>
             </a:fld>
             <a:endParaRPr lang="pl-PL"/>
           </a:p>
@@ -5514,7 +5514,7 @@
           <a:p>
             <a:fld id="{CC79DFDE-F01D-46AF-851B-507FAC23546C}" type="datetime1">
               <a:rPr lang="pl-PL" smtClean="0"/>
-              <a:t>10.05.2021</a:t>
+              <a:t>25.05.2021</a:t>
             </a:fld>
             <a:endParaRPr lang="pl-PL"/>
           </a:p>
@@ -5951,7 +5951,7 @@
           <a:p>
             <a:fld id="{62382FBC-DBD2-4C67-AFBA-56676A8EB421}" type="datetime1">
               <a:rPr lang="pl-PL" smtClean="0"/>
-              <a:t>10.05.2021</a:t>
+              <a:t>25.05.2021</a:t>
             </a:fld>
             <a:endParaRPr lang="pl-PL"/>
           </a:p>
@@ -6500,7 +6500,7 @@
           <a:p>
             <a:fld id="{C8C7B351-6BED-41F2-9CDE-0DD91E8B5BF3}" type="datetime1">
               <a:rPr lang="pl-PL" smtClean="0"/>
-              <a:t>10.05.2021</a:t>
+              <a:t>25.05.2021</a:t>
             </a:fld>
             <a:endParaRPr lang="pl-PL"/>
           </a:p>
@@ -7223,7 +7223,7 @@
           <a:p>
             <a:fld id="{B6D666D8-2F45-4B68-9DB5-2CEC0324FFFD}" type="datetime1">
               <a:rPr lang="pl-PL" smtClean="0"/>
-              <a:t>10.05.2021</a:t>
+              <a:t>25.05.2021</a:t>
             </a:fld>
             <a:endParaRPr lang="pl-PL"/>
           </a:p>
@@ -7400,7 +7400,7 @@
           <a:p>
             <a:fld id="{C231F632-DEF4-4BE0-B0EC-AA83955FCB19}" type="datetime1">
               <a:rPr lang="pl-PL" smtClean="0"/>
-              <a:t>10.05.2021</a:t>
+              <a:t>25.05.2021</a:t>
             </a:fld>
             <a:endParaRPr lang="pl-PL"/>
           </a:p>
@@ -7583,7 +7583,7 @@
           <a:p>
             <a:fld id="{5CB83C37-369D-47D3-B079-C80228F683AB}" type="datetime1">
               <a:rPr lang="pl-PL" smtClean="0"/>
-              <a:t>10.05.2021</a:t>
+              <a:t>25.05.2021</a:t>
             </a:fld>
             <a:endParaRPr lang="pl-PL"/>
           </a:p>
@@ -7771,7 +7771,7 @@
           <a:p>
             <a:fld id="{B58CF644-134A-4034-AF8A-23BA1290309E}" type="datetime1">
               <a:rPr lang="pl-PL" smtClean="0"/>
-              <a:t>10.05.2021</a:t>
+              <a:t>25.05.2021</a:t>
             </a:fld>
             <a:endParaRPr lang="pl-PL"/>
           </a:p>
@@ -8034,7 +8034,7 @@
           <a:p>
             <a:fld id="{5AD0C844-8C9B-4715-ADEE-EF783E26E87C}" type="datetime1">
               <a:rPr lang="pl-PL" smtClean="0"/>
-              <a:t>10.05.2021</a:t>
+              <a:t>25.05.2021</a:t>
             </a:fld>
             <a:endParaRPr lang="pl-PL"/>
           </a:p>
@@ -8269,7 +8269,7 @@
           <a:p>
             <a:fld id="{83EAACE0-9D1C-4304-8FB8-FAF24F7ABC46}" type="datetime1">
               <a:rPr lang="pl-PL" smtClean="0"/>
-              <a:t>10.05.2021</a:t>
+              <a:t>25.05.2021</a:t>
             </a:fld>
             <a:endParaRPr lang="pl-PL"/>
           </a:p>
@@ -8653,7 +8653,7 @@
           <a:p>
             <a:fld id="{AEE16C34-3966-46AD-A338-948D3E8007A9}" type="datetime1">
               <a:rPr lang="pl-PL" smtClean="0"/>
-              <a:t>10.05.2021</a:t>
+              <a:t>25.05.2021</a:t>
             </a:fld>
             <a:endParaRPr lang="pl-PL"/>
           </a:p>
@@ -8774,7 +8774,7 @@
           <a:p>
             <a:fld id="{C67C41FC-2027-44F8-AA82-C378B02D77F0}" type="datetime1">
               <a:rPr lang="pl-PL" smtClean="0"/>
-              <a:t>10.05.2021</a:t>
+              <a:t>25.05.2021</a:t>
             </a:fld>
             <a:endParaRPr lang="pl-PL"/>
           </a:p>
@@ -8872,7 +8872,7 @@
           <a:p>
             <a:fld id="{31CDBD5C-497A-4EFC-A39F-3DD7C0EB863C}" type="datetime1">
               <a:rPr lang="pl-PL" smtClean="0"/>
-              <a:t>10.05.2021</a:t>
+              <a:t>25.05.2021</a:t>
             </a:fld>
             <a:endParaRPr lang="pl-PL"/>
           </a:p>
@@ -9124,7 +9124,7 @@
           <a:p>
             <a:fld id="{E01205A4-D6D4-4ABA-AC9F-F286A26F73BA}" type="datetime1">
               <a:rPr lang="pl-PL" smtClean="0"/>
-              <a:t>10.05.2021</a:t>
+              <a:t>25.05.2021</a:t>
             </a:fld>
             <a:endParaRPr lang="pl-PL"/>
           </a:p>
@@ -9379,7 +9379,7 @@
           <a:p>
             <a:fld id="{D0971B5F-712E-4403-8E8E-3A585D05AF54}" type="datetime1">
               <a:rPr lang="pl-PL" smtClean="0"/>
-              <a:t>10.05.2021</a:t>
+              <a:t>25.05.2021</a:t>
             </a:fld>
             <a:endParaRPr lang="pl-PL"/>
           </a:p>
@@ -9505,7 +9505,7 @@
           <a:noFill/>
           <a:extLst>
             <a:ext uri="{909E8E84-426E-40dd-AFC4-6F175D3DCCD1}">
-              <a14:hiddenFill xmlns:a14="http://schemas.microsoft.com/office/drawing/2010/main" xmlns="">
+              <a14:hiddenFill xmlns="" xmlns:a14="http://schemas.microsoft.com/office/drawing/2010/main">
                 <a:solidFill>
                   <a:srgbClr val="FFFFFF"/>
                 </a:solidFill>
@@ -9579,7 +9579,7 @@
               </a:ln>
               <a:extLst>
                 <a:ext uri="{91240B29-F687-4f45-9708-019B960494DF}">
-                  <a14:hiddenLine xmlns:a14="http://schemas.microsoft.com/office/drawing/2010/main" xmlns="" w="9525">
+                  <a14:hiddenLine xmlns="" xmlns:a14="http://schemas.microsoft.com/office/drawing/2010/main" w="9525">
                     <a:solidFill>
                       <a:srgbClr val="000000"/>
                     </a:solidFill>
@@ -9669,7 +9669,7 @@
               </a:ln>
               <a:extLst>
                 <a:ext uri="{91240B29-F687-4f45-9708-019B960494DF}">
-                  <a14:hiddenLine xmlns:a14="http://schemas.microsoft.com/office/drawing/2010/main" xmlns="" w="9525">
+                  <a14:hiddenLine xmlns="" xmlns:a14="http://schemas.microsoft.com/office/drawing/2010/main" w="9525">
                     <a:solidFill>
                       <a:srgbClr val="000000"/>
                     </a:solidFill>
@@ -9759,7 +9759,7 @@
               </a:ln>
               <a:extLst>
                 <a:ext uri="{91240B29-F687-4f45-9708-019B960494DF}">
-                  <a14:hiddenLine xmlns:a14="http://schemas.microsoft.com/office/drawing/2010/main" xmlns="" w="9525">
+                  <a14:hiddenLine xmlns="" xmlns:a14="http://schemas.microsoft.com/office/drawing/2010/main" w="9525">
                     <a:solidFill>
                       <a:srgbClr val="000000"/>
                     </a:solidFill>
@@ -9821,7 +9821,7 @@
               </a:ln>
               <a:extLst>
                 <a:ext uri="{91240B29-F687-4f45-9708-019B960494DF}">
-                  <a14:hiddenLine xmlns:a14="http://schemas.microsoft.com/office/drawing/2010/main" xmlns="" w="9525">
+                  <a14:hiddenLine xmlns="" xmlns:a14="http://schemas.microsoft.com/office/drawing/2010/main" w="9525">
                     <a:solidFill>
                       <a:srgbClr val="000000"/>
                     </a:solidFill>
@@ -9911,7 +9911,7 @@
               </a:ln>
               <a:extLst>
                 <a:ext uri="{91240B29-F687-4f45-9708-019B960494DF}">
-                  <a14:hiddenLine xmlns:a14="http://schemas.microsoft.com/office/drawing/2010/main" xmlns="" w="9525">
+                  <a14:hiddenLine xmlns="" xmlns:a14="http://schemas.microsoft.com/office/drawing/2010/main" w="9525">
                     <a:solidFill>
                       <a:srgbClr val="000000"/>
                     </a:solidFill>
@@ -9973,7 +9973,7 @@
               </a:ln>
               <a:extLst>
                 <a:ext uri="{91240B29-F687-4f45-9708-019B960494DF}">
-                  <a14:hiddenLine xmlns:a14="http://schemas.microsoft.com/office/drawing/2010/main" xmlns="" w="9525">
+                  <a14:hiddenLine xmlns="" xmlns:a14="http://schemas.microsoft.com/office/drawing/2010/main" w="9525">
                     <a:solidFill>
                       <a:srgbClr val="000000"/>
                     </a:solidFill>
@@ -10035,7 +10035,7 @@
               </a:ln>
               <a:extLst>
                 <a:ext uri="{91240B29-F687-4f45-9708-019B960494DF}">
-                  <a14:hiddenLine xmlns:a14="http://schemas.microsoft.com/office/drawing/2010/main" xmlns="" w="9525">
+                  <a14:hiddenLine xmlns="" xmlns:a14="http://schemas.microsoft.com/office/drawing/2010/main" w="9525">
                     <a:solidFill>
                       <a:srgbClr val="000000"/>
                     </a:solidFill>
@@ -10125,7 +10125,7 @@
               </a:ln>
               <a:extLst>
                 <a:ext uri="{91240B29-F687-4f45-9708-019B960494DF}">
-                  <a14:hiddenLine xmlns:a14="http://schemas.microsoft.com/office/drawing/2010/main" xmlns="" w="9525">
+                  <a14:hiddenLine xmlns="" xmlns:a14="http://schemas.microsoft.com/office/drawing/2010/main" w="9525">
                     <a:solidFill>
                       <a:srgbClr val="000000"/>
                     </a:solidFill>
@@ -10215,7 +10215,7 @@
               </a:ln>
               <a:extLst>
                 <a:ext uri="{91240B29-F687-4f45-9708-019B960494DF}">
-                  <a14:hiddenLine xmlns:a14="http://schemas.microsoft.com/office/drawing/2010/main" xmlns="" w="9525">
+                  <a14:hiddenLine xmlns="" xmlns:a14="http://schemas.microsoft.com/office/drawing/2010/main" w="9525">
                     <a:solidFill>
                       <a:srgbClr val="000000"/>
                     </a:solidFill>
@@ -10277,7 +10277,7 @@
               </a:ln>
               <a:extLst>
                 <a:ext uri="{91240B29-F687-4f45-9708-019B960494DF}">
-                  <a14:hiddenLine xmlns:a14="http://schemas.microsoft.com/office/drawing/2010/main" xmlns="" w="9525">
+                  <a14:hiddenLine xmlns="" xmlns:a14="http://schemas.microsoft.com/office/drawing/2010/main" w="9525">
                     <a:solidFill>
                       <a:srgbClr val="000000"/>
                     </a:solidFill>
@@ -10387,7 +10387,7 @@
               </a:ln>
               <a:extLst>
                 <a:ext uri="{91240B29-F687-4f45-9708-019B960494DF}">
-                  <a14:hiddenLine xmlns:a14="http://schemas.microsoft.com/office/drawing/2010/main" xmlns="" w="9525">
+                  <a14:hiddenLine xmlns="" xmlns:a14="http://schemas.microsoft.com/office/drawing/2010/main" w="9525">
                     <a:solidFill>
                       <a:srgbClr val="000000"/>
                     </a:solidFill>
@@ -10471,7 +10471,7 @@
               </a:ln>
               <a:extLst>
                 <a:ext uri="{91240B29-F687-4f45-9708-019B960494DF}">
-                  <a14:hiddenLine xmlns:a14="http://schemas.microsoft.com/office/drawing/2010/main" xmlns="" w="9525">
+                  <a14:hiddenLine xmlns="" xmlns:a14="http://schemas.microsoft.com/office/drawing/2010/main" w="9525">
                     <a:solidFill>
                       <a:srgbClr val="000000"/>
                     </a:solidFill>
@@ -10533,7 +10533,7 @@
               </a:ln>
               <a:extLst>
                 <a:ext uri="{91240B29-F687-4f45-9708-019B960494DF}">
-                  <a14:hiddenLine xmlns:a14="http://schemas.microsoft.com/office/drawing/2010/main" xmlns="" w="9525">
+                  <a14:hiddenLine xmlns="" xmlns:a14="http://schemas.microsoft.com/office/drawing/2010/main" w="9525">
                     <a:solidFill>
                       <a:srgbClr val="000000"/>
                     </a:solidFill>
@@ -10595,7 +10595,7 @@
               </a:ln>
               <a:extLst>
                 <a:ext uri="{91240B29-F687-4f45-9708-019B960494DF}">
-                  <a14:hiddenLine xmlns:a14="http://schemas.microsoft.com/office/drawing/2010/main" xmlns="" w="9525">
+                  <a14:hiddenLine xmlns="" xmlns:a14="http://schemas.microsoft.com/office/drawing/2010/main" w="9525">
                     <a:solidFill>
                       <a:srgbClr val="000000"/>
                     </a:solidFill>
@@ -10685,7 +10685,7 @@
               </a:ln>
               <a:extLst>
                 <a:ext uri="{91240B29-F687-4f45-9708-019B960494DF}">
-                  <a14:hiddenLine xmlns:a14="http://schemas.microsoft.com/office/drawing/2010/main" xmlns="" w="9525">
+                  <a14:hiddenLine xmlns="" xmlns:a14="http://schemas.microsoft.com/office/drawing/2010/main" w="9525">
                     <a:solidFill>
                       <a:srgbClr val="000000"/>
                     </a:solidFill>
@@ -10719,7 +10719,7 @@
               </a:ln>
               <a:extLst>
                 <a:ext uri="{91240B29-F687-4f45-9708-019B960494DF}">
-                  <a14:hiddenLine xmlns:a14="http://schemas.microsoft.com/office/drawing/2010/main" xmlns="" w="9525">
+                  <a14:hiddenLine xmlns="" xmlns:a14="http://schemas.microsoft.com/office/drawing/2010/main" w="9525">
                     <a:solidFill>
                       <a:srgbClr val="000000"/>
                     </a:solidFill>
@@ -10784,7 +10784,7 @@
               </a:ln>
               <a:extLst>
                 <a:ext uri="{91240B29-F687-4f45-9708-019B960494DF}">
-                  <a14:hiddenLine xmlns:a14="http://schemas.microsoft.com/office/drawing/2010/main" xmlns="" w="9525">
+                  <a14:hiddenLine xmlns="" xmlns:a14="http://schemas.microsoft.com/office/drawing/2010/main" w="9525">
                     <a:solidFill>
                       <a:srgbClr val="000000"/>
                     </a:solidFill>
@@ -10874,7 +10874,7 @@
               </a:ln>
               <a:extLst>
                 <a:ext uri="{91240B29-F687-4f45-9708-019B960494DF}">
-                  <a14:hiddenLine xmlns:a14="http://schemas.microsoft.com/office/drawing/2010/main" xmlns="" w="9525">
+                  <a14:hiddenLine xmlns="" xmlns:a14="http://schemas.microsoft.com/office/drawing/2010/main" w="9525">
                     <a:solidFill>
                       <a:srgbClr val="000000"/>
                     </a:solidFill>
@@ -10936,7 +10936,7 @@
               </a:ln>
               <a:extLst>
                 <a:ext uri="{91240B29-F687-4f45-9708-019B960494DF}">
-                  <a14:hiddenLine xmlns:a14="http://schemas.microsoft.com/office/drawing/2010/main" xmlns="" w="9525">
+                  <a14:hiddenLine xmlns="" xmlns:a14="http://schemas.microsoft.com/office/drawing/2010/main" w="9525">
                     <a:solidFill>
                       <a:srgbClr val="000000"/>
                     </a:solidFill>
@@ -11026,7 +11026,7 @@
               </a:ln>
               <a:extLst>
                 <a:ext uri="{91240B29-F687-4f45-9708-019B960494DF}">
-                  <a14:hiddenLine xmlns:a14="http://schemas.microsoft.com/office/drawing/2010/main" xmlns="" w="9525">
+                  <a14:hiddenLine xmlns="" xmlns:a14="http://schemas.microsoft.com/office/drawing/2010/main" w="9525">
                     <a:solidFill>
                       <a:srgbClr val="000000"/>
                     </a:solidFill>
@@ -11091,7 +11091,7 @@
               </a:ln>
               <a:extLst>
                 <a:ext uri="{91240B29-F687-4f45-9708-019B960494DF}">
-                  <a14:hiddenLine xmlns:a14="http://schemas.microsoft.com/office/drawing/2010/main" xmlns="" w="9525">
+                  <a14:hiddenLine xmlns="" xmlns:a14="http://schemas.microsoft.com/office/drawing/2010/main" w="9525">
                     <a:solidFill>
                       <a:srgbClr val="000000"/>
                     </a:solidFill>
@@ -11153,7 +11153,7 @@
               </a:ln>
               <a:extLst>
                 <a:ext uri="{91240B29-F687-4f45-9708-019B960494DF}">
-                  <a14:hiddenLine xmlns:a14="http://schemas.microsoft.com/office/drawing/2010/main" xmlns="" w="9525">
+                  <a14:hiddenLine xmlns="" xmlns:a14="http://schemas.microsoft.com/office/drawing/2010/main" w="9525">
                     <a:solidFill>
                       <a:srgbClr val="000000"/>
                     </a:solidFill>
@@ -11243,7 +11243,7 @@
               </a:ln>
               <a:extLst>
                 <a:ext uri="{91240B29-F687-4f45-9708-019B960494DF}">
-                  <a14:hiddenLine xmlns:a14="http://schemas.microsoft.com/office/drawing/2010/main" xmlns="" w="9525">
+                  <a14:hiddenLine xmlns="" xmlns:a14="http://schemas.microsoft.com/office/drawing/2010/main" w="9525">
                     <a:solidFill>
                       <a:srgbClr val="000000"/>
                     </a:solidFill>
@@ -11333,7 +11333,7 @@
               </a:ln>
               <a:extLst>
                 <a:ext uri="{91240B29-F687-4f45-9708-019B960494DF}">
-                  <a14:hiddenLine xmlns:a14="http://schemas.microsoft.com/office/drawing/2010/main" xmlns="" w="9525">
+                  <a14:hiddenLine xmlns="" xmlns:a14="http://schemas.microsoft.com/office/drawing/2010/main" w="9525">
                     <a:solidFill>
                       <a:srgbClr val="000000"/>
                     </a:solidFill>
@@ -11398,7 +11398,7 @@
               </a:ln>
               <a:extLst>
                 <a:ext uri="{91240B29-F687-4f45-9708-019B960494DF}">
-                  <a14:hiddenLine xmlns:a14="http://schemas.microsoft.com/office/drawing/2010/main" xmlns="" w="9525">
+                  <a14:hiddenLine xmlns="" xmlns:a14="http://schemas.microsoft.com/office/drawing/2010/main" w="9525">
                     <a:solidFill>
                       <a:srgbClr val="000000"/>
                     </a:solidFill>
@@ -11518,7 +11518,7 @@
               </a:ln>
               <a:extLst>
                 <a:ext uri="{91240B29-F687-4f45-9708-019B960494DF}">
-                  <a14:hiddenLine xmlns:a14="http://schemas.microsoft.com/office/drawing/2010/main" xmlns="" w="9525">
+                  <a14:hiddenLine xmlns="" xmlns:a14="http://schemas.microsoft.com/office/drawing/2010/main" w="9525">
                     <a:solidFill>
                       <a:srgbClr val="000000"/>
                     </a:solidFill>
@@ -11616,7 +11616,7 @@
               </a:ln>
               <a:extLst>
                 <a:ext uri="{91240B29-F687-4f45-9708-019B960494DF}">
-                  <a14:hiddenLine xmlns:a14="http://schemas.microsoft.com/office/drawing/2010/main" xmlns="" w="9525">
+                  <a14:hiddenLine xmlns="" xmlns:a14="http://schemas.microsoft.com/office/drawing/2010/main" w="9525">
                     <a:solidFill>
                       <a:srgbClr val="000000"/>
                     </a:solidFill>
@@ -11731,7 +11731,7 @@
               </a:ln>
               <a:extLst>
                 <a:ext uri="{91240B29-F687-4f45-9708-019B960494DF}">
-                  <a14:hiddenLine xmlns:a14="http://schemas.microsoft.com/office/drawing/2010/main" xmlns="" w="9525">
+                  <a14:hiddenLine xmlns="" xmlns:a14="http://schemas.microsoft.com/office/drawing/2010/main" w="9525">
                     <a:solidFill>
                       <a:srgbClr val="000000"/>
                     </a:solidFill>
@@ -11821,7 +11821,7 @@
               </a:ln>
               <a:extLst>
                 <a:ext uri="{91240B29-F687-4f45-9708-019B960494DF}">
-                  <a14:hiddenLine xmlns:a14="http://schemas.microsoft.com/office/drawing/2010/main" xmlns="" w="9525">
+                  <a14:hiddenLine xmlns="" xmlns:a14="http://schemas.microsoft.com/office/drawing/2010/main" w="9525">
                     <a:solidFill>
                       <a:srgbClr val="000000"/>
                     </a:solidFill>
@@ -11886,7 +11886,7 @@
               </a:ln>
               <a:extLst>
                 <a:ext uri="{91240B29-F687-4f45-9708-019B960494DF}">
-                  <a14:hiddenLine xmlns:a14="http://schemas.microsoft.com/office/drawing/2010/main" xmlns="" w="9525">
+                  <a14:hiddenLine xmlns="" xmlns:a14="http://schemas.microsoft.com/office/drawing/2010/main" w="9525">
                     <a:solidFill>
                       <a:srgbClr val="000000"/>
                     </a:solidFill>
@@ -11976,7 +11976,7 @@
               </a:ln>
               <a:extLst>
                 <a:ext uri="{91240B29-F687-4f45-9708-019B960494DF}">
-                  <a14:hiddenLine xmlns:a14="http://schemas.microsoft.com/office/drawing/2010/main" xmlns="" w="9525">
+                  <a14:hiddenLine xmlns="" xmlns:a14="http://schemas.microsoft.com/office/drawing/2010/main" w="9525">
                     <a:solidFill>
                       <a:srgbClr val="000000"/>
                     </a:solidFill>
@@ -12044,7 +12044,7 @@
               </a:ln>
               <a:extLst>
                 <a:ext uri="{91240B29-F687-4f45-9708-019B960494DF}">
-                  <a14:hiddenLine xmlns:a14="http://schemas.microsoft.com/office/drawing/2010/main" xmlns="" w="9525">
+                  <a14:hiddenLine xmlns="" xmlns:a14="http://schemas.microsoft.com/office/drawing/2010/main" w="9525">
                     <a:solidFill>
                       <a:srgbClr val="000000"/>
                     </a:solidFill>
@@ -12134,7 +12134,7 @@
               </a:ln>
               <a:extLst>
                 <a:ext uri="{91240B29-F687-4f45-9708-019B960494DF}">
-                  <a14:hiddenLine xmlns:a14="http://schemas.microsoft.com/office/drawing/2010/main" xmlns="" w="9525">
+                  <a14:hiddenLine xmlns="" xmlns:a14="http://schemas.microsoft.com/office/drawing/2010/main" w="9525">
                     <a:solidFill>
                       <a:srgbClr val="000000"/>
                     </a:solidFill>
@@ -12202,7 +12202,7 @@
               </a:ln>
               <a:extLst>
                 <a:ext uri="{91240B29-F687-4f45-9708-019B960494DF}">
-                  <a14:hiddenLine xmlns:a14="http://schemas.microsoft.com/office/drawing/2010/main" xmlns="" w="9525">
+                  <a14:hiddenLine xmlns="" xmlns:a14="http://schemas.microsoft.com/office/drawing/2010/main" w="9525">
                     <a:solidFill>
                       <a:srgbClr val="000000"/>
                     </a:solidFill>
@@ -12292,7 +12292,7 @@
               </a:ln>
               <a:extLst>
                 <a:ext uri="{91240B29-F687-4f45-9708-019B960494DF}">
-                  <a14:hiddenLine xmlns:a14="http://schemas.microsoft.com/office/drawing/2010/main" xmlns="" w="9525">
+                  <a14:hiddenLine xmlns="" xmlns:a14="http://schemas.microsoft.com/office/drawing/2010/main" w="9525">
                     <a:solidFill>
                       <a:srgbClr val="000000"/>
                     </a:solidFill>
@@ -12326,7 +12326,7 @@
               </a:ln>
               <a:extLst>
                 <a:ext uri="{91240B29-F687-4f45-9708-019B960494DF}">
-                  <a14:hiddenLine xmlns:a14="http://schemas.microsoft.com/office/drawing/2010/main" xmlns="" w="9525">
+                  <a14:hiddenLine xmlns="" xmlns:a14="http://schemas.microsoft.com/office/drawing/2010/main" w="9525">
                     <a:solidFill>
                       <a:srgbClr val="000000"/>
                     </a:solidFill>
@@ -12466,7 +12466,7 @@
           <a:p>
             <a:fld id="{CACD749D-21EA-4CAF-ADE5-8ED363C37052}" type="datetime1">
               <a:rPr lang="pl-PL" smtClean="0"/>
-              <a:t>10.05.2021</a:t>
+              <a:t>25.05.2021</a:t>
             </a:fld>
             <a:endParaRPr lang="pl-PL"/>
           </a:p>
@@ -13058,7 +13058,7 @@
             <a:noFill/>
             <a:extLst>
               <a:ext uri="{909E8E84-426E-40dd-AFC4-6F175D3DCCD1}">
-                <a14:hiddenFill xmlns:p14="http://schemas.microsoft.com/office/powerpoint/2010/main" xmlns:a14="http://schemas.microsoft.com/office/drawing/2010/main" xmlns:a16="http://schemas.microsoft.com/office/drawing/2014/main" xmlns="">
+                <a14:hiddenFill xmlns="" xmlns:a16="http://schemas.microsoft.com/office/drawing/2014/main" xmlns:a14="http://schemas.microsoft.com/office/drawing/2010/main" xmlns:p14="http://schemas.microsoft.com/office/powerpoint/2010/main">
                   <a:solidFill>
                     <a:srgbClr val="FFFFFF"/>
                   </a:solidFill>
@@ -16070,7 +16070,7 @@
             </a:ln>
             <a:extLst>
               <a:ext uri="{91240B29-F687-4f45-9708-019B960494DF}">
-                <a14:hiddenLine xmlns="" xmlns:a16="http://schemas.microsoft.com/office/drawing/2014/main" xmlns:p14="http://schemas.microsoft.com/office/powerpoint/2010/main" xmlns:a14="http://schemas.microsoft.com/office/drawing/2010/main" w="9525">
+                <a14:hiddenLine xmlns:a14="http://schemas.microsoft.com/office/drawing/2010/main" xmlns:p14="http://schemas.microsoft.com/office/powerpoint/2010/main" xmlns:a16="http://schemas.microsoft.com/office/drawing/2014/main" xmlns="" w="9525">
                   <a:solidFill>
                     <a:srgbClr val="000000"/>
                   </a:solidFill>
@@ -16175,7 +16175,7 @@
             </a:ln>
             <a:extLst>
               <a:ext uri="{91240B29-F687-4f45-9708-019B960494DF}">
-                <a14:hiddenLine xmlns="" xmlns:a16="http://schemas.microsoft.com/office/drawing/2014/main" xmlns:p14="http://schemas.microsoft.com/office/powerpoint/2010/main" xmlns:a14="http://schemas.microsoft.com/office/drawing/2010/main" w="9525">
+                <a14:hiddenLine xmlns:a14="http://schemas.microsoft.com/office/drawing/2010/main" xmlns:p14="http://schemas.microsoft.com/office/powerpoint/2010/main" xmlns:a16="http://schemas.microsoft.com/office/drawing/2014/main" xmlns="" w="9525">
                   <a:solidFill>
                     <a:srgbClr val="000000"/>
                   </a:solidFill>
@@ -16280,7 +16280,7 @@
             </a:ln>
             <a:extLst>
               <a:ext uri="{91240B29-F687-4f45-9708-019B960494DF}">
-                <a14:hiddenLine xmlns="" xmlns:a16="http://schemas.microsoft.com/office/drawing/2014/main" xmlns:p14="http://schemas.microsoft.com/office/powerpoint/2010/main" xmlns:a14="http://schemas.microsoft.com/office/drawing/2010/main" w="9525">
+                <a14:hiddenLine xmlns:a14="http://schemas.microsoft.com/office/drawing/2010/main" xmlns:p14="http://schemas.microsoft.com/office/powerpoint/2010/main" xmlns:a16="http://schemas.microsoft.com/office/drawing/2014/main" xmlns="" w="9525">
                   <a:solidFill>
                     <a:srgbClr val="000000"/>
                   </a:solidFill>
@@ -16357,7 +16357,7 @@
             </a:ln>
             <a:extLst>
               <a:ext uri="{91240B29-F687-4f45-9708-019B960494DF}">
-                <a14:hiddenLine xmlns="" xmlns:a16="http://schemas.microsoft.com/office/drawing/2014/main" xmlns:p14="http://schemas.microsoft.com/office/powerpoint/2010/main" xmlns:a14="http://schemas.microsoft.com/office/drawing/2010/main" w="9525">
+                <a14:hiddenLine xmlns:a14="http://schemas.microsoft.com/office/drawing/2010/main" xmlns:p14="http://schemas.microsoft.com/office/powerpoint/2010/main" xmlns:a16="http://schemas.microsoft.com/office/drawing/2014/main" xmlns="" w="9525">
                   <a:solidFill>
                     <a:srgbClr val="000000"/>
                   </a:solidFill>
@@ -16462,7 +16462,7 @@
             </a:ln>
             <a:extLst>
               <a:ext uri="{91240B29-F687-4f45-9708-019B960494DF}">
-                <a14:hiddenLine xmlns="" xmlns:a16="http://schemas.microsoft.com/office/drawing/2014/main" xmlns:p14="http://schemas.microsoft.com/office/powerpoint/2010/main" xmlns:a14="http://schemas.microsoft.com/office/drawing/2010/main" w="9525">
+                <a14:hiddenLine xmlns:a14="http://schemas.microsoft.com/office/drawing/2010/main" xmlns:p14="http://schemas.microsoft.com/office/powerpoint/2010/main" xmlns:a16="http://schemas.microsoft.com/office/drawing/2014/main" xmlns="" w="9525">
                   <a:solidFill>
                     <a:srgbClr val="000000"/>
                   </a:solidFill>
@@ -16539,7 +16539,7 @@
             </a:ln>
             <a:extLst>
               <a:ext uri="{91240B29-F687-4f45-9708-019B960494DF}">
-                <a14:hiddenLine xmlns="" xmlns:a16="http://schemas.microsoft.com/office/drawing/2014/main" xmlns:p14="http://schemas.microsoft.com/office/powerpoint/2010/main" xmlns:a14="http://schemas.microsoft.com/office/drawing/2010/main" w="9525">
+                <a14:hiddenLine xmlns:a14="http://schemas.microsoft.com/office/drawing/2010/main" xmlns:p14="http://schemas.microsoft.com/office/powerpoint/2010/main" xmlns:a16="http://schemas.microsoft.com/office/drawing/2014/main" xmlns="" w="9525">
                   <a:solidFill>
                     <a:srgbClr val="000000"/>
                   </a:solidFill>
@@ -16616,7 +16616,7 @@
             </a:ln>
             <a:extLst>
               <a:ext uri="{91240B29-F687-4f45-9708-019B960494DF}">
-                <a14:hiddenLine xmlns="" xmlns:a16="http://schemas.microsoft.com/office/drawing/2014/main" xmlns:p14="http://schemas.microsoft.com/office/powerpoint/2010/main" xmlns:a14="http://schemas.microsoft.com/office/drawing/2010/main" w="9525">
+                <a14:hiddenLine xmlns:a14="http://schemas.microsoft.com/office/drawing/2010/main" xmlns:p14="http://schemas.microsoft.com/office/powerpoint/2010/main" xmlns:a16="http://schemas.microsoft.com/office/drawing/2014/main" xmlns="" w="9525">
                   <a:solidFill>
                     <a:srgbClr val="000000"/>
                   </a:solidFill>
@@ -16721,7 +16721,7 @@
             </a:ln>
             <a:extLst>
               <a:ext uri="{91240B29-F687-4f45-9708-019B960494DF}">
-                <a14:hiddenLine xmlns="" xmlns:a16="http://schemas.microsoft.com/office/drawing/2014/main" xmlns:p14="http://schemas.microsoft.com/office/powerpoint/2010/main" xmlns:a14="http://schemas.microsoft.com/office/drawing/2010/main" w="9525">
+                <a14:hiddenLine xmlns:a14="http://schemas.microsoft.com/office/drawing/2010/main" xmlns:p14="http://schemas.microsoft.com/office/powerpoint/2010/main" xmlns:a16="http://schemas.microsoft.com/office/drawing/2014/main" xmlns="" w="9525">
                   <a:solidFill>
                     <a:srgbClr val="000000"/>
                   </a:solidFill>
@@ -16826,7 +16826,7 @@
             </a:ln>
             <a:extLst>
               <a:ext uri="{91240B29-F687-4f45-9708-019B960494DF}">
-                <a14:hiddenLine xmlns="" xmlns:a16="http://schemas.microsoft.com/office/drawing/2014/main" xmlns:p14="http://schemas.microsoft.com/office/powerpoint/2010/main" xmlns:a14="http://schemas.microsoft.com/office/drawing/2010/main" w="9525">
+                <a14:hiddenLine xmlns:a14="http://schemas.microsoft.com/office/drawing/2010/main" xmlns:p14="http://schemas.microsoft.com/office/powerpoint/2010/main" xmlns:a16="http://schemas.microsoft.com/office/drawing/2014/main" xmlns="" w="9525">
                   <a:solidFill>
                     <a:srgbClr val="000000"/>
                   </a:solidFill>
@@ -16903,7 +16903,7 @@
             </a:ln>
             <a:extLst>
               <a:ext uri="{91240B29-F687-4f45-9708-019B960494DF}">
-                <a14:hiddenLine xmlns="" xmlns:a16="http://schemas.microsoft.com/office/drawing/2014/main" xmlns:p14="http://schemas.microsoft.com/office/powerpoint/2010/main" xmlns:a14="http://schemas.microsoft.com/office/drawing/2010/main" w="9525">
+                <a14:hiddenLine xmlns:a14="http://schemas.microsoft.com/office/drawing/2010/main" xmlns:p14="http://schemas.microsoft.com/office/powerpoint/2010/main" xmlns:a16="http://schemas.microsoft.com/office/drawing/2014/main" xmlns="" w="9525">
                   <a:solidFill>
                     <a:srgbClr val="000000"/>
                   </a:solidFill>
@@ -17028,7 +17028,7 @@
             </a:ln>
             <a:extLst>
               <a:ext uri="{91240B29-F687-4f45-9708-019B960494DF}">
-                <a14:hiddenLine xmlns="" xmlns:a16="http://schemas.microsoft.com/office/drawing/2014/main" xmlns:p14="http://schemas.microsoft.com/office/powerpoint/2010/main" xmlns:a14="http://schemas.microsoft.com/office/drawing/2010/main" w="9525">
+                <a14:hiddenLine xmlns:a14="http://schemas.microsoft.com/office/drawing/2010/main" xmlns:p14="http://schemas.microsoft.com/office/powerpoint/2010/main" xmlns:a16="http://schemas.microsoft.com/office/drawing/2014/main" xmlns="" w="9525">
                   <a:solidFill>
                     <a:srgbClr val="000000"/>
                   </a:solidFill>
@@ -17142,7 +17142,7 @@
             </a:ln>
             <a:extLst>
               <a:ext uri="{91240B29-F687-4f45-9708-019B960494DF}">
-                <a14:hiddenLine xmlns="" xmlns:a16="http://schemas.microsoft.com/office/drawing/2014/main" xmlns:p14="http://schemas.microsoft.com/office/powerpoint/2010/main" xmlns:a14="http://schemas.microsoft.com/office/drawing/2010/main" w="9525">
+                <a14:hiddenLine xmlns:a14="http://schemas.microsoft.com/office/drawing/2010/main" xmlns:p14="http://schemas.microsoft.com/office/powerpoint/2010/main" xmlns:a16="http://schemas.microsoft.com/office/drawing/2014/main" xmlns="" w="9525">
                   <a:solidFill>
                     <a:srgbClr val="000000"/>
                   </a:solidFill>
@@ -17219,7 +17219,7 @@
             </a:ln>
             <a:extLst>
               <a:ext uri="{91240B29-F687-4f45-9708-019B960494DF}">
-                <a14:hiddenLine xmlns="" xmlns:a16="http://schemas.microsoft.com/office/drawing/2014/main" xmlns:p14="http://schemas.microsoft.com/office/powerpoint/2010/main" xmlns:a14="http://schemas.microsoft.com/office/drawing/2010/main" w="9525">
+                <a14:hiddenLine xmlns:a14="http://schemas.microsoft.com/office/drawing/2010/main" xmlns:p14="http://schemas.microsoft.com/office/powerpoint/2010/main" xmlns:a16="http://schemas.microsoft.com/office/drawing/2014/main" xmlns="" w="9525">
                   <a:solidFill>
                     <a:srgbClr val="000000"/>
                   </a:solidFill>
@@ -17296,7 +17296,7 @@
             </a:ln>
             <a:extLst>
               <a:ext uri="{91240B29-F687-4f45-9708-019B960494DF}">
-                <a14:hiddenLine xmlns="" xmlns:a16="http://schemas.microsoft.com/office/drawing/2014/main" xmlns:p14="http://schemas.microsoft.com/office/powerpoint/2010/main" xmlns:a14="http://schemas.microsoft.com/office/drawing/2010/main" w="9525">
+                <a14:hiddenLine xmlns:a14="http://schemas.microsoft.com/office/drawing/2010/main" xmlns:p14="http://schemas.microsoft.com/office/powerpoint/2010/main" xmlns:a16="http://schemas.microsoft.com/office/drawing/2014/main" xmlns="" w="9525">
                   <a:solidFill>
                     <a:srgbClr val="000000"/>
                   </a:solidFill>
@@ -17401,7 +17401,7 @@
             </a:ln>
             <a:extLst>
               <a:ext uri="{91240B29-F687-4f45-9708-019B960494DF}">
-                <a14:hiddenLine xmlns="" xmlns:a16="http://schemas.microsoft.com/office/drawing/2014/main" xmlns:p14="http://schemas.microsoft.com/office/powerpoint/2010/main" xmlns:a14="http://schemas.microsoft.com/office/drawing/2010/main" w="9525">
+                <a14:hiddenLine xmlns:a14="http://schemas.microsoft.com/office/drawing/2010/main" xmlns:p14="http://schemas.microsoft.com/office/powerpoint/2010/main" xmlns:a16="http://schemas.microsoft.com/office/drawing/2014/main" xmlns="" w="9525">
                   <a:solidFill>
                     <a:srgbClr val="000000"/>
                   </a:solidFill>
@@ -17450,7 +17450,7 @@
             </a:ln>
             <a:extLst>
               <a:ext uri="{91240B29-F687-4f45-9708-019B960494DF}">
-                <a14:hiddenLine xmlns="" xmlns:a16="http://schemas.microsoft.com/office/drawing/2014/main" xmlns:p14="http://schemas.microsoft.com/office/powerpoint/2010/main" xmlns:a14="http://schemas.microsoft.com/office/drawing/2010/main" w="9525">
+                <a14:hiddenLine xmlns:a14="http://schemas.microsoft.com/office/drawing/2010/main" xmlns:p14="http://schemas.microsoft.com/office/powerpoint/2010/main" xmlns:a16="http://schemas.microsoft.com/office/drawing/2014/main" xmlns="" w="9525">
                   <a:solidFill>
                     <a:srgbClr val="000000"/>
                   </a:solidFill>
@@ -17530,7 +17530,7 @@
             </a:ln>
             <a:extLst>
               <a:ext uri="{91240B29-F687-4f45-9708-019B960494DF}">
-                <a14:hiddenLine xmlns="" xmlns:a16="http://schemas.microsoft.com/office/drawing/2014/main" xmlns:p14="http://schemas.microsoft.com/office/powerpoint/2010/main" xmlns:a14="http://schemas.microsoft.com/office/drawing/2010/main" w="9525">
+                <a14:hiddenLine xmlns:a14="http://schemas.microsoft.com/office/drawing/2010/main" xmlns:p14="http://schemas.microsoft.com/office/powerpoint/2010/main" xmlns:a16="http://schemas.microsoft.com/office/drawing/2014/main" xmlns="" w="9525">
                   <a:solidFill>
                     <a:srgbClr val="000000"/>
                   </a:solidFill>
@@ -17635,7 +17635,7 @@
             </a:ln>
             <a:extLst>
               <a:ext uri="{91240B29-F687-4f45-9708-019B960494DF}">
-                <a14:hiddenLine xmlns="" xmlns:a16="http://schemas.microsoft.com/office/drawing/2014/main" xmlns:p14="http://schemas.microsoft.com/office/powerpoint/2010/main" xmlns:a14="http://schemas.microsoft.com/office/drawing/2010/main" w="9525">
+                <a14:hiddenLine xmlns:a14="http://schemas.microsoft.com/office/drawing/2010/main" xmlns:p14="http://schemas.microsoft.com/office/powerpoint/2010/main" xmlns:a16="http://schemas.microsoft.com/office/drawing/2014/main" xmlns="" w="9525">
                   <a:solidFill>
                     <a:srgbClr val="000000"/>
                   </a:solidFill>
@@ -17712,7 +17712,7 @@
             </a:ln>
             <a:extLst>
               <a:ext uri="{91240B29-F687-4f45-9708-019B960494DF}">
-                <a14:hiddenLine xmlns="" xmlns:a16="http://schemas.microsoft.com/office/drawing/2014/main" xmlns:p14="http://schemas.microsoft.com/office/powerpoint/2010/main" xmlns:a14="http://schemas.microsoft.com/office/drawing/2010/main" w="9525">
+                <a14:hiddenLine xmlns:a14="http://schemas.microsoft.com/office/drawing/2010/main" xmlns:p14="http://schemas.microsoft.com/office/powerpoint/2010/main" xmlns:a16="http://schemas.microsoft.com/office/drawing/2014/main" xmlns="" w="9525">
                   <a:solidFill>
                     <a:srgbClr val="000000"/>
                   </a:solidFill>
@@ -17817,7 +17817,7 @@
             </a:ln>
             <a:extLst>
               <a:ext uri="{91240B29-F687-4f45-9708-019B960494DF}">
-                <a14:hiddenLine xmlns="" xmlns:a16="http://schemas.microsoft.com/office/drawing/2014/main" xmlns:p14="http://schemas.microsoft.com/office/powerpoint/2010/main" xmlns:a14="http://schemas.microsoft.com/office/drawing/2010/main" w="9525">
+                <a14:hiddenLine xmlns:a14="http://schemas.microsoft.com/office/drawing/2010/main" xmlns:p14="http://schemas.microsoft.com/office/powerpoint/2010/main" xmlns:a16="http://schemas.microsoft.com/office/drawing/2014/main" xmlns="" w="9525">
                   <a:solidFill>
                     <a:srgbClr val="000000"/>
                   </a:solidFill>
@@ -17897,7 +17897,7 @@
             </a:ln>
             <a:extLst>
               <a:ext uri="{91240B29-F687-4f45-9708-019B960494DF}">
-                <a14:hiddenLine xmlns="" xmlns:a16="http://schemas.microsoft.com/office/drawing/2014/main" xmlns:p14="http://schemas.microsoft.com/office/powerpoint/2010/main" xmlns:a14="http://schemas.microsoft.com/office/drawing/2010/main" w="9525">
+                <a14:hiddenLine xmlns:a14="http://schemas.microsoft.com/office/drawing/2010/main" xmlns:p14="http://schemas.microsoft.com/office/powerpoint/2010/main" xmlns:a16="http://schemas.microsoft.com/office/drawing/2014/main" xmlns="" w="9525">
                   <a:solidFill>
                     <a:srgbClr val="000000"/>
                   </a:solidFill>
@@ -17974,7 +17974,7 @@
             </a:ln>
             <a:extLst>
               <a:ext uri="{91240B29-F687-4f45-9708-019B960494DF}">
-                <a14:hiddenLine xmlns="" xmlns:a16="http://schemas.microsoft.com/office/drawing/2014/main" xmlns:p14="http://schemas.microsoft.com/office/powerpoint/2010/main" xmlns:a14="http://schemas.microsoft.com/office/drawing/2010/main" w="9525">
+                <a14:hiddenLine xmlns:a14="http://schemas.microsoft.com/office/drawing/2010/main" xmlns:p14="http://schemas.microsoft.com/office/powerpoint/2010/main" xmlns:a16="http://schemas.microsoft.com/office/drawing/2014/main" xmlns="" w="9525">
                   <a:solidFill>
                     <a:srgbClr val="000000"/>
                   </a:solidFill>
@@ -18079,7 +18079,7 @@
             </a:ln>
             <a:extLst>
               <a:ext uri="{91240B29-F687-4f45-9708-019B960494DF}">
-                <a14:hiddenLine xmlns="" xmlns:a16="http://schemas.microsoft.com/office/drawing/2014/main" xmlns:p14="http://schemas.microsoft.com/office/powerpoint/2010/main" xmlns:a14="http://schemas.microsoft.com/office/drawing/2010/main" w="9525">
+                <a14:hiddenLine xmlns:a14="http://schemas.microsoft.com/office/drawing/2010/main" xmlns:p14="http://schemas.microsoft.com/office/powerpoint/2010/main" xmlns:a16="http://schemas.microsoft.com/office/drawing/2014/main" xmlns="" w="9525">
                   <a:solidFill>
                     <a:srgbClr val="000000"/>
                   </a:solidFill>
@@ -18184,7 +18184,7 @@
             </a:ln>
             <a:extLst>
               <a:ext uri="{91240B29-F687-4f45-9708-019B960494DF}">
-                <a14:hiddenLine xmlns="" xmlns:a16="http://schemas.microsoft.com/office/drawing/2014/main" xmlns:p14="http://schemas.microsoft.com/office/powerpoint/2010/main" xmlns:a14="http://schemas.microsoft.com/office/drawing/2010/main" w="9525">
+                <a14:hiddenLine xmlns:a14="http://schemas.microsoft.com/office/drawing/2010/main" xmlns:p14="http://schemas.microsoft.com/office/powerpoint/2010/main" xmlns:a16="http://schemas.microsoft.com/office/drawing/2014/main" xmlns="" w="9525">
                   <a:solidFill>
                     <a:srgbClr val="000000"/>
                   </a:solidFill>
@@ -18264,7 +18264,7 @@
             </a:ln>
             <a:extLst>
               <a:ext uri="{91240B29-F687-4f45-9708-019B960494DF}">
-                <a14:hiddenLine xmlns="" xmlns:a16="http://schemas.microsoft.com/office/drawing/2014/main" xmlns:p14="http://schemas.microsoft.com/office/powerpoint/2010/main" xmlns:a14="http://schemas.microsoft.com/office/drawing/2010/main" w="9525">
+                <a14:hiddenLine xmlns:a14="http://schemas.microsoft.com/office/drawing/2010/main" xmlns:p14="http://schemas.microsoft.com/office/powerpoint/2010/main" xmlns:a16="http://schemas.microsoft.com/office/drawing/2014/main" xmlns="" w="9525">
                   <a:solidFill>
                     <a:srgbClr val="000000"/>
                   </a:solidFill>
@@ -18399,7 +18399,7 @@
             </a:ln>
             <a:extLst>
               <a:ext uri="{91240B29-F687-4f45-9708-019B960494DF}">
-                <a14:hiddenLine xmlns="" xmlns:a16="http://schemas.microsoft.com/office/drawing/2014/main" xmlns:p14="http://schemas.microsoft.com/office/powerpoint/2010/main" xmlns:a14="http://schemas.microsoft.com/office/drawing/2010/main" w="9525">
+                <a14:hiddenLine xmlns:a14="http://schemas.microsoft.com/office/drawing/2010/main" xmlns:p14="http://schemas.microsoft.com/office/powerpoint/2010/main" xmlns:a16="http://schemas.microsoft.com/office/drawing/2014/main" xmlns="" w="9525">
                   <a:solidFill>
                     <a:srgbClr val="000000"/>
                   </a:solidFill>
@@ -18712,7 +18712,7 @@
             </a:ln>
             <a:extLst>
               <a:ext uri="{91240B29-F687-4f45-9708-019B960494DF}">
-                <a14:hiddenLine xmlns="" xmlns:a16="http://schemas.microsoft.com/office/drawing/2014/main" xmlns:p14="http://schemas.microsoft.com/office/powerpoint/2010/main" xmlns:a14="http://schemas.microsoft.com/office/drawing/2010/main" w="9525">
+                <a14:hiddenLine xmlns:a14="http://schemas.microsoft.com/office/drawing/2010/main" xmlns:p14="http://schemas.microsoft.com/office/powerpoint/2010/main" xmlns:a16="http://schemas.microsoft.com/office/drawing/2014/main" xmlns="" w="9525">
                   <a:solidFill>
                     <a:srgbClr val="000000"/>
                   </a:solidFill>
@@ -18842,7 +18842,7 @@
             </a:ln>
             <a:extLst>
               <a:ext uri="{91240B29-F687-4f45-9708-019B960494DF}">
-                <a14:hiddenLine xmlns="" xmlns:a16="http://schemas.microsoft.com/office/drawing/2014/main" xmlns:p14="http://schemas.microsoft.com/office/powerpoint/2010/main" xmlns:a14="http://schemas.microsoft.com/office/drawing/2010/main" w="9525">
+                <a14:hiddenLine xmlns:a14="http://schemas.microsoft.com/office/drawing/2010/main" xmlns:p14="http://schemas.microsoft.com/office/powerpoint/2010/main" xmlns:a16="http://schemas.microsoft.com/office/drawing/2014/main" xmlns="" w="9525">
                   <a:solidFill>
                     <a:srgbClr val="000000"/>
                   </a:solidFill>
@@ -18947,7 +18947,7 @@
             </a:ln>
             <a:extLst>
               <a:ext uri="{91240B29-F687-4f45-9708-019B960494DF}">
-                <a14:hiddenLine xmlns="" xmlns:a16="http://schemas.microsoft.com/office/drawing/2014/main" xmlns:p14="http://schemas.microsoft.com/office/powerpoint/2010/main" xmlns:a14="http://schemas.microsoft.com/office/drawing/2010/main" w="9525">
+                <a14:hiddenLine xmlns:a14="http://schemas.microsoft.com/office/drawing/2010/main" xmlns:p14="http://schemas.microsoft.com/office/powerpoint/2010/main" xmlns:a16="http://schemas.microsoft.com/office/drawing/2014/main" xmlns="" w="9525">
                   <a:solidFill>
                     <a:srgbClr val="000000"/>
                   </a:solidFill>
@@ -19027,7 +19027,7 @@
             </a:ln>
             <a:extLst>
               <a:ext uri="{91240B29-F687-4f45-9708-019B960494DF}">
-                <a14:hiddenLine xmlns="" xmlns:a16="http://schemas.microsoft.com/office/drawing/2014/main" xmlns:p14="http://schemas.microsoft.com/office/powerpoint/2010/main" xmlns:a14="http://schemas.microsoft.com/office/drawing/2010/main" w="9525">
+                <a14:hiddenLine xmlns:a14="http://schemas.microsoft.com/office/drawing/2010/main" xmlns:p14="http://schemas.microsoft.com/office/powerpoint/2010/main" xmlns:a16="http://schemas.microsoft.com/office/drawing/2014/main" xmlns="" w="9525">
                   <a:solidFill>
                     <a:srgbClr val="000000"/>
                   </a:solidFill>
@@ -19132,7 +19132,7 @@
             </a:ln>
             <a:extLst>
               <a:ext uri="{91240B29-F687-4f45-9708-019B960494DF}">
-                <a14:hiddenLine xmlns="" xmlns:a16="http://schemas.microsoft.com/office/drawing/2014/main" xmlns:p14="http://schemas.microsoft.com/office/powerpoint/2010/main" xmlns:a14="http://schemas.microsoft.com/office/drawing/2010/main" w="9525">
+                <a14:hiddenLine xmlns:a14="http://schemas.microsoft.com/office/drawing/2010/main" xmlns:p14="http://schemas.microsoft.com/office/powerpoint/2010/main" xmlns:a16="http://schemas.microsoft.com/office/drawing/2014/main" xmlns="" w="9525">
                   <a:solidFill>
                     <a:srgbClr val="000000"/>
                   </a:solidFill>
@@ -19215,7 +19215,7 @@
             </a:ln>
             <a:extLst>
               <a:ext uri="{91240B29-F687-4f45-9708-019B960494DF}">
-                <a14:hiddenLine xmlns="" xmlns:a16="http://schemas.microsoft.com/office/drawing/2014/main" xmlns:p14="http://schemas.microsoft.com/office/powerpoint/2010/main" xmlns:a14="http://schemas.microsoft.com/office/drawing/2010/main" w="9525">
+                <a14:hiddenLine xmlns:a14="http://schemas.microsoft.com/office/drawing/2010/main" xmlns:p14="http://schemas.microsoft.com/office/powerpoint/2010/main" xmlns:a16="http://schemas.microsoft.com/office/drawing/2014/main" xmlns="" w="9525">
                   <a:solidFill>
                     <a:srgbClr val="000000"/>
                   </a:solidFill>
@@ -19320,7 +19320,7 @@
             </a:ln>
             <a:extLst>
               <a:ext uri="{91240B29-F687-4f45-9708-019B960494DF}">
-                <a14:hiddenLine xmlns="" xmlns:a16="http://schemas.microsoft.com/office/drawing/2014/main" xmlns:p14="http://schemas.microsoft.com/office/powerpoint/2010/main" xmlns:a14="http://schemas.microsoft.com/office/drawing/2010/main" w="9525">
+                <a14:hiddenLine xmlns:a14="http://schemas.microsoft.com/office/drawing/2010/main" xmlns:p14="http://schemas.microsoft.com/office/powerpoint/2010/main" xmlns:a16="http://schemas.microsoft.com/office/drawing/2014/main" xmlns="" w="9525">
                   <a:solidFill>
                     <a:srgbClr val="000000"/>
                   </a:solidFill>
@@ -19403,7 +19403,7 @@
             </a:ln>
             <a:extLst>
               <a:ext uri="{91240B29-F687-4f45-9708-019B960494DF}">
-                <a14:hiddenLine xmlns="" xmlns:a16="http://schemas.microsoft.com/office/drawing/2014/main" xmlns:p14="http://schemas.microsoft.com/office/powerpoint/2010/main" xmlns:a14="http://schemas.microsoft.com/office/drawing/2010/main" w="9525">
+                <a14:hiddenLine xmlns:a14="http://schemas.microsoft.com/office/drawing/2010/main" xmlns:p14="http://schemas.microsoft.com/office/powerpoint/2010/main" xmlns:a16="http://schemas.microsoft.com/office/drawing/2014/main" xmlns="" w="9525">
                   <a:solidFill>
                     <a:srgbClr val="000000"/>
                   </a:solidFill>
@@ -19508,7 +19508,7 @@
             </a:ln>
             <a:extLst>
               <a:ext uri="{91240B29-F687-4f45-9708-019B960494DF}">
-                <a14:hiddenLine xmlns="" xmlns:a16="http://schemas.microsoft.com/office/drawing/2014/main" xmlns:p14="http://schemas.microsoft.com/office/powerpoint/2010/main" xmlns:a14="http://schemas.microsoft.com/office/drawing/2010/main" w="9525">
+                <a14:hiddenLine xmlns:a14="http://schemas.microsoft.com/office/drawing/2010/main" xmlns:p14="http://schemas.microsoft.com/office/powerpoint/2010/main" xmlns:a16="http://schemas.microsoft.com/office/drawing/2014/main" xmlns="" w="9525">
                   <a:solidFill>
                     <a:srgbClr val="000000"/>
                   </a:solidFill>
@@ -19557,7 +19557,7 @@
             </a:ln>
             <a:extLst>
               <a:ext uri="{91240B29-F687-4f45-9708-019B960494DF}">
-                <a14:hiddenLine xmlns="" xmlns:a16="http://schemas.microsoft.com/office/drawing/2014/main" xmlns:p14="http://schemas.microsoft.com/office/powerpoint/2010/main" xmlns:a14="http://schemas.microsoft.com/office/drawing/2010/main" w="9525">
+                <a14:hiddenLine xmlns:a14="http://schemas.microsoft.com/office/drawing/2010/main" xmlns:p14="http://schemas.microsoft.com/office/powerpoint/2010/main" xmlns:a16="http://schemas.microsoft.com/office/drawing/2014/main" xmlns="" w="9525">
                   <a:solidFill>
                     <a:srgbClr val="000000"/>
                   </a:solidFill>
@@ -19732,7 +19732,7 @@
           <a:noFill/>
           <a:extLst>
             <a:ext uri="{909E8E84-426E-40dd-AFC4-6F175D3DCCD1}">
-              <a14:hiddenFill xmlns:a14="http://schemas.microsoft.com/office/drawing/2010/main" xmlns:p14="http://schemas.microsoft.com/office/powerpoint/2010/main" xmlns:a16="http://schemas.microsoft.com/office/drawing/2014/main" xmlns="">
+              <a14:hiddenFill xmlns="" xmlns:a16="http://schemas.microsoft.com/office/drawing/2014/main" xmlns:p14="http://schemas.microsoft.com/office/powerpoint/2010/main" xmlns:a14="http://schemas.microsoft.com/office/drawing/2010/main">
                 <a:solidFill>
                   <a:srgbClr val="FFFFFF"/>
                 </a:solidFill>
@@ -19964,7 +19964,7 @@
             </a:ln>
             <a:extLst>
               <a:ext uri="{91240B29-F687-4f45-9708-019B960494DF}">
-                <a14:hiddenLine xmlns:a14="http://schemas.microsoft.com/office/drawing/2010/main" xmlns:p14="http://schemas.microsoft.com/office/powerpoint/2010/main" xmlns:a16="http://schemas.microsoft.com/office/drawing/2014/main" xmlns="" w="9525">
+                <a14:hiddenLine xmlns="" xmlns:a16="http://schemas.microsoft.com/office/drawing/2014/main" xmlns:p14="http://schemas.microsoft.com/office/powerpoint/2010/main" xmlns:a14="http://schemas.microsoft.com/office/drawing/2010/main" w="9525">
                   <a:solidFill>
                     <a:srgbClr val="000000"/>
                   </a:solidFill>
@@ -20069,7 +20069,7 @@
             </a:ln>
             <a:extLst>
               <a:ext uri="{91240B29-F687-4f45-9708-019B960494DF}">
-                <a14:hiddenLine xmlns:a14="http://schemas.microsoft.com/office/drawing/2010/main" xmlns:p14="http://schemas.microsoft.com/office/powerpoint/2010/main" xmlns:a16="http://schemas.microsoft.com/office/drawing/2014/main" xmlns="" w="9525">
+                <a14:hiddenLine xmlns="" xmlns:a16="http://schemas.microsoft.com/office/drawing/2014/main" xmlns:p14="http://schemas.microsoft.com/office/powerpoint/2010/main" xmlns:a14="http://schemas.microsoft.com/office/drawing/2010/main" w="9525">
                   <a:solidFill>
                     <a:srgbClr val="000000"/>
                   </a:solidFill>
@@ -20174,7 +20174,7 @@
             </a:ln>
             <a:extLst>
               <a:ext uri="{91240B29-F687-4f45-9708-019B960494DF}">
-                <a14:hiddenLine xmlns:a14="http://schemas.microsoft.com/office/drawing/2010/main" xmlns:p14="http://schemas.microsoft.com/office/powerpoint/2010/main" xmlns:a16="http://schemas.microsoft.com/office/drawing/2014/main" xmlns="" w="9525">
+                <a14:hiddenLine xmlns="" xmlns:a16="http://schemas.microsoft.com/office/drawing/2014/main" xmlns:p14="http://schemas.microsoft.com/office/powerpoint/2010/main" xmlns:a14="http://schemas.microsoft.com/office/drawing/2010/main" w="9525">
                   <a:solidFill>
                     <a:srgbClr val="000000"/>
                   </a:solidFill>
@@ -20251,7 +20251,7 @@
             </a:ln>
             <a:extLst>
               <a:ext uri="{91240B29-F687-4f45-9708-019B960494DF}">
-                <a14:hiddenLine xmlns:a14="http://schemas.microsoft.com/office/drawing/2010/main" xmlns:p14="http://schemas.microsoft.com/office/powerpoint/2010/main" xmlns:a16="http://schemas.microsoft.com/office/drawing/2014/main" xmlns="" w="9525">
+                <a14:hiddenLine xmlns="" xmlns:a16="http://schemas.microsoft.com/office/drawing/2014/main" xmlns:p14="http://schemas.microsoft.com/office/powerpoint/2010/main" xmlns:a14="http://schemas.microsoft.com/office/drawing/2010/main" w="9525">
                   <a:solidFill>
                     <a:srgbClr val="000000"/>
                   </a:solidFill>
@@ -20356,7 +20356,7 @@
             </a:ln>
             <a:extLst>
               <a:ext uri="{91240B29-F687-4f45-9708-019B960494DF}">
-                <a14:hiddenLine xmlns:a14="http://schemas.microsoft.com/office/drawing/2010/main" xmlns:p14="http://schemas.microsoft.com/office/powerpoint/2010/main" xmlns:a16="http://schemas.microsoft.com/office/drawing/2014/main" xmlns="" w="9525">
+                <a14:hiddenLine xmlns="" xmlns:a16="http://schemas.microsoft.com/office/drawing/2014/main" xmlns:p14="http://schemas.microsoft.com/office/powerpoint/2010/main" xmlns:a14="http://schemas.microsoft.com/office/drawing/2010/main" w="9525">
                   <a:solidFill>
                     <a:srgbClr val="000000"/>
                   </a:solidFill>
@@ -20433,7 +20433,7 @@
             </a:ln>
             <a:extLst>
               <a:ext uri="{91240B29-F687-4f45-9708-019B960494DF}">
-                <a14:hiddenLine xmlns:a14="http://schemas.microsoft.com/office/drawing/2010/main" xmlns:p14="http://schemas.microsoft.com/office/powerpoint/2010/main" xmlns:a16="http://schemas.microsoft.com/office/drawing/2014/main" xmlns="" w="9525">
+                <a14:hiddenLine xmlns="" xmlns:a16="http://schemas.microsoft.com/office/drawing/2014/main" xmlns:p14="http://schemas.microsoft.com/office/powerpoint/2010/main" xmlns:a14="http://schemas.microsoft.com/office/drawing/2010/main" w="9525">
                   <a:solidFill>
                     <a:srgbClr val="000000"/>
                   </a:solidFill>
@@ -20510,7 +20510,7 @@
             </a:ln>
             <a:extLst>
               <a:ext uri="{91240B29-F687-4f45-9708-019B960494DF}">
-                <a14:hiddenLine xmlns:a14="http://schemas.microsoft.com/office/drawing/2010/main" xmlns:p14="http://schemas.microsoft.com/office/powerpoint/2010/main" xmlns:a16="http://schemas.microsoft.com/office/drawing/2014/main" xmlns="" w="9525">
+                <a14:hiddenLine xmlns="" xmlns:a16="http://schemas.microsoft.com/office/drawing/2014/main" xmlns:p14="http://schemas.microsoft.com/office/powerpoint/2010/main" xmlns:a14="http://schemas.microsoft.com/office/drawing/2010/main" w="9525">
                   <a:solidFill>
                     <a:srgbClr val="000000"/>
                   </a:solidFill>
@@ -20615,7 +20615,7 @@
             </a:ln>
             <a:extLst>
               <a:ext uri="{91240B29-F687-4f45-9708-019B960494DF}">
-                <a14:hiddenLine xmlns:a14="http://schemas.microsoft.com/office/drawing/2010/main" xmlns:p14="http://schemas.microsoft.com/office/powerpoint/2010/main" xmlns:a16="http://schemas.microsoft.com/office/drawing/2014/main" xmlns="" w="9525">
+                <a14:hiddenLine xmlns="" xmlns:a16="http://schemas.microsoft.com/office/drawing/2014/main" xmlns:p14="http://schemas.microsoft.com/office/powerpoint/2010/main" xmlns:a14="http://schemas.microsoft.com/office/drawing/2010/main" w="9525">
                   <a:solidFill>
                     <a:srgbClr val="000000"/>
                   </a:solidFill>
@@ -20720,7 +20720,7 @@
             </a:ln>
             <a:extLst>
               <a:ext uri="{91240B29-F687-4f45-9708-019B960494DF}">
-                <a14:hiddenLine xmlns:a14="http://schemas.microsoft.com/office/drawing/2010/main" xmlns:p14="http://schemas.microsoft.com/office/powerpoint/2010/main" xmlns:a16="http://schemas.microsoft.com/office/drawing/2014/main" xmlns="" w="9525">
+                <a14:hiddenLine xmlns="" xmlns:a16="http://schemas.microsoft.com/office/drawing/2014/main" xmlns:p14="http://schemas.microsoft.com/office/powerpoint/2010/main" xmlns:a14="http://schemas.microsoft.com/office/drawing/2010/main" w="9525">
                   <a:solidFill>
                     <a:srgbClr val="000000"/>
                   </a:solidFill>
@@ -20797,7 +20797,7 @@
             </a:ln>
             <a:extLst>
               <a:ext uri="{91240B29-F687-4f45-9708-019B960494DF}">
-                <a14:hiddenLine xmlns:a14="http://schemas.microsoft.com/office/drawing/2010/main" xmlns:p14="http://schemas.microsoft.com/office/powerpoint/2010/main" xmlns:a16="http://schemas.microsoft.com/office/drawing/2014/main" xmlns="" w="9525">
+                <a14:hiddenLine xmlns="" xmlns:a16="http://schemas.microsoft.com/office/drawing/2014/main" xmlns:p14="http://schemas.microsoft.com/office/powerpoint/2010/main" xmlns:a14="http://schemas.microsoft.com/office/drawing/2010/main" w="9525">
                   <a:solidFill>
                     <a:srgbClr val="000000"/>
                   </a:solidFill>
@@ -20922,7 +20922,7 @@
             </a:ln>
             <a:extLst>
               <a:ext uri="{91240B29-F687-4f45-9708-019B960494DF}">
-                <a14:hiddenLine xmlns:a14="http://schemas.microsoft.com/office/drawing/2010/main" xmlns:p14="http://schemas.microsoft.com/office/powerpoint/2010/main" xmlns:a16="http://schemas.microsoft.com/office/drawing/2014/main" xmlns="" w="9525">
+                <a14:hiddenLine xmlns="" xmlns:a16="http://schemas.microsoft.com/office/drawing/2014/main" xmlns:p14="http://schemas.microsoft.com/office/powerpoint/2010/main" xmlns:a14="http://schemas.microsoft.com/office/drawing/2010/main" w="9525">
                   <a:solidFill>
                     <a:srgbClr val="000000"/>
                   </a:solidFill>
@@ -21036,7 +21036,7 @@
             </a:ln>
             <a:extLst>
               <a:ext uri="{91240B29-F687-4f45-9708-019B960494DF}">
-                <a14:hiddenLine xmlns:a14="http://schemas.microsoft.com/office/drawing/2010/main" xmlns:p14="http://schemas.microsoft.com/office/powerpoint/2010/main" xmlns:a16="http://schemas.microsoft.com/office/drawing/2014/main" xmlns="" w="9525">
+                <a14:hiddenLine xmlns="" xmlns:a16="http://schemas.microsoft.com/office/drawing/2014/main" xmlns:p14="http://schemas.microsoft.com/office/powerpoint/2010/main" xmlns:a14="http://schemas.microsoft.com/office/drawing/2010/main" w="9525">
                   <a:solidFill>
                     <a:srgbClr val="000000"/>
                   </a:solidFill>
@@ -21113,7 +21113,7 @@
             </a:ln>
             <a:extLst>
               <a:ext uri="{91240B29-F687-4f45-9708-019B960494DF}">
-                <a14:hiddenLine xmlns:a14="http://schemas.microsoft.com/office/drawing/2010/main" xmlns:p14="http://schemas.microsoft.com/office/powerpoint/2010/main" xmlns:a16="http://schemas.microsoft.com/office/drawing/2014/main" xmlns="" w="9525">
+                <a14:hiddenLine xmlns="" xmlns:a16="http://schemas.microsoft.com/office/drawing/2014/main" xmlns:p14="http://schemas.microsoft.com/office/powerpoint/2010/main" xmlns:a14="http://schemas.microsoft.com/office/drawing/2010/main" w="9525">
                   <a:solidFill>
                     <a:srgbClr val="000000"/>
                   </a:solidFill>
@@ -21190,7 +21190,7 @@
             </a:ln>
             <a:extLst>
               <a:ext uri="{91240B29-F687-4f45-9708-019B960494DF}">
-                <a14:hiddenLine xmlns:a14="http://schemas.microsoft.com/office/drawing/2010/main" xmlns:p14="http://schemas.microsoft.com/office/powerpoint/2010/main" xmlns:a16="http://schemas.microsoft.com/office/drawing/2014/main" xmlns="" w="9525">
+                <a14:hiddenLine xmlns="" xmlns:a16="http://schemas.microsoft.com/office/drawing/2014/main" xmlns:p14="http://schemas.microsoft.com/office/powerpoint/2010/main" xmlns:a14="http://schemas.microsoft.com/office/drawing/2010/main" w="9525">
                   <a:solidFill>
                     <a:srgbClr val="000000"/>
                   </a:solidFill>
@@ -21295,7 +21295,7 @@
             </a:ln>
             <a:extLst>
               <a:ext uri="{91240B29-F687-4f45-9708-019B960494DF}">
-                <a14:hiddenLine xmlns:a14="http://schemas.microsoft.com/office/drawing/2010/main" xmlns:p14="http://schemas.microsoft.com/office/powerpoint/2010/main" xmlns:a16="http://schemas.microsoft.com/office/drawing/2014/main" xmlns="" w="9525">
+                <a14:hiddenLine xmlns="" xmlns:a16="http://schemas.microsoft.com/office/drawing/2014/main" xmlns:p14="http://schemas.microsoft.com/office/powerpoint/2010/main" xmlns:a14="http://schemas.microsoft.com/office/drawing/2010/main" w="9525">
                   <a:solidFill>
                     <a:srgbClr val="000000"/>
                   </a:solidFill>
@@ -21344,7 +21344,7 @@
             </a:ln>
             <a:extLst>
               <a:ext uri="{91240B29-F687-4f45-9708-019B960494DF}">
-                <a14:hiddenLine xmlns:a14="http://schemas.microsoft.com/office/drawing/2010/main" xmlns:p14="http://schemas.microsoft.com/office/powerpoint/2010/main" xmlns:a16="http://schemas.microsoft.com/office/drawing/2014/main" xmlns="" w="9525">
+                <a14:hiddenLine xmlns="" xmlns:a16="http://schemas.microsoft.com/office/drawing/2014/main" xmlns:p14="http://schemas.microsoft.com/office/powerpoint/2010/main" xmlns:a14="http://schemas.microsoft.com/office/drawing/2010/main" w="9525">
                   <a:solidFill>
                     <a:srgbClr val="000000"/>
                   </a:solidFill>
@@ -21424,7 +21424,7 @@
             </a:ln>
             <a:extLst>
               <a:ext uri="{91240B29-F687-4f45-9708-019B960494DF}">
-                <a14:hiddenLine xmlns:a14="http://schemas.microsoft.com/office/drawing/2010/main" xmlns:p14="http://schemas.microsoft.com/office/powerpoint/2010/main" xmlns:a16="http://schemas.microsoft.com/office/drawing/2014/main" xmlns="" w="9525">
+                <a14:hiddenLine xmlns="" xmlns:a16="http://schemas.microsoft.com/office/drawing/2014/main" xmlns:p14="http://schemas.microsoft.com/office/powerpoint/2010/main" xmlns:a14="http://schemas.microsoft.com/office/drawing/2010/main" w="9525">
                   <a:solidFill>
                     <a:srgbClr val="000000"/>
                   </a:solidFill>
@@ -21529,7 +21529,7 @@
             </a:ln>
             <a:extLst>
               <a:ext uri="{91240B29-F687-4f45-9708-019B960494DF}">
-                <a14:hiddenLine xmlns:a14="http://schemas.microsoft.com/office/drawing/2010/main" xmlns:p14="http://schemas.microsoft.com/office/powerpoint/2010/main" xmlns:a16="http://schemas.microsoft.com/office/drawing/2014/main" xmlns="" w="9525">
+                <a14:hiddenLine xmlns="" xmlns:a16="http://schemas.microsoft.com/office/drawing/2014/main" xmlns:p14="http://schemas.microsoft.com/office/powerpoint/2010/main" xmlns:a14="http://schemas.microsoft.com/office/drawing/2010/main" w="9525">
                   <a:solidFill>
                     <a:srgbClr val="000000"/>
                   </a:solidFill>
@@ -21606,7 +21606,7 @@
             </a:ln>
             <a:extLst>
               <a:ext uri="{91240B29-F687-4f45-9708-019B960494DF}">
-                <a14:hiddenLine xmlns:a14="http://schemas.microsoft.com/office/drawing/2010/main" xmlns:p14="http://schemas.microsoft.com/office/powerpoint/2010/main" xmlns:a16="http://schemas.microsoft.com/office/drawing/2014/main" xmlns="" w="9525">
+                <a14:hiddenLine xmlns="" xmlns:a16="http://schemas.microsoft.com/office/drawing/2014/main" xmlns:p14="http://schemas.microsoft.com/office/powerpoint/2010/main" xmlns:a14="http://schemas.microsoft.com/office/drawing/2010/main" w="9525">
                   <a:solidFill>
                     <a:srgbClr val="000000"/>
                   </a:solidFill>
@@ -21711,7 +21711,7 @@
             </a:ln>
             <a:extLst>
               <a:ext uri="{91240B29-F687-4f45-9708-019B960494DF}">
-                <a14:hiddenLine xmlns:a14="http://schemas.microsoft.com/office/drawing/2010/main" xmlns:p14="http://schemas.microsoft.com/office/powerpoint/2010/main" xmlns:a16="http://schemas.microsoft.com/office/drawing/2014/main" xmlns="" w="9525">
+                <a14:hiddenLine xmlns="" xmlns:a16="http://schemas.microsoft.com/office/drawing/2014/main" xmlns:p14="http://schemas.microsoft.com/office/powerpoint/2010/main" xmlns:a14="http://schemas.microsoft.com/office/drawing/2010/main" w="9525">
                   <a:solidFill>
                     <a:srgbClr val="000000"/>
                   </a:solidFill>
@@ -21791,7 +21791,7 @@
             </a:ln>
             <a:extLst>
               <a:ext uri="{91240B29-F687-4f45-9708-019B960494DF}">
-                <a14:hiddenLine xmlns:a14="http://schemas.microsoft.com/office/drawing/2010/main" xmlns:p14="http://schemas.microsoft.com/office/powerpoint/2010/main" xmlns:a16="http://schemas.microsoft.com/office/drawing/2014/main" xmlns="" w="9525">
+                <a14:hiddenLine xmlns="" xmlns:a16="http://schemas.microsoft.com/office/drawing/2014/main" xmlns:p14="http://schemas.microsoft.com/office/powerpoint/2010/main" xmlns:a14="http://schemas.microsoft.com/office/drawing/2010/main" w="9525">
                   <a:solidFill>
                     <a:srgbClr val="000000"/>
                   </a:solidFill>
@@ -21868,7 +21868,7 @@
             </a:ln>
             <a:extLst>
               <a:ext uri="{91240B29-F687-4f45-9708-019B960494DF}">
-                <a14:hiddenLine xmlns:a14="http://schemas.microsoft.com/office/drawing/2010/main" xmlns:p14="http://schemas.microsoft.com/office/powerpoint/2010/main" xmlns:a16="http://schemas.microsoft.com/office/drawing/2014/main" xmlns="" w="9525">
+                <a14:hiddenLine xmlns="" xmlns:a16="http://schemas.microsoft.com/office/drawing/2014/main" xmlns:p14="http://schemas.microsoft.com/office/powerpoint/2010/main" xmlns:a14="http://schemas.microsoft.com/office/drawing/2010/main" w="9525">
                   <a:solidFill>
                     <a:srgbClr val="000000"/>
                   </a:solidFill>
@@ -21973,7 +21973,7 @@
             </a:ln>
             <a:extLst>
               <a:ext uri="{91240B29-F687-4f45-9708-019B960494DF}">
-                <a14:hiddenLine xmlns:a14="http://schemas.microsoft.com/office/drawing/2010/main" xmlns:p14="http://schemas.microsoft.com/office/powerpoint/2010/main" xmlns:a16="http://schemas.microsoft.com/office/drawing/2014/main" xmlns="" w="9525">
+                <a14:hiddenLine xmlns="" xmlns:a16="http://schemas.microsoft.com/office/drawing/2014/main" xmlns:p14="http://schemas.microsoft.com/office/powerpoint/2010/main" xmlns:a14="http://schemas.microsoft.com/office/drawing/2010/main" w="9525">
                   <a:solidFill>
                     <a:srgbClr val="000000"/>
                   </a:solidFill>
@@ -22078,7 +22078,7 @@
             </a:ln>
             <a:extLst>
               <a:ext uri="{91240B29-F687-4f45-9708-019B960494DF}">
-                <a14:hiddenLine xmlns:a14="http://schemas.microsoft.com/office/drawing/2010/main" xmlns:p14="http://schemas.microsoft.com/office/powerpoint/2010/main" xmlns:a16="http://schemas.microsoft.com/office/drawing/2014/main" xmlns="" w="9525">
+                <a14:hiddenLine xmlns="" xmlns:a16="http://schemas.microsoft.com/office/drawing/2014/main" xmlns:p14="http://schemas.microsoft.com/office/powerpoint/2010/main" xmlns:a14="http://schemas.microsoft.com/office/drawing/2010/main" w="9525">
                   <a:solidFill>
                     <a:srgbClr val="000000"/>
                   </a:solidFill>
@@ -22158,7 +22158,7 @@
             </a:ln>
             <a:extLst>
               <a:ext uri="{91240B29-F687-4f45-9708-019B960494DF}">
-                <a14:hiddenLine xmlns:a14="http://schemas.microsoft.com/office/drawing/2010/main" xmlns:p14="http://schemas.microsoft.com/office/powerpoint/2010/main" xmlns:a16="http://schemas.microsoft.com/office/drawing/2014/main" xmlns="" w="9525">
+                <a14:hiddenLine xmlns="" xmlns:a16="http://schemas.microsoft.com/office/drawing/2014/main" xmlns:p14="http://schemas.microsoft.com/office/powerpoint/2010/main" xmlns:a14="http://schemas.microsoft.com/office/drawing/2010/main" w="9525">
                   <a:solidFill>
                     <a:srgbClr val="000000"/>
                   </a:solidFill>
@@ -22293,7 +22293,7 @@
             </a:ln>
             <a:extLst>
               <a:ext uri="{91240B29-F687-4f45-9708-019B960494DF}">
-                <a14:hiddenLine xmlns:a14="http://schemas.microsoft.com/office/drawing/2010/main" xmlns:p14="http://schemas.microsoft.com/office/powerpoint/2010/main" xmlns:a16="http://schemas.microsoft.com/office/drawing/2014/main" xmlns="" w="9525">
+                <a14:hiddenLine xmlns="" xmlns:a16="http://schemas.microsoft.com/office/drawing/2014/main" xmlns:p14="http://schemas.microsoft.com/office/powerpoint/2010/main" xmlns:a14="http://schemas.microsoft.com/office/drawing/2010/main" w="9525">
                   <a:solidFill>
                     <a:srgbClr val="000000"/>
                   </a:solidFill>
@@ -22899,7 +22899,7 @@
             </a:ln>
             <a:extLst>
               <a:ext uri="{91240B29-F687-4f45-9708-019B960494DF}">
-                <a14:hiddenLine xmlns:a14="http://schemas.microsoft.com/office/drawing/2010/main" xmlns:p14="http://schemas.microsoft.com/office/powerpoint/2010/main" xmlns:a16="http://schemas.microsoft.com/office/drawing/2014/main" xmlns="" w="9525">
+                <a14:hiddenLine xmlns="" xmlns:a16="http://schemas.microsoft.com/office/drawing/2014/main" xmlns:p14="http://schemas.microsoft.com/office/powerpoint/2010/main" xmlns:a14="http://schemas.microsoft.com/office/drawing/2010/main" w="9525">
                   <a:solidFill>
                     <a:srgbClr val="000000"/>
                   </a:solidFill>
@@ -23004,7 +23004,7 @@
             </a:ln>
             <a:extLst>
               <a:ext uri="{91240B29-F687-4f45-9708-019B960494DF}">
-                <a14:hiddenLine xmlns:a14="http://schemas.microsoft.com/office/drawing/2010/main" xmlns:p14="http://schemas.microsoft.com/office/powerpoint/2010/main" xmlns:a16="http://schemas.microsoft.com/office/drawing/2014/main" xmlns="" w="9525">
+                <a14:hiddenLine xmlns="" xmlns:a16="http://schemas.microsoft.com/office/drawing/2014/main" xmlns:p14="http://schemas.microsoft.com/office/powerpoint/2010/main" xmlns:a14="http://schemas.microsoft.com/office/drawing/2010/main" w="9525">
                   <a:solidFill>
                     <a:srgbClr val="000000"/>
                   </a:solidFill>
@@ -23109,7 +23109,7 @@
             </a:ln>
             <a:extLst>
               <a:ext uri="{91240B29-F687-4f45-9708-019B960494DF}">
-                <a14:hiddenLine xmlns:a14="http://schemas.microsoft.com/office/drawing/2010/main" xmlns:p14="http://schemas.microsoft.com/office/powerpoint/2010/main" xmlns:a16="http://schemas.microsoft.com/office/drawing/2014/main" xmlns="" w="9525">
+                <a14:hiddenLine xmlns="" xmlns:a16="http://schemas.microsoft.com/office/drawing/2014/main" xmlns:p14="http://schemas.microsoft.com/office/powerpoint/2010/main" xmlns:a14="http://schemas.microsoft.com/office/drawing/2010/main" w="9525">
                   <a:solidFill>
                     <a:srgbClr val="000000"/>
                   </a:solidFill>
@@ -23186,7 +23186,7 @@
             </a:ln>
             <a:extLst>
               <a:ext uri="{91240B29-F687-4f45-9708-019B960494DF}">
-                <a14:hiddenLine xmlns:a14="http://schemas.microsoft.com/office/drawing/2010/main" xmlns:p14="http://schemas.microsoft.com/office/powerpoint/2010/main" xmlns:a16="http://schemas.microsoft.com/office/drawing/2014/main" xmlns="" w="9525">
+                <a14:hiddenLine xmlns="" xmlns:a16="http://schemas.microsoft.com/office/drawing/2014/main" xmlns:p14="http://schemas.microsoft.com/office/powerpoint/2010/main" xmlns:a14="http://schemas.microsoft.com/office/drawing/2010/main" w="9525">
                   <a:solidFill>
                     <a:srgbClr val="000000"/>
                   </a:solidFill>
@@ -23291,7 +23291,7 @@
             </a:ln>
             <a:extLst>
               <a:ext uri="{91240B29-F687-4f45-9708-019B960494DF}">
-                <a14:hiddenLine xmlns:a14="http://schemas.microsoft.com/office/drawing/2010/main" xmlns:p14="http://schemas.microsoft.com/office/powerpoint/2010/main" xmlns:a16="http://schemas.microsoft.com/office/drawing/2014/main" xmlns="" w="9525">
+                <a14:hiddenLine xmlns="" xmlns:a16="http://schemas.microsoft.com/office/drawing/2014/main" xmlns:p14="http://schemas.microsoft.com/office/powerpoint/2010/main" xmlns:a14="http://schemas.microsoft.com/office/drawing/2010/main" w="9525">
                   <a:solidFill>
                     <a:srgbClr val="000000"/>
                   </a:solidFill>
@@ -23368,7 +23368,7 @@
             </a:ln>
             <a:extLst>
               <a:ext uri="{91240B29-F687-4f45-9708-019B960494DF}">
-                <a14:hiddenLine xmlns:a14="http://schemas.microsoft.com/office/drawing/2010/main" xmlns:p14="http://schemas.microsoft.com/office/powerpoint/2010/main" xmlns:a16="http://schemas.microsoft.com/office/drawing/2014/main" xmlns="" w="9525">
+                <a14:hiddenLine xmlns="" xmlns:a16="http://schemas.microsoft.com/office/drawing/2014/main" xmlns:p14="http://schemas.microsoft.com/office/powerpoint/2010/main" xmlns:a14="http://schemas.microsoft.com/office/drawing/2010/main" w="9525">
                   <a:solidFill>
                     <a:srgbClr val="000000"/>
                   </a:solidFill>
@@ -23445,7 +23445,7 @@
             </a:ln>
             <a:extLst>
               <a:ext uri="{91240B29-F687-4f45-9708-019B960494DF}">
-                <a14:hiddenLine xmlns:a14="http://schemas.microsoft.com/office/drawing/2010/main" xmlns:p14="http://schemas.microsoft.com/office/powerpoint/2010/main" xmlns:a16="http://schemas.microsoft.com/office/drawing/2014/main" xmlns="" w="9525">
+                <a14:hiddenLine xmlns="" xmlns:a16="http://schemas.microsoft.com/office/drawing/2014/main" xmlns:p14="http://schemas.microsoft.com/office/powerpoint/2010/main" xmlns:a14="http://schemas.microsoft.com/office/drawing/2010/main" w="9525">
                   <a:solidFill>
                     <a:srgbClr val="000000"/>
                   </a:solidFill>
@@ -23550,7 +23550,7 @@
             </a:ln>
             <a:extLst>
               <a:ext uri="{91240B29-F687-4f45-9708-019B960494DF}">
-                <a14:hiddenLine xmlns:a14="http://schemas.microsoft.com/office/drawing/2010/main" xmlns:p14="http://schemas.microsoft.com/office/powerpoint/2010/main" xmlns:a16="http://schemas.microsoft.com/office/drawing/2014/main" xmlns="" w="9525">
+                <a14:hiddenLine xmlns="" xmlns:a16="http://schemas.microsoft.com/office/drawing/2014/main" xmlns:p14="http://schemas.microsoft.com/office/powerpoint/2010/main" xmlns:a14="http://schemas.microsoft.com/office/drawing/2010/main" w="9525">
                   <a:solidFill>
                     <a:srgbClr val="000000"/>
                   </a:solidFill>
@@ -23655,7 +23655,7 @@
             </a:ln>
             <a:extLst>
               <a:ext uri="{91240B29-F687-4f45-9708-019B960494DF}">
-                <a14:hiddenLine xmlns:a14="http://schemas.microsoft.com/office/drawing/2010/main" xmlns:p14="http://schemas.microsoft.com/office/powerpoint/2010/main" xmlns:a16="http://schemas.microsoft.com/office/drawing/2014/main" xmlns="" w="9525">
+                <a14:hiddenLine xmlns="" xmlns:a16="http://schemas.microsoft.com/office/drawing/2014/main" xmlns:p14="http://schemas.microsoft.com/office/powerpoint/2010/main" xmlns:a14="http://schemas.microsoft.com/office/drawing/2010/main" w="9525">
                   <a:solidFill>
                     <a:srgbClr val="000000"/>
                   </a:solidFill>
@@ -23732,7 +23732,7 @@
             </a:ln>
             <a:extLst>
               <a:ext uri="{91240B29-F687-4f45-9708-019B960494DF}">
-                <a14:hiddenLine xmlns:a14="http://schemas.microsoft.com/office/drawing/2010/main" xmlns:p14="http://schemas.microsoft.com/office/powerpoint/2010/main" xmlns:a16="http://schemas.microsoft.com/office/drawing/2014/main" xmlns="" w="9525">
+                <a14:hiddenLine xmlns="" xmlns:a16="http://schemas.microsoft.com/office/drawing/2014/main" xmlns:p14="http://schemas.microsoft.com/office/powerpoint/2010/main" xmlns:a14="http://schemas.microsoft.com/office/drawing/2010/main" w="9525">
                   <a:solidFill>
                     <a:srgbClr val="000000"/>
                   </a:solidFill>
@@ -23857,7 +23857,7 @@
             </a:ln>
             <a:extLst>
               <a:ext uri="{91240B29-F687-4f45-9708-019B960494DF}">
-                <a14:hiddenLine xmlns:a14="http://schemas.microsoft.com/office/drawing/2010/main" xmlns:p14="http://schemas.microsoft.com/office/powerpoint/2010/main" xmlns:a16="http://schemas.microsoft.com/office/drawing/2014/main" xmlns="" w="9525">
+                <a14:hiddenLine xmlns="" xmlns:a16="http://schemas.microsoft.com/office/drawing/2014/main" xmlns:p14="http://schemas.microsoft.com/office/powerpoint/2010/main" xmlns:a14="http://schemas.microsoft.com/office/drawing/2010/main" w="9525">
                   <a:solidFill>
                     <a:srgbClr val="000000"/>
                   </a:solidFill>
@@ -23971,7 +23971,7 @@
             </a:ln>
             <a:extLst>
               <a:ext uri="{91240B29-F687-4f45-9708-019B960494DF}">
-                <a14:hiddenLine xmlns:a14="http://schemas.microsoft.com/office/drawing/2010/main" xmlns:p14="http://schemas.microsoft.com/office/powerpoint/2010/main" xmlns:a16="http://schemas.microsoft.com/office/drawing/2014/main" xmlns="" w="9525">
+                <a14:hiddenLine xmlns="" xmlns:a16="http://schemas.microsoft.com/office/drawing/2014/main" xmlns:p14="http://schemas.microsoft.com/office/powerpoint/2010/main" xmlns:a14="http://schemas.microsoft.com/office/drawing/2010/main" w="9525">
                   <a:solidFill>
                     <a:srgbClr val="000000"/>
                   </a:solidFill>
@@ -24048,7 +24048,7 @@
             </a:ln>
             <a:extLst>
               <a:ext uri="{91240B29-F687-4f45-9708-019B960494DF}">
-                <a14:hiddenLine xmlns:a14="http://schemas.microsoft.com/office/drawing/2010/main" xmlns:p14="http://schemas.microsoft.com/office/powerpoint/2010/main" xmlns:a16="http://schemas.microsoft.com/office/drawing/2014/main" xmlns="" w="9525">
+                <a14:hiddenLine xmlns="" xmlns:a16="http://schemas.microsoft.com/office/drawing/2014/main" xmlns:p14="http://schemas.microsoft.com/office/powerpoint/2010/main" xmlns:a14="http://schemas.microsoft.com/office/drawing/2010/main" w="9525">
                   <a:solidFill>
                     <a:srgbClr val="000000"/>
                   </a:solidFill>
@@ -24125,7 +24125,7 @@
             </a:ln>
             <a:extLst>
               <a:ext uri="{91240B29-F687-4f45-9708-019B960494DF}">
-                <a14:hiddenLine xmlns:a14="http://schemas.microsoft.com/office/drawing/2010/main" xmlns:p14="http://schemas.microsoft.com/office/powerpoint/2010/main" xmlns:a16="http://schemas.microsoft.com/office/drawing/2014/main" xmlns="" w="9525">
+                <a14:hiddenLine xmlns="" xmlns:a16="http://schemas.microsoft.com/office/drawing/2014/main" xmlns:p14="http://schemas.microsoft.com/office/powerpoint/2010/main" xmlns:a14="http://schemas.microsoft.com/office/drawing/2010/main" w="9525">
                   <a:solidFill>
                     <a:srgbClr val="000000"/>
                   </a:solidFill>
@@ -24230,7 +24230,7 @@
             </a:ln>
             <a:extLst>
               <a:ext uri="{91240B29-F687-4f45-9708-019B960494DF}">
-                <a14:hiddenLine xmlns:a14="http://schemas.microsoft.com/office/drawing/2010/main" xmlns:p14="http://schemas.microsoft.com/office/powerpoint/2010/main" xmlns:a16="http://schemas.microsoft.com/office/drawing/2014/main" xmlns="" w="9525">
+                <a14:hiddenLine xmlns="" xmlns:a16="http://schemas.microsoft.com/office/drawing/2014/main" xmlns:p14="http://schemas.microsoft.com/office/powerpoint/2010/main" xmlns:a14="http://schemas.microsoft.com/office/drawing/2010/main" w="9525">
                   <a:solidFill>
                     <a:srgbClr val="000000"/>
                   </a:solidFill>
@@ -24279,7 +24279,7 @@
             </a:ln>
             <a:extLst>
               <a:ext uri="{91240B29-F687-4f45-9708-019B960494DF}">
-                <a14:hiddenLine xmlns:a14="http://schemas.microsoft.com/office/drawing/2010/main" xmlns:p14="http://schemas.microsoft.com/office/powerpoint/2010/main" xmlns:a16="http://schemas.microsoft.com/office/drawing/2014/main" xmlns="" w="9525">
+                <a14:hiddenLine xmlns="" xmlns:a16="http://schemas.microsoft.com/office/drawing/2014/main" xmlns:p14="http://schemas.microsoft.com/office/powerpoint/2010/main" xmlns:a14="http://schemas.microsoft.com/office/drawing/2010/main" w="9525">
                   <a:solidFill>
                     <a:srgbClr val="000000"/>
                   </a:solidFill>
@@ -24359,7 +24359,7 @@
             </a:ln>
             <a:extLst>
               <a:ext uri="{91240B29-F687-4f45-9708-019B960494DF}">
-                <a14:hiddenLine xmlns:a14="http://schemas.microsoft.com/office/drawing/2010/main" xmlns:p14="http://schemas.microsoft.com/office/powerpoint/2010/main" xmlns:a16="http://schemas.microsoft.com/office/drawing/2014/main" xmlns="" w="9525">
+                <a14:hiddenLine xmlns="" xmlns:a16="http://schemas.microsoft.com/office/drawing/2014/main" xmlns:p14="http://schemas.microsoft.com/office/powerpoint/2010/main" xmlns:a14="http://schemas.microsoft.com/office/drawing/2010/main" w="9525">
                   <a:solidFill>
                     <a:srgbClr val="000000"/>
                   </a:solidFill>
@@ -24464,7 +24464,7 @@
             </a:ln>
             <a:extLst>
               <a:ext uri="{91240B29-F687-4f45-9708-019B960494DF}">
-                <a14:hiddenLine xmlns:a14="http://schemas.microsoft.com/office/drawing/2010/main" xmlns:p14="http://schemas.microsoft.com/office/powerpoint/2010/main" xmlns:a16="http://schemas.microsoft.com/office/drawing/2014/main" xmlns="" w="9525">
+                <a14:hiddenLine xmlns="" xmlns:a16="http://schemas.microsoft.com/office/drawing/2014/main" xmlns:p14="http://schemas.microsoft.com/office/powerpoint/2010/main" xmlns:a14="http://schemas.microsoft.com/office/drawing/2010/main" w="9525">
                   <a:solidFill>
                     <a:srgbClr val="000000"/>
                   </a:solidFill>
@@ -24541,7 +24541,7 @@
             </a:ln>
             <a:extLst>
               <a:ext uri="{91240B29-F687-4f45-9708-019B960494DF}">
-                <a14:hiddenLine xmlns:a14="http://schemas.microsoft.com/office/drawing/2010/main" xmlns:p14="http://schemas.microsoft.com/office/powerpoint/2010/main" xmlns:a16="http://schemas.microsoft.com/office/drawing/2014/main" xmlns="" w="9525">
+                <a14:hiddenLine xmlns="" xmlns:a16="http://schemas.microsoft.com/office/drawing/2014/main" xmlns:p14="http://schemas.microsoft.com/office/powerpoint/2010/main" xmlns:a14="http://schemas.microsoft.com/office/drawing/2010/main" w="9525">
                   <a:solidFill>
                     <a:srgbClr val="000000"/>
                   </a:solidFill>
@@ -24646,7 +24646,7 @@
             </a:ln>
             <a:extLst>
               <a:ext uri="{91240B29-F687-4f45-9708-019B960494DF}">
-                <a14:hiddenLine xmlns:a14="http://schemas.microsoft.com/office/drawing/2010/main" xmlns:p14="http://schemas.microsoft.com/office/powerpoint/2010/main" xmlns:a16="http://schemas.microsoft.com/office/drawing/2014/main" xmlns="" w="9525">
+                <a14:hiddenLine xmlns="" xmlns:a16="http://schemas.microsoft.com/office/drawing/2014/main" xmlns:p14="http://schemas.microsoft.com/office/powerpoint/2010/main" xmlns:a14="http://schemas.microsoft.com/office/drawing/2010/main" w="9525">
                   <a:solidFill>
                     <a:srgbClr val="000000"/>
                   </a:solidFill>
@@ -24726,7 +24726,7 @@
             </a:ln>
             <a:extLst>
               <a:ext uri="{91240B29-F687-4f45-9708-019B960494DF}">
-                <a14:hiddenLine xmlns:a14="http://schemas.microsoft.com/office/drawing/2010/main" xmlns:p14="http://schemas.microsoft.com/office/powerpoint/2010/main" xmlns:a16="http://schemas.microsoft.com/office/drawing/2014/main" xmlns="" w="9525">
+                <a14:hiddenLine xmlns="" xmlns:a16="http://schemas.microsoft.com/office/drawing/2014/main" xmlns:p14="http://schemas.microsoft.com/office/powerpoint/2010/main" xmlns:a14="http://schemas.microsoft.com/office/drawing/2010/main" w="9525">
                   <a:solidFill>
                     <a:srgbClr val="000000"/>
                   </a:solidFill>
@@ -24803,7 +24803,7 @@
             </a:ln>
             <a:extLst>
               <a:ext uri="{91240B29-F687-4f45-9708-019B960494DF}">
-                <a14:hiddenLine xmlns:a14="http://schemas.microsoft.com/office/drawing/2010/main" xmlns:p14="http://schemas.microsoft.com/office/powerpoint/2010/main" xmlns:a16="http://schemas.microsoft.com/office/drawing/2014/main" xmlns="" w="9525">
+                <a14:hiddenLine xmlns="" xmlns:a16="http://schemas.microsoft.com/office/drawing/2014/main" xmlns:p14="http://schemas.microsoft.com/office/powerpoint/2010/main" xmlns:a14="http://schemas.microsoft.com/office/drawing/2010/main" w="9525">
                   <a:solidFill>
                     <a:srgbClr val="000000"/>
                   </a:solidFill>
@@ -24908,7 +24908,7 @@
             </a:ln>
             <a:extLst>
               <a:ext uri="{91240B29-F687-4f45-9708-019B960494DF}">
-                <a14:hiddenLine xmlns:a14="http://schemas.microsoft.com/office/drawing/2010/main" xmlns:p14="http://schemas.microsoft.com/office/powerpoint/2010/main" xmlns:a16="http://schemas.microsoft.com/office/drawing/2014/main" xmlns="" w="9525">
+                <a14:hiddenLine xmlns="" xmlns:a16="http://schemas.microsoft.com/office/drawing/2014/main" xmlns:p14="http://schemas.microsoft.com/office/powerpoint/2010/main" xmlns:a14="http://schemas.microsoft.com/office/drawing/2010/main" w="9525">
                   <a:solidFill>
                     <a:srgbClr val="000000"/>
                   </a:solidFill>
@@ -25013,7 +25013,7 @@
             </a:ln>
             <a:extLst>
               <a:ext uri="{91240B29-F687-4f45-9708-019B960494DF}">
-                <a14:hiddenLine xmlns:a14="http://schemas.microsoft.com/office/drawing/2010/main" xmlns:p14="http://schemas.microsoft.com/office/powerpoint/2010/main" xmlns:a16="http://schemas.microsoft.com/office/drawing/2014/main" xmlns="" w="9525">
+                <a14:hiddenLine xmlns="" xmlns:a16="http://schemas.microsoft.com/office/drawing/2014/main" xmlns:p14="http://schemas.microsoft.com/office/powerpoint/2010/main" xmlns:a14="http://schemas.microsoft.com/office/drawing/2010/main" w="9525">
                   <a:solidFill>
                     <a:srgbClr val="000000"/>
                   </a:solidFill>
@@ -25093,7 +25093,7 @@
             </a:ln>
             <a:extLst>
               <a:ext uri="{91240B29-F687-4f45-9708-019B960494DF}">
-                <a14:hiddenLine xmlns:a14="http://schemas.microsoft.com/office/drawing/2010/main" xmlns:p14="http://schemas.microsoft.com/office/powerpoint/2010/main" xmlns:a16="http://schemas.microsoft.com/office/drawing/2014/main" xmlns="" w="9525">
+                <a14:hiddenLine xmlns="" xmlns:a16="http://schemas.microsoft.com/office/drawing/2014/main" xmlns:p14="http://schemas.microsoft.com/office/powerpoint/2010/main" xmlns:a14="http://schemas.microsoft.com/office/drawing/2010/main" w="9525">
                   <a:solidFill>
                     <a:srgbClr val="000000"/>
                   </a:solidFill>
@@ -25228,7 +25228,7 @@
             </a:ln>
             <a:extLst>
               <a:ext uri="{91240B29-F687-4f45-9708-019B960494DF}">
-                <a14:hiddenLine xmlns:a14="http://schemas.microsoft.com/office/drawing/2010/main" xmlns:p14="http://schemas.microsoft.com/office/powerpoint/2010/main" xmlns:a16="http://schemas.microsoft.com/office/drawing/2014/main" xmlns="" w="9525">
+                <a14:hiddenLine xmlns="" xmlns:a16="http://schemas.microsoft.com/office/drawing/2014/main" xmlns:p14="http://schemas.microsoft.com/office/powerpoint/2010/main" xmlns:a14="http://schemas.microsoft.com/office/drawing/2010/main" w="9525">
                   <a:solidFill>
                     <a:srgbClr val="000000"/>
                   </a:solidFill>
@@ -25516,7 +25516,7 @@
             </a:ln>
             <a:extLst>
               <a:ext uri="{91240B29-F687-4f45-9708-019B960494DF}">
-                <a14:hiddenLine xmlns:a14="http://schemas.microsoft.com/office/drawing/2010/main" xmlns:p14="http://schemas.microsoft.com/office/powerpoint/2010/main" xmlns:a16="http://schemas.microsoft.com/office/drawing/2014/main" xmlns="" w="9525">
+                <a14:hiddenLine xmlns="" xmlns:a16="http://schemas.microsoft.com/office/drawing/2014/main" xmlns:p14="http://schemas.microsoft.com/office/powerpoint/2010/main" xmlns:a14="http://schemas.microsoft.com/office/drawing/2010/main" w="9525">
                   <a:solidFill>
                     <a:srgbClr val="000000"/>
                   </a:solidFill>
@@ -25646,7 +25646,7 @@
             </a:ln>
             <a:extLst>
               <a:ext uri="{91240B29-F687-4f45-9708-019B960494DF}">
-                <a14:hiddenLine xmlns:a14="http://schemas.microsoft.com/office/drawing/2010/main" xmlns:p14="http://schemas.microsoft.com/office/powerpoint/2010/main" xmlns:a16="http://schemas.microsoft.com/office/drawing/2014/main" xmlns="" w="9525">
+                <a14:hiddenLine xmlns="" xmlns:a16="http://schemas.microsoft.com/office/drawing/2014/main" xmlns:p14="http://schemas.microsoft.com/office/powerpoint/2010/main" xmlns:a14="http://schemas.microsoft.com/office/drawing/2010/main" w="9525">
                   <a:solidFill>
                     <a:srgbClr val="000000"/>
                   </a:solidFill>
@@ -25751,7 +25751,7 @@
             </a:ln>
             <a:extLst>
               <a:ext uri="{91240B29-F687-4f45-9708-019B960494DF}">
-                <a14:hiddenLine xmlns:a14="http://schemas.microsoft.com/office/drawing/2010/main" xmlns:p14="http://schemas.microsoft.com/office/powerpoint/2010/main" xmlns:a16="http://schemas.microsoft.com/office/drawing/2014/main" xmlns="" w="9525">
+                <a14:hiddenLine xmlns="" xmlns:a16="http://schemas.microsoft.com/office/drawing/2014/main" xmlns:p14="http://schemas.microsoft.com/office/powerpoint/2010/main" xmlns:a14="http://schemas.microsoft.com/office/drawing/2010/main" w="9525">
                   <a:solidFill>
                     <a:srgbClr val="000000"/>
                   </a:solidFill>
@@ -25831,7 +25831,7 @@
             </a:ln>
             <a:extLst>
               <a:ext uri="{91240B29-F687-4f45-9708-019B960494DF}">
-                <a14:hiddenLine xmlns:a14="http://schemas.microsoft.com/office/drawing/2010/main" xmlns:p14="http://schemas.microsoft.com/office/powerpoint/2010/main" xmlns:a16="http://schemas.microsoft.com/office/drawing/2014/main" xmlns="" w="9525">
+                <a14:hiddenLine xmlns="" xmlns:a16="http://schemas.microsoft.com/office/drawing/2014/main" xmlns:p14="http://schemas.microsoft.com/office/powerpoint/2010/main" xmlns:a14="http://schemas.microsoft.com/office/drawing/2010/main" w="9525">
                   <a:solidFill>
                     <a:srgbClr val="000000"/>
                   </a:solidFill>
@@ -25936,7 +25936,7 @@
             </a:ln>
             <a:extLst>
               <a:ext uri="{91240B29-F687-4f45-9708-019B960494DF}">
-                <a14:hiddenLine xmlns:a14="http://schemas.microsoft.com/office/drawing/2010/main" xmlns:p14="http://schemas.microsoft.com/office/powerpoint/2010/main" xmlns:a16="http://schemas.microsoft.com/office/drawing/2014/main" xmlns="" w="9525">
+                <a14:hiddenLine xmlns="" xmlns:a16="http://schemas.microsoft.com/office/drawing/2014/main" xmlns:p14="http://schemas.microsoft.com/office/powerpoint/2010/main" xmlns:a14="http://schemas.microsoft.com/office/drawing/2010/main" w="9525">
                   <a:solidFill>
                     <a:srgbClr val="000000"/>
                   </a:solidFill>
@@ -26019,7 +26019,7 @@
             </a:ln>
             <a:extLst>
               <a:ext uri="{91240B29-F687-4f45-9708-019B960494DF}">
-                <a14:hiddenLine xmlns:a14="http://schemas.microsoft.com/office/drawing/2010/main" xmlns:p14="http://schemas.microsoft.com/office/powerpoint/2010/main" xmlns:a16="http://schemas.microsoft.com/office/drawing/2014/main" xmlns="" w="9525">
+                <a14:hiddenLine xmlns="" xmlns:a16="http://schemas.microsoft.com/office/drawing/2014/main" xmlns:p14="http://schemas.microsoft.com/office/powerpoint/2010/main" xmlns:a14="http://schemas.microsoft.com/office/drawing/2010/main" w="9525">
                   <a:solidFill>
                     <a:srgbClr val="000000"/>
                   </a:solidFill>
@@ -26124,7 +26124,7 @@
             </a:ln>
             <a:extLst>
               <a:ext uri="{91240B29-F687-4f45-9708-019B960494DF}">
-                <a14:hiddenLine xmlns:a14="http://schemas.microsoft.com/office/drawing/2010/main" xmlns:p14="http://schemas.microsoft.com/office/powerpoint/2010/main" xmlns:a16="http://schemas.microsoft.com/office/drawing/2014/main" xmlns="" w="9525">
+                <a14:hiddenLine xmlns="" xmlns:a16="http://schemas.microsoft.com/office/drawing/2014/main" xmlns:p14="http://schemas.microsoft.com/office/powerpoint/2010/main" xmlns:a14="http://schemas.microsoft.com/office/drawing/2010/main" w="9525">
                   <a:solidFill>
                     <a:srgbClr val="000000"/>
                   </a:solidFill>
@@ -26207,7 +26207,7 @@
             </a:ln>
             <a:extLst>
               <a:ext uri="{91240B29-F687-4f45-9708-019B960494DF}">
-                <a14:hiddenLine xmlns:a14="http://schemas.microsoft.com/office/drawing/2010/main" xmlns:p14="http://schemas.microsoft.com/office/powerpoint/2010/main" xmlns:a16="http://schemas.microsoft.com/office/drawing/2014/main" xmlns="" w="9525">
+                <a14:hiddenLine xmlns="" xmlns:a16="http://schemas.microsoft.com/office/drawing/2014/main" xmlns:p14="http://schemas.microsoft.com/office/powerpoint/2010/main" xmlns:a14="http://schemas.microsoft.com/office/drawing/2010/main" w="9525">
                   <a:solidFill>
                     <a:srgbClr val="000000"/>
                   </a:solidFill>
@@ -26312,7 +26312,7 @@
             </a:ln>
             <a:extLst>
               <a:ext uri="{91240B29-F687-4f45-9708-019B960494DF}">
-                <a14:hiddenLine xmlns:a14="http://schemas.microsoft.com/office/drawing/2010/main" xmlns:p14="http://schemas.microsoft.com/office/powerpoint/2010/main" xmlns:a16="http://schemas.microsoft.com/office/drawing/2014/main" xmlns="" w="9525">
+                <a14:hiddenLine xmlns="" xmlns:a16="http://schemas.microsoft.com/office/drawing/2014/main" xmlns:p14="http://schemas.microsoft.com/office/powerpoint/2010/main" xmlns:a14="http://schemas.microsoft.com/office/drawing/2010/main" w="9525">
                   <a:solidFill>
                     <a:srgbClr val="000000"/>
                   </a:solidFill>
@@ -26361,7 +26361,7 @@
             </a:ln>
             <a:extLst>
               <a:ext uri="{91240B29-F687-4f45-9708-019B960494DF}">
-                <a14:hiddenLine xmlns:a14="http://schemas.microsoft.com/office/drawing/2010/main" xmlns:p14="http://schemas.microsoft.com/office/powerpoint/2010/main" xmlns:a16="http://schemas.microsoft.com/office/drawing/2014/main" xmlns="" w="9525">
+                <a14:hiddenLine xmlns="" xmlns:a16="http://schemas.microsoft.com/office/drawing/2014/main" xmlns:p14="http://schemas.microsoft.com/office/powerpoint/2010/main" xmlns:a14="http://schemas.microsoft.com/office/drawing/2010/main" w="9525">
                   <a:solidFill>
                     <a:srgbClr val="000000"/>
                   </a:solidFill>
@@ -26731,7 +26731,7 @@
           <a:noFill/>
           <a:extLst>
             <a:ext uri="{909E8E84-426E-40dd-AFC4-6F175D3DCCD1}">
-              <a14:hiddenFill xmlns:a14="http://schemas.microsoft.com/office/drawing/2010/main" xmlns:p14="http://schemas.microsoft.com/office/powerpoint/2010/main" xmlns:a16="http://schemas.microsoft.com/office/drawing/2014/main" xmlns="">
+              <a14:hiddenFill xmlns="" xmlns:a16="http://schemas.microsoft.com/office/drawing/2014/main" xmlns:p14="http://schemas.microsoft.com/office/powerpoint/2010/main" xmlns:a14="http://schemas.microsoft.com/office/drawing/2010/main">
                 <a:solidFill>
                   <a:srgbClr val="FFFFFF"/>
                 </a:solidFill>
@@ -26961,7 +26961,7 @@
             </a:ln>
             <a:extLst>
               <a:ext uri="{91240B29-F687-4f45-9708-019B960494DF}">
-                <a14:hiddenLine xmlns:a14="http://schemas.microsoft.com/office/drawing/2010/main" xmlns:p14="http://schemas.microsoft.com/office/powerpoint/2010/main" xmlns:a16="http://schemas.microsoft.com/office/drawing/2014/main" xmlns="" w="9525">
+                <a14:hiddenLine xmlns="" xmlns:a16="http://schemas.microsoft.com/office/drawing/2014/main" xmlns:p14="http://schemas.microsoft.com/office/powerpoint/2010/main" xmlns:a14="http://schemas.microsoft.com/office/drawing/2010/main" w="9525">
                   <a:solidFill>
                     <a:srgbClr val="000000"/>
                   </a:solidFill>
@@ -27066,7 +27066,7 @@
             </a:ln>
             <a:extLst>
               <a:ext uri="{91240B29-F687-4f45-9708-019B960494DF}">
-                <a14:hiddenLine xmlns:a14="http://schemas.microsoft.com/office/drawing/2010/main" xmlns:p14="http://schemas.microsoft.com/office/powerpoint/2010/main" xmlns:a16="http://schemas.microsoft.com/office/drawing/2014/main" xmlns="" w="9525">
+                <a14:hiddenLine xmlns="" xmlns:a16="http://schemas.microsoft.com/office/drawing/2014/main" xmlns:p14="http://schemas.microsoft.com/office/powerpoint/2010/main" xmlns:a14="http://schemas.microsoft.com/office/drawing/2010/main" w="9525">
                   <a:solidFill>
                     <a:srgbClr val="000000"/>
                   </a:solidFill>
@@ -27171,7 +27171,7 @@
             </a:ln>
             <a:extLst>
               <a:ext uri="{91240B29-F687-4f45-9708-019B960494DF}">
-                <a14:hiddenLine xmlns:a14="http://schemas.microsoft.com/office/drawing/2010/main" xmlns:p14="http://schemas.microsoft.com/office/powerpoint/2010/main" xmlns:a16="http://schemas.microsoft.com/office/drawing/2014/main" xmlns="" w="9525">
+                <a14:hiddenLine xmlns="" xmlns:a16="http://schemas.microsoft.com/office/drawing/2014/main" xmlns:p14="http://schemas.microsoft.com/office/powerpoint/2010/main" xmlns:a14="http://schemas.microsoft.com/office/drawing/2010/main" w="9525">
                   <a:solidFill>
                     <a:srgbClr val="000000"/>
                   </a:solidFill>
@@ -27248,7 +27248,7 @@
             </a:ln>
             <a:extLst>
               <a:ext uri="{91240B29-F687-4f45-9708-019B960494DF}">
-                <a14:hiddenLine xmlns:a14="http://schemas.microsoft.com/office/drawing/2010/main" xmlns:p14="http://schemas.microsoft.com/office/powerpoint/2010/main" xmlns:a16="http://schemas.microsoft.com/office/drawing/2014/main" xmlns="" w="9525">
+                <a14:hiddenLine xmlns="" xmlns:a16="http://schemas.microsoft.com/office/drawing/2014/main" xmlns:p14="http://schemas.microsoft.com/office/powerpoint/2010/main" xmlns:a14="http://schemas.microsoft.com/office/drawing/2010/main" w="9525">
                   <a:solidFill>
                     <a:srgbClr val="000000"/>
                   </a:solidFill>
@@ -27353,7 +27353,7 @@
             </a:ln>
             <a:extLst>
               <a:ext uri="{91240B29-F687-4f45-9708-019B960494DF}">
-                <a14:hiddenLine xmlns:a14="http://schemas.microsoft.com/office/drawing/2010/main" xmlns:p14="http://schemas.microsoft.com/office/powerpoint/2010/main" xmlns:a16="http://schemas.microsoft.com/office/drawing/2014/main" xmlns="" w="9525">
+                <a14:hiddenLine xmlns="" xmlns:a16="http://schemas.microsoft.com/office/drawing/2014/main" xmlns:p14="http://schemas.microsoft.com/office/powerpoint/2010/main" xmlns:a14="http://schemas.microsoft.com/office/drawing/2010/main" w="9525">
                   <a:solidFill>
                     <a:srgbClr val="000000"/>
                   </a:solidFill>
@@ -27430,7 +27430,7 @@
             </a:ln>
             <a:extLst>
               <a:ext uri="{91240B29-F687-4f45-9708-019B960494DF}">
-                <a14:hiddenLine xmlns:a14="http://schemas.microsoft.com/office/drawing/2010/main" xmlns:p14="http://schemas.microsoft.com/office/powerpoint/2010/main" xmlns:a16="http://schemas.microsoft.com/office/drawing/2014/main" xmlns="" w="9525">
+                <a14:hiddenLine xmlns="" xmlns:a16="http://schemas.microsoft.com/office/drawing/2014/main" xmlns:p14="http://schemas.microsoft.com/office/powerpoint/2010/main" xmlns:a14="http://schemas.microsoft.com/office/drawing/2010/main" w="9525">
                   <a:solidFill>
                     <a:srgbClr val="000000"/>
                   </a:solidFill>
@@ -27507,7 +27507,7 @@
             </a:ln>
             <a:extLst>
               <a:ext uri="{91240B29-F687-4f45-9708-019B960494DF}">
-                <a14:hiddenLine xmlns:a14="http://schemas.microsoft.com/office/drawing/2010/main" xmlns:p14="http://schemas.microsoft.com/office/powerpoint/2010/main" xmlns:a16="http://schemas.microsoft.com/office/drawing/2014/main" xmlns="" w="9525">
+                <a14:hiddenLine xmlns="" xmlns:a16="http://schemas.microsoft.com/office/drawing/2014/main" xmlns:p14="http://schemas.microsoft.com/office/powerpoint/2010/main" xmlns:a14="http://schemas.microsoft.com/office/drawing/2010/main" w="9525">
                   <a:solidFill>
                     <a:srgbClr val="000000"/>
                   </a:solidFill>
@@ -27612,7 +27612,7 @@
             </a:ln>
             <a:extLst>
               <a:ext uri="{91240B29-F687-4f45-9708-019B960494DF}">
-                <a14:hiddenLine xmlns:a14="http://schemas.microsoft.com/office/drawing/2010/main" xmlns:p14="http://schemas.microsoft.com/office/powerpoint/2010/main" xmlns:a16="http://schemas.microsoft.com/office/drawing/2014/main" xmlns="" w="9525">
+                <a14:hiddenLine xmlns="" xmlns:a16="http://schemas.microsoft.com/office/drawing/2014/main" xmlns:p14="http://schemas.microsoft.com/office/powerpoint/2010/main" xmlns:a14="http://schemas.microsoft.com/office/drawing/2010/main" w="9525">
                   <a:solidFill>
                     <a:srgbClr val="000000"/>
                   </a:solidFill>
@@ -27717,7 +27717,7 @@
             </a:ln>
             <a:extLst>
               <a:ext uri="{91240B29-F687-4f45-9708-019B960494DF}">
-                <a14:hiddenLine xmlns:a14="http://schemas.microsoft.com/office/drawing/2010/main" xmlns:p14="http://schemas.microsoft.com/office/powerpoint/2010/main" xmlns:a16="http://schemas.microsoft.com/office/drawing/2014/main" xmlns="" w="9525">
+                <a14:hiddenLine xmlns="" xmlns:a16="http://schemas.microsoft.com/office/drawing/2014/main" xmlns:p14="http://schemas.microsoft.com/office/powerpoint/2010/main" xmlns:a14="http://schemas.microsoft.com/office/drawing/2010/main" w="9525">
                   <a:solidFill>
                     <a:srgbClr val="000000"/>
                   </a:solidFill>
@@ -27794,7 +27794,7 @@
             </a:ln>
             <a:extLst>
               <a:ext uri="{91240B29-F687-4f45-9708-019B960494DF}">
-                <a14:hiddenLine xmlns:a14="http://schemas.microsoft.com/office/drawing/2010/main" xmlns:p14="http://schemas.microsoft.com/office/powerpoint/2010/main" xmlns:a16="http://schemas.microsoft.com/office/drawing/2014/main" xmlns="" w="9525">
+                <a14:hiddenLine xmlns="" xmlns:a16="http://schemas.microsoft.com/office/drawing/2014/main" xmlns:p14="http://schemas.microsoft.com/office/powerpoint/2010/main" xmlns:a14="http://schemas.microsoft.com/office/drawing/2010/main" w="9525">
                   <a:solidFill>
                     <a:srgbClr val="000000"/>
                   </a:solidFill>
@@ -27919,7 +27919,7 @@
             </a:ln>
             <a:extLst>
               <a:ext uri="{91240B29-F687-4f45-9708-019B960494DF}">
-                <a14:hiddenLine xmlns:a14="http://schemas.microsoft.com/office/drawing/2010/main" xmlns:p14="http://schemas.microsoft.com/office/powerpoint/2010/main" xmlns:a16="http://schemas.microsoft.com/office/drawing/2014/main" xmlns="" w="9525">
+                <a14:hiddenLine xmlns="" xmlns:a16="http://schemas.microsoft.com/office/drawing/2014/main" xmlns:p14="http://schemas.microsoft.com/office/powerpoint/2010/main" xmlns:a14="http://schemas.microsoft.com/office/drawing/2010/main" w="9525">
                   <a:solidFill>
                     <a:srgbClr val="000000"/>
                   </a:solidFill>
@@ -28033,7 +28033,7 @@
             </a:ln>
             <a:extLst>
               <a:ext uri="{91240B29-F687-4f45-9708-019B960494DF}">
-                <a14:hiddenLine xmlns:a14="http://schemas.microsoft.com/office/drawing/2010/main" xmlns:p14="http://schemas.microsoft.com/office/powerpoint/2010/main" xmlns:a16="http://schemas.microsoft.com/office/drawing/2014/main" xmlns="" w="9525">
+                <a14:hiddenLine xmlns="" xmlns:a16="http://schemas.microsoft.com/office/drawing/2014/main" xmlns:p14="http://schemas.microsoft.com/office/powerpoint/2010/main" xmlns:a14="http://schemas.microsoft.com/office/drawing/2010/main" w="9525">
                   <a:solidFill>
                     <a:srgbClr val="000000"/>
                   </a:solidFill>
@@ -28110,7 +28110,7 @@
             </a:ln>
             <a:extLst>
               <a:ext uri="{91240B29-F687-4f45-9708-019B960494DF}">
-                <a14:hiddenLine xmlns:a14="http://schemas.microsoft.com/office/drawing/2010/main" xmlns:p14="http://schemas.microsoft.com/office/powerpoint/2010/main" xmlns:a16="http://schemas.microsoft.com/office/drawing/2014/main" xmlns="" w="9525">
+                <a14:hiddenLine xmlns="" xmlns:a16="http://schemas.microsoft.com/office/drawing/2014/main" xmlns:p14="http://schemas.microsoft.com/office/powerpoint/2010/main" xmlns:a14="http://schemas.microsoft.com/office/drawing/2010/main" w="9525">
                   <a:solidFill>
                     <a:srgbClr val="000000"/>
                   </a:solidFill>
@@ -28187,7 +28187,7 @@
             </a:ln>
             <a:extLst>
               <a:ext uri="{91240B29-F687-4f45-9708-019B960494DF}">
-                <a14:hiddenLine xmlns:a14="http://schemas.microsoft.com/office/drawing/2010/main" xmlns:p14="http://schemas.microsoft.com/office/powerpoint/2010/main" xmlns:a16="http://schemas.microsoft.com/office/drawing/2014/main" xmlns="" w="9525">
+                <a14:hiddenLine xmlns="" xmlns:a16="http://schemas.microsoft.com/office/drawing/2014/main" xmlns:p14="http://schemas.microsoft.com/office/powerpoint/2010/main" xmlns:a14="http://schemas.microsoft.com/office/drawing/2010/main" w="9525">
                   <a:solidFill>
                     <a:srgbClr val="000000"/>
                   </a:solidFill>
@@ -28292,7 +28292,7 @@
             </a:ln>
             <a:extLst>
               <a:ext uri="{91240B29-F687-4f45-9708-019B960494DF}">
-                <a14:hiddenLine xmlns:a14="http://schemas.microsoft.com/office/drawing/2010/main" xmlns:p14="http://schemas.microsoft.com/office/powerpoint/2010/main" xmlns:a16="http://schemas.microsoft.com/office/drawing/2014/main" xmlns="" w="9525">
+                <a14:hiddenLine xmlns="" xmlns:a16="http://schemas.microsoft.com/office/drawing/2014/main" xmlns:p14="http://schemas.microsoft.com/office/powerpoint/2010/main" xmlns:a14="http://schemas.microsoft.com/office/drawing/2010/main" w="9525">
                   <a:solidFill>
                     <a:srgbClr val="000000"/>
                   </a:solidFill>
@@ -28341,7 +28341,7 @@
             </a:ln>
             <a:extLst>
               <a:ext uri="{91240B29-F687-4f45-9708-019B960494DF}">
-                <a14:hiddenLine xmlns:a14="http://schemas.microsoft.com/office/drawing/2010/main" xmlns:p14="http://schemas.microsoft.com/office/powerpoint/2010/main" xmlns:a16="http://schemas.microsoft.com/office/drawing/2014/main" xmlns="" w="9525">
+                <a14:hiddenLine xmlns="" xmlns:a16="http://schemas.microsoft.com/office/drawing/2014/main" xmlns:p14="http://schemas.microsoft.com/office/powerpoint/2010/main" xmlns:a14="http://schemas.microsoft.com/office/drawing/2010/main" w="9525">
                   <a:solidFill>
                     <a:srgbClr val="000000"/>
                   </a:solidFill>
@@ -28421,7 +28421,7 @@
             </a:ln>
             <a:extLst>
               <a:ext uri="{91240B29-F687-4f45-9708-019B960494DF}">
-                <a14:hiddenLine xmlns:a14="http://schemas.microsoft.com/office/drawing/2010/main" xmlns:p14="http://schemas.microsoft.com/office/powerpoint/2010/main" xmlns:a16="http://schemas.microsoft.com/office/drawing/2014/main" xmlns="" w="9525">
+                <a14:hiddenLine xmlns="" xmlns:a16="http://schemas.microsoft.com/office/drawing/2014/main" xmlns:p14="http://schemas.microsoft.com/office/powerpoint/2010/main" xmlns:a14="http://schemas.microsoft.com/office/drawing/2010/main" w="9525">
                   <a:solidFill>
                     <a:srgbClr val="000000"/>
                   </a:solidFill>
@@ -28526,7 +28526,7 @@
             </a:ln>
             <a:extLst>
               <a:ext uri="{91240B29-F687-4f45-9708-019B960494DF}">
-                <a14:hiddenLine xmlns:a14="http://schemas.microsoft.com/office/drawing/2010/main" xmlns:p14="http://schemas.microsoft.com/office/powerpoint/2010/main" xmlns:a16="http://schemas.microsoft.com/office/drawing/2014/main" xmlns="" w="9525">
+                <a14:hiddenLine xmlns="" xmlns:a16="http://schemas.microsoft.com/office/drawing/2014/main" xmlns:p14="http://schemas.microsoft.com/office/powerpoint/2010/main" xmlns:a14="http://schemas.microsoft.com/office/drawing/2010/main" w="9525">
                   <a:solidFill>
                     <a:srgbClr val="000000"/>
                   </a:solidFill>
@@ -28603,7 +28603,7 @@
             </a:ln>
             <a:extLst>
               <a:ext uri="{91240B29-F687-4f45-9708-019B960494DF}">
-                <a14:hiddenLine xmlns:a14="http://schemas.microsoft.com/office/drawing/2010/main" xmlns:p14="http://schemas.microsoft.com/office/powerpoint/2010/main" xmlns:a16="http://schemas.microsoft.com/office/drawing/2014/main" xmlns="" w="9525">
+                <a14:hiddenLine xmlns="" xmlns:a16="http://schemas.microsoft.com/office/drawing/2014/main" xmlns:p14="http://schemas.microsoft.com/office/powerpoint/2010/main" xmlns:a14="http://schemas.microsoft.com/office/drawing/2010/main" w="9525">
                   <a:solidFill>
                     <a:srgbClr val="000000"/>
                   </a:solidFill>
@@ -28708,7 +28708,7 @@
             </a:ln>
             <a:extLst>
               <a:ext uri="{91240B29-F687-4f45-9708-019B960494DF}">
-                <a14:hiddenLine xmlns:a14="http://schemas.microsoft.com/office/drawing/2010/main" xmlns:p14="http://schemas.microsoft.com/office/powerpoint/2010/main" xmlns:a16="http://schemas.microsoft.com/office/drawing/2014/main" xmlns="" w="9525">
+                <a14:hiddenLine xmlns="" xmlns:a16="http://schemas.microsoft.com/office/drawing/2014/main" xmlns:p14="http://schemas.microsoft.com/office/powerpoint/2010/main" xmlns:a14="http://schemas.microsoft.com/office/drawing/2010/main" w="9525">
                   <a:solidFill>
                     <a:srgbClr val="000000"/>
                   </a:solidFill>
@@ -28788,7 +28788,7 @@
             </a:ln>
             <a:extLst>
               <a:ext uri="{91240B29-F687-4f45-9708-019B960494DF}">
-                <a14:hiddenLine xmlns:a14="http://schemas.microsoft.com/office/drawing/2010/main" xmlns:p14="http://schemas.microsoft.com/office/powerpoint/2010/main" xmlns:a16="http://schemas.microsoft.com/office/drawing/2014/main" xmlns="" w="9525">
+                <a14:hiddenLine xmlns="" xmlns:a16="http://schemas.microsoft.com/office/drawing/2014/main" xmlns:p14="http://schemas.microsoft.com/office/powerpoint/2010/main" xmlns:a14="http://schemas.microsoft.com/office/drawing/2010/main" w="9525">
                   <a:solidFill>
                     <a:srgbClr val="000000"/>
                   </a:solidFill>
@@ -28865,7 +28865,7 @@
             </a:ln>
             <a:extLst>
               <a:ext uri="{91240B29-F687-4f45-9708-019B960494DF}">
-                <a14:hiddenLine xmlns:a14="http://schemas.microsoft.com/office/drawing/2010/main" xmlns:p14="http://schemas.microsoft.com/office/powerpoint/2010/main" xmlns:a16="http://schemas.microsoft.com/office/drawing/2014/main" xmlns="" w="9525">
+                <a14:hiddenLine xmlns="" xmlns:a16="http://schemas.microsoft.com/office/drawing/2014/main" xmlns:p14="http://schemas.microsoft.com/office/powerpoint/2010/main" xmlns:a14="http://schemas.microsoft.com/office/drawing/2010/main" w="9525">
                   <a:solidFill>
                     <a:srgbClr val="000000"/>
                   </a:solidFill>
@@ -28970,7 +28970,7 @@
             </a:ln>
             <a:extLst>
               <a:ext uri="{91240B29-F687-4f45-9708-019B960494DF}">
-                <a14:hiddenLine xmlns:a14="http://schemas.microsoft.com/office/drawing/2010/main" xmlns:p14="http://schemas.microsoft.com/office/powerpoint/2010/main" xmlns:a16="http://schemas.microsoft.com/office/drawing/2014/main" xmlns="" w="9525">
+                <a14:hiddenLine xmlns="" xmlns:a16="http://schemas.microsoft.com/office/drawing/2014/main" xmlns:p14="http://schemas.microsoft.com/office/powerpoint/2010/main" xmlns:a14="http://schemas.microsoft.com/office/drawing/2010/main" w="9525">
                   <a:solidFill>
                     <a:srgbClr val="000000"/>
                   </a:solidFill>
@@ -29075,7 +29075,7 @@
             </a:ln>
             <a:extLst>
               <a:ext uri="{91240B29-F687-4f45-9708-019B960494DF}">
-                <a14:hiddenLine xmlns:a14="http://schemas.microsoft.com/office/drawing/2010/main" xmlns:p14="http://schemas.microsoft.com/office/powerpoint/2010/main" xmlns:a16="http://schemas.microsoft.com/office/drawing/2014/main" xmlns="" w="9525">
+                <a14:hiddenLine xmlns="" xmlns:a16="http://schemas.microsoft.com/office/drawing/2014/main" xmlns:p14="http://schemas.microsoft.com/office/powerpoint/2010/main" xmlns:a14="http://schemas.microsoft.com/office/drawing/2010/main" w="9525">
                   <a:solidFill>
                     <a:srgbClr val="000000"/>
                   </a:solidFill>
@@ -29155,7 +29155,7 @@
             </a:ln>
             <a:extLst>
               <a:ext uri="{91240B29-F687-4f45-9708-019B960494DF}">
-                <a14:hiddenLine xmlns:a14="http://schemas.microsoft.com/office/drawing/2010/main" xmlns:p14="http://schemas.microsoft.com/office/powerpoint/2010/main" xmlns:a16="http://schemas.microsoft.com/office/drawing/2014/main" xmlns="" w="9525">
+                <a14:hiddenLine xmlns="" xmlns:a16="http://schemas.microsoft.com/office/drawing/2014/main" xmlns:p14="http://schemas.microsoft.com/office/powerpoint/2010/main" xmlns:a14="http://schemas.microsoft.com/office/drawing/2010/main" w="9525">
                   <a:solidFill>
                     <a:srgbClr val="000000"/>
                   </a:solidFill>
@@ -29290,7 +29290,7 @@
             </a:ln>
             <a:extLst>
               <a:ext uri="{91240B29-F687-4f45-9708-019B960494DF}">
-                <a14:hiddenLine xmlns:a14="http://schemas.microsoft.com/office/drawing/2010/main" xmlns:p14="http://schemas.microsoft.com/office/powerpoint/2010/main" xmlns:a16="http://schemas.microsoft.com/office/drawing/2014/main" xmlns="" w="9525">
+                <a14:hiddenLine xmlns="" xmlns:a16="http://schemas.microsoft.com/office/drawing/2014/main" xmlns:p14="http://schemas.microsoft.com/office/powerpoint/2010/main" xmlns:a14="http://schemas.microsoft.com/office/drawing/2010/main" w="9525">
                   <a:solidFill>
                     <a:srgbClr val="000000"/>
                   </a:solidFill>
@@ -29465,7 +29465,7 @@
           <a:noFill/>
           <a:extLst>
             <a:ext uri="{909E8E84-426E-40dd-AFC4-6F175D3DCCD1}">
-              <a14:hiddenFill xmlns:a14="http://schemas.microsoft.com/office/drawing/2010/main" xmlns:p14="http://schemas.microsoft.com/office/powerpoint/2010/main" xmlns:a16="http://schemas.microsoft.com/office/drawing/2014/main" xmlns="">
+              <a14:hiddenFill xmlns="" xmlns:a16="http://schemas.microsoft.com/office/drawing/2014/main" xmlns:p14="http://schemas.microsoft.com/office/powerpoint/2010/main" xmlns:a14="http://schemas.microsoft.com/office/drawing/2010/main">
                 <a:solidFill>
                   <a:srgbClr val="FFFFFF"/>
                 </a:solidFill>
@@ -29692,7 +29692,7 @@
             </a:ln>
             <a:extLst>
               <a:ext uri="{91240B29-F687-4f45-9708-019B960494DF}">
-                <a14:hiddenLine xmlns:a14="http://schemas.microsoft.com/office/drawing/2010/main" xmlns:p14="http://schemas.microsoft.com/office/powerpoint/2010/main" xmlns:a16="http://schemas.microsoft.com/office/drawing/2014/main" xmlns="" w="9525">
+                <a14:hiddenLine xmlns="" xmlns:a16="http://schemas.microsoft.com/office/drawing/2014/main" xmlns:p14="http://schemas.microsoft.com/office/powerpoint/2010/main" xmlns:a14="http://schemas.microsoft.com/office/drawing/2010/main" w="9525">
                   <a:solidFill>
                     <a:srgbClr val="000000"/>
                   </a:solidFill>
@@ -29797,7 +29797,7 @@
             </a:ln>
             <a:extLst>
               <a:ext uri="{91240B29-F687-4f45-9708-019B960494DF}">
-                <a14:hiddenLine xmlns:a14="http://schemas.microsoft.com/office/drawing/2010/main" xmlns:p14="http://schemas.microsoft.com/office/powerpoint/2010/main" xmlns:a16="http://schemas.microsoft.com/office/drawing/2014/main" xmlns="" w="9525">
+                <a14:hiddenLine xmlns="" xmlns:a16="http://schemas.microsoft.com/office/drawing/2014/main" xmlns:p14="http://schemas.microsoft.com/office/powerpoint/2010/main" xmlns:a14="http://schemas.microsoft.com/office/drawing/2010/main" w="9525">
                   <a:solidFill>
                     <a:srgbClr val="000000"/>
                   </a:solidFill>
@@ -29902,7 +29902,7 @@
             </a:ln>
             <a:extLst>
               <a:ext uri="{91240B29-F687-4f45-9708-019B960494DF}">
-                <a14:hiddenLine xmlns:a14="http://schemas.microsoft.com/office/drawing/2010/main" xmlns:p14="http://schemas.microsoft.com/office/powerpoint/2010/main" xmlns:a16="http://schemas.microsoft.com/office/drawing/2014/main" xmlns="" w="9525">
+                <a14:hiddenLine xmlns="" xmlns:a16="http://schemas.microsoft.com/office/drawing/2014/main" xmlns:p14="http://schemas.microsoft.com/office/powerpoint/2010/main" xmlns:a14="http://schemas.microsoft.com/office/drawing/2010/main" w="9525">
                   <a:solidFill>
                     <a:srgbClr val="000000"/>
                   </a:solidFill>
@@ -29979,7 +29979,7 @@
             </a:ln>
             <a:extLst>
               <a:ext uri="{91240B29-F687-4f45-9708-019B960494DF}">
-                <a14:hiddenLine xmlns:a14="http://schemas.microsoft.com/office/drawing/2010/main" xmlns:p14="http://schemas.microsoft.com/office/powerpoint/2010/main" xmlns:a16="http://schemas.microsoft.com/office/drawing/2014/main" xmlns="" w="9525">
+                <a14:hiddenLine xmlns="" xmlns:a16="http://schemas.microsoft.com/office/drawing/2014/main" xmlns:p14="http://schemas.microsoft.com/office/powerpoint/2010/main" xmlns:a14="http://schemas.microsoft.com/office/drawing/2010/main" w="9525">
                   <a:solidFill>
                     <a:srgbClr val="000000"/>
                   </a:solidFill>
@@ -30084,7 +30084,7 @@
             </a:ln>
             <a:extLst>
               <a:ext uri="{91240B29-F687-4f45-9708-019B960494DF}">
-                <a14:hiddenLine xmlns:a14="http://schemas.microsoft.com/office/drawing/2010/main" xmlns:p14="http://schemas.microsoft.com/office/powerpoint/2010/main" xmlns:a16="http://schemas.microsoft.com/office/drawing/2014/main" xmlns="" w="9525">
+                <a14:hiddenLine xmlns="" xmlns:a16="http://schemas.microsoft.com/office/drawing/2014/main" xmlns:p14="http://schemas.microsoft.com/office/powerpoint/2010/main" xmlns:a14="http://schemas.microsoft.com/office/drawing/2010/main" w="9525">
                   <a:solidFill>
                     <a:srgbClr val="000000"/>
                   </a:solidFill>
@@ -30161,7 +30161,7 @@
             </a:ln>
             <a:extLst>
               <a:ext uri="{91240B29-F687-4f45-9708-019B960494DF}">
-                <a14:hiddenLine xmlns:a14="http://schemas.microsoft.com/office/drawing/2010/main" xmlns:p14="http://schemas.microsoft.com/office/powerpoint/2010/main" xmlns:a16="http://schemas.microsoft.com/office/drawing/2014/main" xmlns="" w="9525">
+                <a14:hiddenLine xmlns="" xmlns:a16="http://schemas.microsoft.com/office/drawing/2014/main" xmlns:p14="http://schemas.microsoft.com/office/powerpoint/2010/main" xmlns:a14="http://schemas.microsoft.com/office/drawing/2010/main" w="9525">
                   <a:solidFill>
                     <a:srgbClr val="000000"/>
                   </a:solidFill>
@@ -30238,7 +30238,7 @@
             </a:ln>
             <a:extLst>
               <a:ext uri="{91240B29-F687-4f45-9708-019B960494DF}">
-                <a14:hiddenLine xmlns:a14="http://schemas.microsoft.com/office/drawing/2010/main" xmlns:p14="http://schemas.microsoft.com/office/powerpoint/2010/main" xmlns:a16="http://schemas.microsoft.com/office/drawing/2014/main" xmlns="" w="9525">
+                <a14:hiddenLine xmlns="" xmlns:a16="http://schemas.microsoft.com/office/drawing/2014/main" xmlns:p14="http://schemas.microsoft.com/office/powerpoint/2010/main" xmlns:a14="http://schemas.microsoft.com/office/drawing/2010/main" w="9525">
                   <a:solidFill>
                     <a:srgbClr val="000000"/>
                   </a:solidFill>
@@ -30343,7 +30343,7 @@
             </a:ln>
             <a:extLst>
               <a:ext uri="{91240B29-F687-4f45-9708-019B960494DF}">
-                <a14:hiddenLine xmlns:a14="http://schemas.microsoft.com/office/drawing/2010/main" xmlns:p14="http://schemas.microsoft.com/office/powerpoint/2010/main" xmlns:a16="http://schemas.microsoft.com/office/drawing/2014/main" xmlns="" w="9525">
+                <a14:hiddenLine xmlns="" xmlns:a16="http://schemas.microsoft.com/office/drawing/2014/main" xmlns:p14="http://schemas.microsoft.com/office/powerpoint/2010/main" xmlns:a14="http://schemas.microsoft.com/office/drawing/2010/main" w="9525">
                   <a:solidFill>
                     <a:srgbClr val="000000"/>
                   </a:solidFill>
@@ -30448,7 +30448,7 @@
             </a:ln>
             <a:extLst>
               <a:ext uri="{91240B29-F687-4f45-9708-019B960494DF}">
-                <a14:hiddenLine xmlns:a14="http://schemas.microsoft.com/office/drawing/2010/main" xmlns:p14="http://schemas.microsoft.com/office/powerpoint/2010/main" xmlns:a16="http://schemas.microsoft.com/office/drawing/2014/main" xmlns="" w="9525">
+                <a14:hiddenLine xmlns="" xmlns:a16="http://schemas.microsoft.com/office/drawing/2014/main" xmlns:p14="http://schemas.microsoft.com/office/powerpoint/2010/main" xmlns:a14="http://schemas.microsoft.com/office/drawing/2010/main" w="9525">
                   <a:solidFill>
                     <a:srgbClr val="000000"/>
                   </a:solidFill>
@@ -30525,7 +30525,7 @@
             </a:ln>
             <a:extLst>
               <a:ext uri="{91240B29-F687-4f45-9708-019B960494DF}">
-                <a14:hiddenLine xmlns:a14="http://schemas.microsoft.com/office/drawing/2010/main" xmlns:p14="http://schemas.microsoft.com/office/powerpoint/2010/main" xmlns:a16="http://schemas.microsoft.com/office/drawing/2014/main" xmlns="" w="9525">
+                <a14:hiddenLine xmlns="" xmlns:a16="http://schemas.microsoft.com/office/drawing/2014/main" xmlns:p14="http://schemas.microsoft.com/office/powerpoint/2010/main" xmlns:a14="http://schemas.microsoft.com/office/drawing/2010/main" w="9525">
                   <a:solidFill>
                     <a:srgbClr val="000000"/>
                   </a:solidFill>
@@ -30650,7 +30650,7 @@
             </a:ln>
             <a:extLst>
               <a:ext uri="{91240B29-F687-4f45-9708-019B960494DF}">
-                <a14:hiddenLine xmlns:a14="http://schemas.microsoft.com/office/drawing/2010/main" xmlns:p14="http://schemas.microsoft.com/office/powerpoint/2010/main" xmlns:a16="http://schemas.microsoft.com/office/drawing/2014/main" xmlns="" w="9525">
+                <a14:hiddenLine xmlns="" xmlns:a16="http://schemas.microsoft.com/office/drawing/2014/main" xmlns:p14="http://schemas.microsoft.com/office/powerpoint/2010/main" xmlns:a14="http://schemas.microsoft.com/office/drawing/2010/main" w="9525">
                   <a:solidFill>
                     <a:srgbClr val="000000"/>
                   </a:solidFill>
@@ -30764,7 +30764,7 @@
             </a:ln>
             <a:extLst>
               <a:ext uri="{91240B29-F687-4f45-9708-019B960494DF}">
-                <a14:hiddenLine xmlns:a14="http://schemas.microsoft.com/office/drawing/2010/main" xmlns:p14="http://schemas.microsoft.com/office/powerpoint/2010/main" xmlns:a16="http://schemas.microsoft.com/office/drawing/2014/main" xmlns="" w="9525">
+                <a14:hiddenLine xmlns="" xmlns:a16="http://schemas.microsoft.com/office/drawing/2014/main" xmlns:p14="http://schemas.microsoft.com/office/powerpoint/2010/main" xmlns:a14="http://schemas.microsoft.com/office/drawing/2010/main" w="9525">
                   <a:solidFill>
                     <a:srgbClr val="000000"/>
                   </a:solidFill>
@@ -30841,7 +30841,7 @@
             </a:ln>
             <a:extLst>
               <a:ext uri="{91240B29-F687-4f45-9708-019B960494DF}">
-                <a14:hiddenLine xmlns:a14="http://schemas.microsoft.com/office/drawing/2010/main" xmlns:p14="http://schemas.microsoft.com/office/powerpoint/2010/main" xmlns:a16="http://schemas.microsoft.com/office/drawing/2014/main" xmlns="" w="9525">
+                <a14:hiddenLine xmlns="" xmlns:a16="http://schemas.microsoft.com/office/drawing/2014/main" xmlns:p14="http://schemas.microsoft.com/office/powerpoint/2010/main" xmlns:a14="http://schemas.microsoft.com/office/drawing/2010/main" w="9525">
                   <a:solidFill>
                     <a:srgbClr val="000000"/>
                   </a:solidFill>
@@ -30918,7 +30918,7 @@
             </a:ln>
             <a:extLst>
               <a:ext uri="{91240B29-F687-4f45-9708-019B960494DF}">
-                <a14:hiddenLine xmlns:a14="http://schemas.microsoft.com/office/drawing/2010/main" xmlns:p14="http://schemas.microsoft.com/office/powerpoint/2010/main" xmlns:a16="http://schemas.microsoft.com/office/drawing/2014/main" xmlns="" w="9525">
+                <a14:hiddenLine xmlns="" xmlns:a16="http://schemas.microsoft.com/office/drawing/2014/main" xmlns:p14="http://schemas.microsoft.com/office/powerpoint/2010/main" xmlns:a14="http://schemas.microsoft.com/office/drawing/2010/main" w="9525">
                   <a:solidFill>
                     <a:srgbClr val="000000"/>
                   </a:solidFill>
@@ -31023,7 +31023,7 @@
             </a:ln>
             <a:extLst>
               <a:ext uri="{91240B29-F687-4f45-9708-019B960494DF}">
-                <a14:hiddenLine xmlns:a14="http://schemas.microsoft.com/office/drawing/2010/main" xmlns:p14="http://schemas.microsoft.com/office/powerpoint/2010/main" xmlns:a16="http://schemas.microsoft.com/office/drawing/2014/main" xmlns="" w="9525">
+                <a14:hiddenLine xmlns="" xmlns:a16="http://schemas.microsoft.com/office/drawing/2014/main" xmlns:p14="http://schemas.microsoft.com/office/powerpoint/2010/main" xmlns:a14="http://schemas.microsoft.com/office/drawing/2010/main" w="9525">
                   <a:solidFill>
                     <a:srgbClr val="000000"/>
                   </a:solidFill>
@@ -31072,7 +31072,7 @@
             </a:ln>
             <a:extLst>
               <a:ext uri="{91240B29-F687-4f45-9708-019B960494DF}">
-                <a14:hiddenLine xmlns:a14="http://schemas.microsoft.com/office/drawing/2010/main" xmlns:p14="http://schemas.microsoft.com/office/powerpoint/2010/main" xmlns:a16="http://schemas.microsoft.com/office/drawing/2014/main" xmlns="" w="9525">
+                <a14:hiddenLine xmlns="" xmlns:a16="http://schemas.microsoft.com/office/drawing/2014/main" xmlns:p14="http://schemas.microsoft.com/office/powerpoint/2010/main" xmlns:a14="http://schemas.microsoft.com/office/drawing/2010/main" w="9525">
                   <a:solidFill>
                     <a:srgbClr val="000000"/>
                   </a:solidFill>
@@ -31152,7 +31152,7 @@
             </a:ln>
             <a:extLst>
               <a:ext uri="{91240B29-F687-4f45-9708-019B960494DF}">
-                <a14:hiddenLine xmlns:a14="http://schemas.microsoft.com/office/drawing/2010/main" xmlns:p14="http://schemas.microsoft.com/office/powerpoint/2010/main" xmlns:a16="http://schemas.microsoft.com/office/drawing/2014/main" xmlns="" w="9525">
+                <a14:hiddenLine xmlns="" xmlns:a16="http://schemas.microsoft.com/office/drawing/2014/main" xmlns:p14="http://schemas.microsoft.com/office/powerpoint/2010/main" xmlns:a14="http://schemas.microsoft.com/office/drawing/2010/main" w="9525">
                   <a:solidFill>
                     <a:srgbClr val="000000"/>
                   </a:solidFill>
@@ -31257,7 +31257,7 @@
             </a:ln>
             <a:extLst>
               <a:ext uri="{91240B29-F687-4f45-9708-019B960494DF}">
-                <a14:hiddenLine xmlns:a14="http://schemas.microsoft.com/office/drawing/2010/main" xmlns:p14="http://schemas.microsoft.com/office/powerpoint/2010/main" xmlns:a16="http://schemas.microsoft.com/office/drawing/2014/main" xmlns="" w="9525">
+                <a14:hiddenLine xmlns="" xmlns:a16="http://schemas.microsoft.com/office/drawing/2014/main" xmlns:p14="http://schemas.microsoft.com/office/powerpoint/2010/main" xmlns:a14="http://schemas.microsoft.com/office/drawing/2010/main" w="9525">
                   <a:solidFill>
                     <a:srgbClr val="000000"/>
                   </a:solidFill>
@@ -31334,7 +31334,7 @@
             </a:ln>
             <a:extLst>
               <a:ext uri="{91240B29-F687-4f45-9708-019B960494DF}">
-                <a14:hiddenLine xmlns:a14="http://schemas.microsoft.com/office/drawing/2010/main" xmlns:p14="http://schemas.microsoft.com/office/powerpoint/2010/main" xmlns:a16="http://schemas.microsoft.com/office/drawing/2014/main" xmlns="" w="9525">
+                <a14:hiddenLine xmlns="" xmlns:a16="http://schemas.microsoft.com/office/drawing/2014/main" xmlns:p14="http://schemas.microsoft.com/office/powerpoint/2010/main" xmlns:a14="http://schemas.microsoft.com/office/drawing/2010/main" w="9525">
                   <a:solidFill>
                     <a:srgbClr val="000000"/>
                   </a:solidFill>
@@ -31439,7 +31439,7 @@
             </a:ln>
             <a:extLst>
               <a:ext uri="{91240B29-F687-4f45-9708-019B960494DF}">
-                <a14:hiddenLine xmlns:a14="http://schemas.microsoft.com/office/drawing/2010/main" xmlns:p14="http://schemas.microsoft.com/office/powerpoint/2010/main" xmlns:a16="http://schemas.microsoft.com/office/drawing/2014/main" xmlns="" w="9525">
+                <a14:hiddenLine xmlns="" xmlns:a16="http://schemas.microsoft.com/office/drawing/2014/main" xmlns:p14="http://schemas.microsoft.com/office/powerpoint/2010/main" xmlns:a14="http://schemas.microsoft.com/office/drawing/2010/main" w="9525">
                   <a:solidFill>
                     <a:srgbClr val="000000"/>
                   </a:solidFill>
@@ -31519,7 +31519,7 @@
             </a:ln>
             <a:extLst>
               <a:ext uri="{91240B29-F687-4f45-9708-019B960494DF}">
-                <a14:hiddenLine xmlns:a14="http://schemas.microsoft.com/office/drawing/2010/main" xmlns:p14="http://schemas.microsoft.com/office/powerpoint/2010/main" xmlns:a16="http://schemas.microsoft.com/office/drawing/2014/main" xmlns="" w="9525">
+                <a14:hiddenLine xmlns="" xmlns:a16="http://schemas.microsoft.com/office/drawing/2014/main" xmlns:p14="http://schemas.microsoft.com/office/powerpoint/2010/main" xmlns:a14="http://schemas.microsoft.com/office/drawing/2010/main" w="9525">
                   <a:solidFill>
                     <a:srgbClr val="000000"/>
                   </a:solidFill>
@@ -31596,7 +31596,7 @@
             </a:ln>
             <a:extLst>
               <a:ext uri="{91240B29-F687-4f45-9708-019B960494DF}">
-                <a14:hiddenLine xmlns:a14="http://schemas.microsoft.com/office/drawing/2010/main" xmlns:p14="http://schemas.microsoft.com/office/powerpoint/2010/main" xmlns:a16="http://schemas.microsoft.com/office/drawing/2014/main" xmlns="" w="9525">
+                <a14:hiddenLine xmlns="" xmlns:a16="http://schemas.microsoft.com/office/drawing/2014/main" xmlns:p14="http://schemas.microsoft.com/office/powerpoint/2010/main" xmlns:a14="http://schemas.microsoft.com/office/drawing/2010/main" w="9525">
                   <a:solidFill>
                     <a:srgbClr val="000000"/>
                   </a:solidFill>
@@ -31701,7 +31701,7 @@
             </a:ln>
             <a:extLst>
               <a:ext uri="{91240B29-F687-4f45-9708-019B960494DF}">
-                <a14:hiddenLine xmlns:a14="http://schemas.microsoft.com/office/drawing/2010/main" xmlns:p14="http://schemas.microsoft.com/office/powerpoint/2010/main" xmlns:a16="http://schemas.microsoft.com/office/drawing/2014/main" xmlns="" w="9525">
+                <a14:hiddenLine xmlns="" xmlns:a16="http://schemas.microsoft.com/office/drawing/2014/main" xmlns:p14="http://schemas.microsoft.com/office/powerpoint/2010/main" xmlns:a14="http://schemas.microsoft.com/office/drawing/2010/main" w="9525">
                   <a:solidFill>
                     <a:srgbClr val="000000"/>
                   </a:solidFill>
@@ -31806,7 +31806,7 @@
             </a:ln>
             <a:extLst>
               <a:ext uri="{91240B29-F687-4f45-9708-019B960494DF}">
-                <a14:hiddenLine xmlns:a14="http://schemas.microsoft.com/office/drawing/2010/main" xmlns:p14="http://schemas.microsoft.com/office/powerpoint/2010/main" xmlns:a16="http://schemas.microsoft.com/office/drawing/2014/main" xmlns="" w="9525">
+                <a14:hiddenLine xmlns="" xmlns:a16="http://schemas.microsoft.com/office/drawing/2014/main" xmlns:p14="http://schemas.microsoft.com/office/powerpoint/2010/main" xmlns:a14="http://schemas.microsoft.com/office/drawing/2010/main" w="9525">
                   <a:solidFill>
                     <a:srgbClr val="000000"/>
                   </a:solidFill>
@@ -31886,7 +31886,7 @@
             </a:ln>
             <a:extLst>
               <a:ext uri="{91240B29-F687-4f45-9708-019B960494DF}">
-                <a14:hiddenLine xmlns:a14="http://schemas.microsoft.com/office/drawing/2010/main" xmlns:p14="http://schemas.microsoft.com/office/powerpoint/2010/main" xmlns:a16="http://schemas.microsoft.com/office/drawing/2014/main" xmlns="" w="9525">
+                <a14:hiddenLine xmlns="" xmlns:a16="http://schemas.microsoft.com/office/drawing/2014/main" xmlns:p14="http://schemas.microsoft.com/office/powerpoint/2010/main" xmlns:a14="http://schemas.microsoft.com/office/drawing/2010/main" w="9525">
                   <a:solidFill>
                     <a:srgbClr val="000000"/>
                   </a:solidFill>
@@ -32021,7 +32021,7 @@
             </a:ln>
             <a:extLst>
               <a:ext uri="{91240B29-F687-4f45-9708-019B960494DF}">
-                <a14:hiddenLine xmlns:a14="http://schemas.microsoft.com/office/drawing/2010/main" xmlns:p14="http://schemas.microsoft.com/office/powerpoint/2010/main" xmlns:a16="http://schemas.microsoft.com/office/drawing/2014/main" xmlns="" w="9525">
+                <a14:hiddenLine xmlns="" xmlns:a16="http://schemas.microsoft.com/office/drawing/2014/main" xmlns:p14="http://schemas.microsoft.com/office/powerpoint/2010/main" xmlns:a14="http://schemas.microsoft.com/office/drawing/2010/main" w="9525">
                   <a:solidFill>
                     <a:srgbClr val="000000"/>
                   </a:solidFill>
@@ -32196,7 +32196,7 @@
           <a:noFill/>
           <a:extLst>
             <a:ext uri="{909E8E84-426E-40dd-AFC4-6F175D3DCCD1}">
-              <a14:hiddenFill xmlns:a14="http://schemas.microsoft.com/office/drawing/2010/main" xmlns:p14="http://schemas.microsoft.com/office/powerpoint/2010/main" xmlns:a16="http://schemas.microsoft.com/office/drawing/2014/main" xmlns="">
+              <a14:hiddenFill xmlns="" xmlns:a16="http://schemas.microsoft.com/office/drawing/2014/main" xmlns:p14="http://schemas.microsoft.com/office/powerpoint/2010/main" xmlns:a14="http://schemas.microsoft.com/office/drawing/2010/main">
                 <a:solidFill>
                   <a:srgbClr val="FFFFFF"/>
                 </a:solidFill>
@@ -32417,7 +32417,7 @@
             </a:ln>
             <a:extLst>
               <a:ext uri="{91240B29-F687-4f45-9708-019B960494DF}">
-                <a14:hiddenLine xmlns:a14="http://schemas.microsoft.com/office/drawing/2010/main" xmlns:p14="http://schemas.microsoft.com/office/powerpoint/2010/main" xmlns:a16="http://schemas.microsoft.com/office/drawing/2014/main" xmlns="" w="9525">
+                <a14:hiddenLine xmlns="" xmlns:a16="http://schemas.microsoft.com/office/drawing/2014/main" xmlns:p14="http://schemas.microsoft.com/office/powerpoint/2010/main" xmlns:a14="http://schemas.microsoft.com/office/drawing/2010/main" w="9525">
                   <a:solidFill>
                     <a:srgbClr val="000000"/>
                   </a:solidFill>
@@ -32522,7 +32522,7 @@
             </a:ln>
             <a:extLst>
               <a:ext uri="{91240B29-F687-4f45-9708-019B960494DF}">
-                <a14:hiddenLine xmlns:a14="http://schemas.microsoft.com/office/drawing/2010/main" xmlns:p14="http://schemas.microsoft.com/office/powerpoint/2010/main" xmlns:a16="http://schemas.microsoft.com/office/drawing/2014/main" xmlns="" w="9525">
+                <a14:hiddenLine xmlns="" xmlns:a16="http://schemas.microsoft.com/office/drawing/2014/main" xmlns:p14="http://schemas.microsoft.com/office/powerpoint/2010/main" xmlns:a14="http://schemas.microsoft.com/office/drawing/2010/main" w="9525">
                   <a:solidFill>
                     <a:srgbClr val="000000"/>
                   </a:solidFill>
@@ -32627,7 +32627,7 @@
             </a:ln>
             <a:extLst>
               <a:ext uri="{91240B29-F687-4f45-9708-019B960494DF}">
-                <a14:hiddenLine xmlns:a14="http://schemas.microsoft.com/office/drawing/2010/main" xmlns:p14="http://schemas.microsoft.com/office/powerpoint/2010/main" xmlns:a16="http://schemas.microsoft.com/office/drawing/2014/main" xmlns="" w="9525">
+                <a14:hiddenLine xmlns="" xmlns:a16="http://schemas.microsoft.com/office/drawing/2014/main" xmlns:p14="http://schemas.microsoft.com/office/powerpoint/2010/main" xmlns:a14="http://schemas.microsoft.com/office/drawing/2010/main" w="9525">
                   <a:solidFill>
                     <a:srgbClr val="000000"/>
                   </a:solidFill>
@@ -32704,7 +32704,7 @@
             </a:ln>
             <a:extLst>
               <a:ext uri="{91240B29-F687-4f45-9708-019B960494DF}">
-                <a14:hiddenLine xmlns:a14="http://schemas.microsoft.com/office/drawing/2010/main" xmlns:p14="http://schemas.microsoft.com/office/powerpoint/2010/main" xmlns:a16="http://schemas.microsoft.com/office/drawing/2014/main" xmlns="" w="9525">
+                <a14:hiddenLine xmlns="" xmlns:a16="http://schemas.microsoft.com/office/drawing/2014/main" xmlns:p14="http://schemas.microsoft.com/office/powerpoint/2010/main" xmlns:a14="http://schemas.microsoft.com/office/drawing/2010/main" w="9525">
                   <a:solidFill>
                     <a:srgbClr val="000000"/>
                   </a:solidFill>
@@ -32809,7 +32809,7 @@
             </a:ln>
             <a:extLst>
               <a:ext uri="{91240B29-F687-4f45-9708-019B960494DF}">
-                <a14:hiddenLine xmlns:a14="http://schemas.microsoft.com/office/drawing/2010/main" xmlns:p14="http://schemas.microsoft.com/office/powerpoint/2010/main" xmlns:a16="http://schemas.microsoft.com/office/drawing/2014/main" xmlns="" w="9525">
+                <a14:hiddenLine xmlns="" xmlns:a16="http://schemas.microsoft.com/office/drawing/2014/main" xmlns:p14="http://schemas.microsoft.com/office/powerpoint/2010/main" xmlns:a14="http://schemas.microsoft.com/office/drawing/2010/main" w="9525">
                   <a:solidFill>
                     <a:srgbClr val="000000"/>
                   </a:solidFill>
@@ -32886,7 +32886,7 @@
             </a:ln>
             <a:extLst>
               <a:ext uri="{91240B29-F687-4f45-9708-019B960494DF}">
-                <a14:hiddenLine xmlns:a14="http://schemas.microsoft.com/office/drawing/2010/main" xmlns:p14="http://schemas.microsoft.com/office/powerpoint/2010/main" xmlns:a16="http://schemas.microsoft.com/office/drawing/2014/main" xmlns="" w="9525">
+                <a14:hiddenLine xmlns="" xmlns:a16="http://schemas.microsoft.com/office/drawing/2014/main" xmlns:p14="http://schemas.microsoft.com/office/powerpoint/2010/main" xmlns:a14="http://schemas.microsoft.com/office/drawing/2010/main" w="9525">
                   <a:solidFill>
                     <a:srgbClr val="000000"/>
                   </a:solidFill>
@@ -32963,7 +32963,7 @@
             </a:ln>
             <a:extLst>
               <a:ext uri="{91240B29-F687-4f45-9708-019B960494DF}">
-                <a14:hiddenLine xmlns:a14="http://schemas.microsoft.com/office/drawing/2010/main" xmlns:p14="http://schemas.microsoft.com/office/powerpoint/2010/main" xmlns:a16="http://schemas.microsoft.com/office/drawing/2014/main" xmlns="" w="9525">
+                <a14:hiddenLine xmlns="" xmlns:a16="http://schemas.microsoft.com/office/drawing/2014/main" xmlns:p14="http://schemas.microsoft.com/office/powerpoint/2010/main" xmlns:a14="http://schemas.microsoft.com/office/drawing/2010/main" w="9525">
                   <a:solidFill>
                     <a:srgbClr val="000000"/>
                   </a:solidFill>
@@ -33068,7 +33068,7 @@
             </a:ln>
             <a:extLst>
               <a:ext uri="{91240B29-F687-4f45-9708-019B960494DF}">
-                <a14:hiddenLine xmlns:a14="http://schemas.microsoft.com/office/drawing/2010/main" xmlns:p14="http://schemas.microsoft.com/office/powerpoint/2010/main" xmlns:a16="http://schemas.microsoft.com/office/drawing/2014/main" xmlns="" w="9525">
+                <a14:hiddenLine xmlns="" xmlns:a16="http://schemas.microsoft.com/office/drawing/2014/main" xmlns:p14="http://schemas.microsoft.com/office/powerpoint/2010/main" xmlns:a14="http://schemas.microsoft.com/office/drawing/2010/main" w="9525">
                   <a:solidFill>
                     <a:srgbClr val="000000"/>
                   </a:solidFill>
@@ -33173,7 +33173,7 @@
             </a:ln>
             <a:extLst>
               <a:ext uri="{91240B29-F687-4f45-9708-019B960494DF}">
-                <a14:hiddenLine xmlns:a14="http://schemas.microsoft.com/office/drawing/2010/main" xmlns:p14="http://schemas.microsoft.com/office/powerpoint/2010/main" xmlns:a16="http://schemas.microsoft.com/office/drawing/2014/main" xmlns="" w="9525">
+                <a14:hiddenLine xmlns="" xmlns:a16="http://schemas.microsoft.com/office/drawing/2014/main" xmlns:p14="http://schemas.microsoft.com/office/powerpoint/2010/main" xmlns:a14="http://schemas.microsoft.com/office/drawing/2010/main" w="9525">
                   <a:solidFill>
                     <a:srgbClr val="000000"/>
                   </a:solidFill>
@@ -33250,7 +33250,7 @@
             </a:ln>
             <a:extLst>
               <a:ext uri="{91240B29-F687-4f45-9708-019B960494DF}">
-                <a14:hiddenLine xmlns:a14="http://schemas.microsoft.com/office/drawing/2010/main" xmlns:p14="http://schemas.microsoft.com/office/powerpoint/2010/main" xmlns:a16="http://schemas.microsoft.com/office/drawing/2014/main" xmlns="" w="9525">
+                <a14:hiddenLine xmlns="" xmlns:a16="http://schemas.microsoft.com/office/drawing/2014/main" xmlns:p14="http://schemas.microsoft.com/office/powerpoint/2010/main" xmlns:a14="http://schemas.microsoft.com/office/drawing/2010/main" w="9525">
                   <a:solidFill>
                     <a:srgbClr val="000000"/>
                   </a:solidFill>
@@ -33375,7 +33375,7 @@
             </a:ln>
             <a:extLst>
               <a:ext uri="{91240B29-F687-4f45-9708-019B960494DF}">
-                <a14:hiddenLine xmlns:a14="http://schemas.microsoft.com/office/drawing/2010/main" xmlns:p14="http://schemas.microsoft.com/office/powerpoint/2010/main" xmlns:a16="http://schemas.microsoft.com/office/drawing/2014/main" xmlns="" w="9525">
+                <a14:hiddenLine xmlns="" xmlns:a16="http://schemas.microsoft.com/office/drawing/2014/main" xmlns:p14="http://schemas.microsoft.com/office/powerpoint/2010/main" xmlns:a14="http://schemas.microsoft.com/office/drawing/2010/main" w="9525">
                   <a:solidFill>
                     <a:srgbClr val="000000"/>
                   </a:solidFill>
@@ -33489,7 +33489,7 @@
             </a:ln>
             <a:extLst>
               <a:ext uri="{91240B29-F687-4f45-9708-019B960494DF}">
-                <a14:hiddenLine xmlns:a14="http://schemas.microsoft.com/office/drawing/2010/main" xmlns:p14="http://schemas.microsoft.com/office/powerpoint/2010/main" xmlns:a16="http://schemas.microsoft.com/office/drawing/2014/main" xmlns="" w="9525">
+                <a14:hiddenLine xmlns="" xmlns:a16="http://schemas.microsoft.com/office/drawing/2014/main" xmlns:p14="http://schemas.microsoft.com/office/powerpoint/2010/main" xmlns:a14="http://schemas.microsoft.com/office/drawing/2010/main" w="9525">
                   <a:solidFill>
                     <a:srgbClr val="000000"/>
                   </a:solidFill>
@@ -33566,7 +33566,7 @@
             </a:ln>
             <a:extLst>
               <a:ext uri="{91240B29-F687-4f45-9708-019B960494DF}">
-                <a14:hiddenLine xmlns:a14="http://schemas.microsoft.com/office/drawing/2010/main" xmlns:p14="http://schemas.microsoft.com/office/powerpoint/2010/main" xmlns:a16="http://schemas.microsoft.com/office/drawing/2014/main" xmlns="" w="9525">
+                <a14:hiddenLine xmlns="" xmlns:a16="http://schemas.microsoft.com/office/drawing/2014/main" xmlns:p14="http://schemas.microsoft.com/office/powerpoint/2010/main" xmlns:a14="http://schemas.microsoft.com/office/drawing/2010/main" w="9525">
                   <a:solidFill>
                     <a:srgbClr val="000000"/>
                   </a:solidFill>
@@ -33643,7 +33643,7 @@
             </a:ln>
             <a:extLst>
               <a:ext uri="{91240B29-F687-4f45-9708-019B960494DF}">
-                <a14:hiddenLine xmlns:a14="http://schemas.microsoft.com/office/drawing/2010/main" xmlns:p14="http://schemas.microsoft.com/office/powerpoint/2010/main" xmlns:a16="http://schemas.microsoft.com/office/drawing/2014/main" xmlns="" w="9525">
+                <a14:hiddenLine xmlns="" xmlns:a16="http://schemas.microsoft.com/office/drawing/2014/main" xmlns:p14="http://schemas.microsoft.com/office/powerpoint/2010/main" xmlns:a14="http://schemas.microsoft.com/office/drawing/2010/main" w="9525">
                   <a:solidFill>
                     <a:srgbClr val="000000"/>
                   </a:solidFill>
@@ -33748,7 +33748,7 @@
             </a:ln>
             <a:extLst>
               <a:ext uri="{91240B29-F687-4f45-9708-019B960494DF}">
-                <a14:hiddenLine xmlns:a14="http://schemas.microsoft.com/office/drawing/2010/main" xmlns:p14="http://schemas.microsoft.com/office/powerpoint/2010/main" xmlns:a16="http://schemas.microsoft.com/office/drawing/2014/main" xmlns="" w="9525">
+                <a14:hiddenLine xmlns="" xmlns:a16="http://schemas.microsoft.com/office/drawing/2014/main" xmlns:p14="http://schemas.microsoft.com/office/powerpoint/2010/main" xmlns:a14="http://schemas.microsoft.com/office/drawing/2010/main" w="9525">
                   <a:solidFill>
                     <a:srgbClr val="000000"/>
                   </a:solidFill>
@@ -33797,7 +33797,7 @@
             </a:ln>
             <a:extLst>
               <a:ext uri="{91240B29-F687-4f45-9708-019B960494DF}">
-                <a14:hiddenLine xmlns:a14="http://schemas.microsoft.com/office/drawing/2010/main" xmlns:p14="http://schemas.microsoft.com/office/powerpoint/2010/main" xmlns:a16="http://schemas.microsoft.com/office/drawing/2014/main" xmlns="" w="9525">
+                <a14:hiddenLine xmlns="" xmlns:a16="http://schemas.microsoft.com/office/drawing/2014/main" xmlns:p14="http://schemas.microsoft.com/office/powerpoint/2010/main" xmlns:a14="http://schemas.microsoft.com/office/drawing/2010/main" w="9525">
                   <a:solidFill>
                     <a:srgbClr val="000000"/>
                   </a:solidFill>
@@ -33877,7 +33877,7 @@
             </a:ln>
             <a:extLst>
               <a:ext uri="{91240B29-F687-4f45-9708-019B960494DF}">
-                <a14:hiddenLine xmlns:a14="http://schemas.microsoft.com/office/drawing/2010/main" xmlns:p14="http://schemas.microsoft.com/office/powerpoint/2010/main" xmlns:a16="http://schemas.microsoft.com/office/drawing/2014/main" xmlns="" w="9525">
+                <a14:hiddenLine xmlns="" xmlns:a16="http://schemas.microsoft.com/office/drawing/2014/main" xmlns:p14="http://schemas.microsoft.com/office/powerpoint/2010/main" xmlns:a14="http://schemas.microsoft.com/office/drawing/2010/main" w="9525">
                   <a:solidFill>
                     <a:srgbClr val="000000"/>
                   </a:solidFill>
@@ -33982,7 +33982,7 @@
             </a:ln>
             <a:extLst>
               <a:ext uri="{91240B29-F687-4f45-9708-019B960494DF}">
-                <a14:hiddenLine xmlns:a14="http://schemas.microsoft.com/office/drawing/2010/main" xmlns:p14="http://schemas.microsoft.com/office/powerpoint/2010/main" xmlns:a16="http://schemas.microsoft.com/office/drawing/2014/main" xmlns="" w="9525">
+                <a14:hiddenLine xmlns="" xmlns:a16="http://schemas.microsoft.com/office/drawing/2014/main" xmlns:p14="http://schemas.microsoft.com/office/powerpoint/2010/main" xmlns:a14="http://schemas.microsoft.com/office/drawing/2010/main" w="9525">
                   <a:solidFill>
                     <a:srgbClr val="000000"/>
                   </a:solidFill>
@@ -34059,7 +34059,7 @@
             </a:ln>
             <a:extLst>
               <a:ext uri="{91240B29-F687-4f45-9708-019B960494DF}">
-                <a14:hiddenLine xmlns:a14="http://schemas.microsoft.com/office/drawing/2010/main" xmlns:p14="http://schemas.microsoft.com/office/powerpoint/2010/main" xmlns:a16="http://schemas.microsoft.com/office/drawing/2014/main" xmlns="" w="9525">
+                <a14:hiddenLine xmlns="" xmlns:a16="http://schemas.microsoft.com/office/drawing/2014/main" xmlns:p14="http://schemas.microsoft.com/office/powerpoint/2010/main" xmlns:a14="http://schemas.microsoft.com/office/drawing/2010/main" w="9525">
                   <a:solidFill>
                     <a:srgbClr val="000000"/>
                   </a:solidFill>
@@ -34164,7 +34164,7 @@
             </a:ln>
             <a:extLst>
               <a:ext uri="{91240B29-F687-4f45-9708-019B960494DF}">
-                <a14:hiddenLine xmlns:a14="http://schemas.microsoft.com/office/drawing/2010/main" xmlns:p14="http://schemas.microsoft.com/office/powerpoint/2010/main" xmlns:a16="http://schemas.microsoft.com/office/drawing/2014/main" xmlns="" w="9525">
+                <a14:hiddenLine xmlns="" xmlns:a16="http://schemas.microsoft.com/office/drawing/2014/main" xmlns:p14="http://schemas.microsoft.com/office/powerpoint/2010/main" xmlns:a14="http://schemas.microsoft.com/office/drawing/2010/main" w="9525">
                   <a:solidFill>
                     <a:srgbClr val="000000"/>
                   </a:solidFill>
@@ -34244,7 +34244,7 @@
             </a:ln>
             <a:extLst>
               <a:ext uri="{91240B29-F687-4f45-9708-019B960494DF}">
-                <a14:hiddenLine xmlns:a14="http://schemas.microsoft.com/office/drawing/2010/main" xmlns:p14="http://schemas.microsoft.com/office/powerpoint/2010/main" xmlns:a16="http://schemas.microsoft.com/office/drawing/2014/main" xmlns="" w="9525">
+                <a14:hiddenLine xmlns="" xmlns:a16="http://schemas.microsoft.com/office/drawing/2014/main" xmlns:p14="http://schemas.microsoft.com/office/powerpoint/2010/main" xmlns:a14="http://schemas.microsoft.com/office/drawing/2010/main" w="9525">
                   <a:solidFill>
                     <a:srgbClr val="000000"/>
                   </a:solidFill>
@@ -34321,7 +34321,7 @@
             </a:ln>
             <a:extLst>
               <a:ext uri="{91240B29-F687-4f45-9708-019B960494DF}">
-                <a14:hiddenLine xmlns:a14="http://schemas.microsoft.com/office/drawing/2010/main" xmlns:p14="http://schemas.microsoft.com/office/powerpoint/2010/main" xmlns:a16="http://schemas.microsoft.com/office/drawing/2014/main" xmlns="" w="9525">
+                <a14:hiddenLine xmlns="" xmlns:a16="http://schemas.microsoft.com/office/drawing/2014/main" xmlns:p14="http://schemas.microsoft.com/office/powerpoint/2010/main" xmlns:a14="http://schemas.microsoft.com/office/drawing/2010/main" w="9525">
                   <a:solidFill>
                     <a:srgbClr val="000000"/>
                   </a:solidFill>
@@ -34426,7 +34426,7 @@
             </a:ln>
             <a:extLst>
               <a:ext uri="{91240B29-F687-4f45-9708-019B960494DF}">
-                <a14:hiddenLine xmlns:a14="http://schemas.microsoft.com/office/drawing/2010/main" xmlns:p14="http://schemas.microsoft.com/office/powerpoint/2010/main" xmlns:a16="http://schemas.microsoft.com/office/drawing/2014/main" xmlns="" w="9525">
+                <a14:hiddenLine xmlns="" xmlns:a16="http://schemas.microsoft.com/office/drawing/2014/main" xmlns:p14="http://schemas.microsoft.com/office/powerpoint/2010/main" xmlns:a14="http://schemas.microsoft.com/office/drawing/2010/main" w="9525">
                   <a:solidFill>
                     <a:srgbClr val="000000"/>
                   </a:solidFill>
@@ -34531,7 +34531,7 @@
             </a:ln>
             <a:extLst>
               <a:ext uri="{91240B29-F687-4f45-9708-019B960494DF}">
-                <a14:hiddenLine xmlns:a14="http://schemas.microsoft.com/office/drawing/2010/main" xmlns:p14="http://schemas.microsoft.com/office/powerpoint/2010/main" xmlns:a16="http://schemas.microsoft.com/office/drawing/2014/main" xmlns="" w="9525">
+                <a14:hiddenLine xmlns="" xmlns:a16="http://schemas.microsoft.com/office/drawing/2014/main" xmlns:p14="http://schemas.microsoft.com/office/powerpoint/2010/main" xmlns:a14="http://schemas.microsoft.com/office/drawing/2010/main" w="9525">
                   <a:solidFill>
                     <a:srgbClr val="000000"/>
                   </a:solidFill>
@@ -34611,7 +34611,7 @@
             </a:ln>
             <a:extLst>
               <a:ext uri="{91240B29-F687-4f45-9708-019B960494DF}">
-                <a14:hiddenLine xmlns:a14="http://schemas.microsoft.com/office/drawing/2010/main" xmlns:p14="http://schemas.microsoft.com/office/powerpoint/2010/main" xmlns:a16="http://schemas.microsoft.com/office/drawing/2014/main" xmlns="" w="9525">
+                <a14:hiddenLine xmlns="" xmlns:a16="http://schemas.microsoft.com/office/drawing/2014/main" xmlns:p14="http://schemas.microsoft.com/office/powerpoint/2010/main" xmlns:a14="http://schemas.microsoft.com/office/drawing/2010/main" w="9525">
                   <a:solidFill>
                     <a:srgbClr val="000000"/>
                   </a:solidFill>
@@ -34746,7 +34746,7 @@
             </a:ln>
             <a:extLst>
               <a:ext uri="{91240B29-F687-4f45-9708-019B960494DF}">
-                <a14:hiddenLine xmlns:a14="http://schemas.microsoft.com/office/drawing/2010/main" xmlns:p14="http://schemas.microsoft.com/office/powerpoint/2010/main" xmlns:a16="http://schemas.microsoft.com/office/drawing/2014/main" xmlns="" w="9525">
+                <a14:hiddenLine xmlns="" xmlns:a16="http://schemas.microsoft.com/office/drawing/2014/main" xmlns:p14="http://schemas.microsoft.com/office/powerpoint/2010/main" xmlns:a14="http://schemas.microsoft.com/office/drawing/2010/main" w="9525">
                   <a:solidFill>
                     <a:srgbClr val="000000"/>
                   </a:solidFill>
@@ -34948,7 +34948,7 @@
             </a:ln>
             <a:extLst>
               <a:ext uri="{91240B29-F687-4f45-9708-019B960494DF}">
-                <a14:hiddenLine xmlns:a14="http://schemas.microsoft.com/office/drawing/2010/main" xmlns:p14="http://schemas.microsoft.com/office/powerpoint/2010/main" xmlns:a16="http://schemas.microsoft.com/office/drawing/2014/main" xmlns="" w="9525">
+                <a14:hiddenLine xmlns="" xmlns:a16="http://schemas.microsoft.com/office/drawing/2014/main" xmlns:p14="http://schemas.microsoft.com/office/powerpoint/2010/main" xmlns:a14="http://schemas.microsoft.com/office/drawing/2010/main" w="9525">
                   <a:solidFill>
                     <a:srgbClr val="000000"/>
                   </a:solidFill>
@@ -35053,7 +35053,7 @@
             </a:ln>
             <a:extLst>
               <a:ext uri="{91240B29-F687-4f45-9708-019B960494DF}">
-                <a14:hiddenLine xmlns:a14="http://schemas.microsoft.com/office/drawing/2010/main" xmlns:p14="http://schemas.microsoft.com/office/powerpoint/2010/main" xmlns:a16="http://schemas.microsoft.com/office/drawing/2014/main" xmlns="" w="9525">
+                <a14:hiddenLine xmlns="" xmlns:a16="http://schemas.microsoft.com/office/drawing/2014/main" xmlns:p14="http://schemas.microsoft.com/office/powerpoint/2010/main" xmlns:a14="http://schemas.microsoft.com/office/drawing/2010/main" w="9525">
                   <a:solidFill>
                     <a:srgbClr val="000000"/>
                   </a:solidFill>
@@ -35158,7 +35158,7 @@
             </a:ln>
             <a:extLst>
               <a:ext uri="{91240B29-F687-4f45-9708-019B960494DF}">
-                <a14:hiddenLine xmlns:a14="http://schemas.microsoft.com/office/drawing/2010/main" xmlns:p14="http://schemas.microsoft.com/office/powerpoint/2010/main" xmlns:a16="http://schemas.microsoft.com/office/drawing/2014/main" xmlns="" w="9525">
+                <a14:hiddenLine xmlns="" xmlns:a16="http://schemas.microsoft.com/office/drawing/2014/main" xmlns:p14="http://schemas.microsoft.com/office/powerpoint/2010/main" xmlns:a14="http://schemas.microsoft.com/office/drawing/2010/main" w="9525">
                   <a:solidFill>
                     <a:srgbClr val="000000"/>
                   </a:solidFill>
@@ -35235,7 +35235,7 @@
             </a:ln>
             <a:extLst>
               <a:ext uri="{91240B29-F687-4f45-9708-019B960494DF}">
-                <a14:hiddenLine xmlns:a14="http://schemas.microsoft.com/office/drawing/2010/main" xmlns:p14="http://schemas.microsoft.com/office/powerpoint/2010/main" xmlns:a16="http://schemas.microsoft.com/office/drawing/2014/main" xmlns="" w="9525">
+                <a14:hiddenLine xmlns="" xmlns:a16="http://schemas.microsoft.com/office/drawing/2014/main" xmlns:p14="http://schemas.microsoft.com/office/powerpoint/2010/main" xmlns:a14="http://schemas.microsoft.com/office/drawing/2010/main" w="9525">
                   <a:solidFill>
                     <a:srgbClr val="000000"/>
                   </a:solidFill>
@@ -35340,7 +35340,7 @@
             </a:ln>
             <a:extLst>
               <a:ext uri="{91240B29-F687-4f45-9708-019B960494DF}">
-                <a14:hiddenLine xmlns:a14="http://schemas.microsoft.com/office/drawing/2010/main" xmlns:p14="http://schemas.microsoft.com/office/powerpoint/2010/main" xmlns:a16="http://schemas.microsoft.com/office/drawing/2014/main" xmlns="" w="9525">
+                <a14:hiddenLine xmlns="" xmlns:a16="http://schemas.microsoft.com/office/drawing/2014/main" xmlns:p14="http://schemas.microsoft.com/office/powerpoint/2010/main" xmlns:a14="http://schemas.microsoft.com/office/drawing/2010/main" w="9525">
                   <a:solidFill>
                     <a:srgbClr val="000000"/>
                   </a:solidFill>
@@ -35417,7 +35417,7 @@
             </a:ln>
             <a:extLst>
               <a:ext uri="{91240B29-F687-4f45-9708-019B960494DF}">
-                <a14:hiddenLine xmlns:a14="http://schemas.microsoft.com/office/drawing/2010/main" xmlns:p14="http://schemas.microsoft.com/office/powerpoint/2010/main" xmlns:a16="http://schemas.microsoft.com/office/drawing/2014/main" xmlns="" w="9525">
+                <a14:hiddenLine xmlns="" xmlns:a16="http://schemas.microsoft.com/office/drawing/2014/main" xmlns:p14="http://schemas.microsoft.com/office/powerpoint/2010/main" xmlns:a14="http://schemas.microsoft.com/office/drawing/2010/main" w="9525">
                   <a:solidFill>
                     <a:srgbClr val="000000"/>
                   </a:solidFill>
@@ -35494,7 +35494,7 @@
             </a:ln>
             <a:extLst>
               <a:ext uri="{91240B29-F687-4f45-9708-019B960494DF}">
-                <a14:hiddenLine xmlns:a14="http://schemas.microsoft.com/office/drawing/2010/main" xmlns:p14="http://schemas.microsoft.com/office/powerpoint/2010/main" xmlns:a16="http://schemas.microsoft.com/office/drawing/2014/main" xmlns="" w="9525">
+                <a14:hiddenLine xmlns="" xmlns:a16="http://schemas.microsoft.com/office/drawing/2014/main" xmlns:p14="http://schemas.microsoft.com/office/powerpoint/2010/main" xmlns:a14="http://schemas.microsoft.com/office/drawing/2010/main" w="9525">
                   <a:solidFill>
                     <a:srgbClr val="000000"/>
                   </a:solidFill>
@@ -35599,7 +35599,7 @@
             </a:ln>
             <a:extLst>
               <a:ext uri="{91240B29-F687-4f45-9708-019B960494DF}">
-                <a14:hiddenLine xmlns:a14="http://schemas.microsoft.com/office/drawing/2010/main" xmlns:p14="http://schemas.microsoft.com/office/powerpoint/2010/main" xmlns:a16="http://schemas.microsoft.com/office/drawing/2014/main" xmlns="" w="9525">
+                <a14:hiddenLine xmlns="" xmlns:a16="http://schemas.microsoft.com/office/drawing/2014/main" xmlns:p14="http://schemas.microsoft.com/office/powerpoint/2010/main" xmlns:a14="http://schemas.microsoft.com/office/drawing/2010/main" w="9525">
                   <a:solidFill>
                     <a:srgbClr val="000000"/>
                   </a:solidFill>
@@ -35704,7 +35704,7 @@
             </a:ln>
             <a:extLst>
               <a:ext uri="{91240B29-F687-4f45-9708-019B960494DF}">
-                <a14:hiddenLine xmlns:a14="http://schemas.microsoft.com/office/drawing/2010/main" xmlns:p14="http://schemas.microsoft.com/office/powerpoint/2010/main" xmlns:a16="http://schemas.microsoft.com/office/drawing/2014/main" xmlns="" w="9525">
+                <a14:hiddenLine xmlns="" xmlns:a16="http://schemas.microsoft.com/office/drawing/2014/main" xmlns:p14="http://schemas.microsoft.com/office/powerpoint/2010/main" xmlns:a14="http://schemas.microsoft.com/office/drawing/2010/main" w="9525">
                   <a:solidFill>
                     <a:srgbClr val="000000"/>
                   </a:solidFill>
@@ -35781,7 +35781,7 @@
             </a:ln>
             <a:extLst>
               <a:ext uri="{91240B29-F687-4f45-9708-019B960494DF}">
-                <a14:hiddenLine xmlns:a14="http://schemas.microsoft.com/office/drawing/2010/main" xmlns:p14="http://schemas.microsoft.com/office/powerpoint/2010/main" xmlns:a16="http://schemas.microsoft.com/office/drawing/2014/main" xmlns="" w="9525">
+                <a14:hiddenLine xmlns="" xmlns:a16="http://schemas.microsoft.com/office/drawing/2014/main" xmlns:p14="http://schemas.microsoft.com/office/powerpoint/2010/main" xmlns:a14="http://schemas.microsoft.com/office/drawing/2010/main" w="9525">
                   <a:solidFill>
                     <a:srgbClr val="000000"/>
                   </a:solidFill>
@@ -35906,7 +35906,7 @@
             </a:ln>
             <a:extLst>
               <a:ext uri="{91240B29-F687-4f45-9708-019B960494DF}">
-                <a14:hiddenLine xmlns:a14="http://schemas.microsoft.com/office/drawing/2010/main" xmlns:p14="http://schemas.microsoft.com/office/powerpoint/2010/main" xmlns:a16="http://schemas.microsoft.com/office/drawing/2014/main" xmlns="" w="9525">
+                <a14:hiddenLine xmlns="" xmlns:a16="http://schemas.microsoft.com/office/drawing/2014/main" xmlns:p14="http://schemas.microsoft.com/office/powerpoint/2010/main" xmlns:a14="http://schemas.microsoft.com/office/drawing/2010/main" w="9525">
                   <a:solidFill>
                     <a:srgbClr val="000000"/>
                   </a:solidFill>
@@ -36020,7 +36020,7 @@
             </a:ln>
             <a:extLst>
               <a:ext uri="{91240B29-F687-4f45-9708-019B960494DF}">
-                <a14:hiddenLine xmlns:a14="http://schemas.microsoft.com/office/drawing/2010/main" xmlns:p14="http://schemas.microsoft.com/office/powerpoint/2010/main" xmlns:a16="http://schemas.microsoft.com/office/drawing/2014/main" xmlns="" w="9525">
+                <a14:hiddenLine xmlns="" xmlns:a16="http://schemas.microsoft.com/office/drawing/2014/main" xmlns:p14="http://schemas.microsoft.com/office/powerpoint/2010/main" xmlns:a14="http://schemas.microsoft.com/office/drawing/2010/main" w="9525">
                   <a:solidFill>
                     <a:srgbClr val="000000"/>
                   </a:solidFill>
@@ -36097,7 +36097,7 @@
             </a:ln>
             <a:extLst>
               <a:ext uri="{91240B29-F687-4f45-9708-019B960494DF}">
-                <a14:hiddenLine xmlns:a14="http://schemas.microsoft.com/office/drawing/2010/main" xmlns:p14="http://schemas.microsoft.com/office/powerpoint/2010/main" xmlns:a16="http://schemas.microsoft.com/office/drawing/2014/main" xmlns="" w="9525">
+                <a14:hiddenLine xmlns="" xmlns:a16="http://schemas.microsoft.com/office/drawing/2014/main" xmlns:p14="http://schemas.microsoft.com/office/powerpoint/2010/main" xmlns:a14="http://schemas.microsoft.com/office/drawing/2010/main" w="9525">
                   <a:solidFill>
                     <a:srgbClr val="000000"/>
                   </a:solidFill>
@@ -36174,7 +36174,7 @@
             </a:ln>
             <a:extLst>
               <a:ext uri="{91240B29-F687-4f45-9708-019B960494DF}">
-                <a14:hiddenLine xmlns:a14="http://schemas.microsoft.com/office/drawing/2010/main" xmlns:p14="http://schemas.microsoft.com/office/powerpoint/2010/main" xmlns:a16="http://schemas.microsoft.com/office/drawing/2014/main" xmlns="" w="9525">
+                <a14:hiddenLine xmlns="" xmlns:a16="http://schemas.microsoft.com/office/drawing/2014/main" xmlns:p14="http://schemas.microsoft.com/office/powerpoint/2010/main" xmlns:a14="http://schemas.microsoft.com/office/drawing/2010/main" w="9525">
                   <a:solidFill>
                     <a:srgbClr val="000000"/>
                   </a:solidFill>
@@ -36279,7 +36279,7 @@
             </a:ln>
             <a:extLst>
               <a:ext uri="{91240B29-F687-4f45-9708-019B960494DF}">
-                <a14:hiddenLine xmlns:a14="http://schemas.microsoft.com/office/drawing/2010/main" xmlns:p14="http://schemas.microsoft.com/office/powerpoint/2010/main" xmlns:a16="http://schemas.microsoft.com/office/drawing/2014/main" xmlns="" w="9525">
+                <a14:hiddenLine xmlns="" xmlns:a16="http://schemas.microsoft.com/office/drawing/2014/main" xmlns:p14="http://schemas.microsoft.com/office/powerpoint/2010/main" xmlns:a14="http://schemas.microsoft.com/office/drawing/2010/main" w="9525">
                   <a:solidFill>
                     <a:srgbClr val="000000"/>
                   </a:solidFill>
@@ -36328,7 +36328,7 @@
             </a:ln>
             <a:extLst>
               <a:ext uri="{91240B29-F687-4f45-9708-019B960494DF}">
-                <a14:hiddenLine xmlns:a14="http://schemas.microsoft.com/office/drawing/2010/main" xmlns:p14="http://schemas.microsoft.com/office/powerpoint/2010/main" xmlns:a16="http://schemas.microsoft.com/office/drawing/2014/main" xmlns="" w="9525">
+                <a14:hiddenLine xmlns="" xmlns:a16="http://schemas.microsoft.com/office/drawing/2014/main" xmlns:p14="http://schemas.microsoft.com/office/powerpoint/2010/main" xmlns:a14="http://schemas.microsoft.com/office/drawing/2010/main" w="9525">
                   <a:solidFill>
                     <a:srgbClr val="000000"/>
                   </a:solidFill>
@@ -36408,7 +36408,7 @@
             </a:ln>
             <a:extLst>
               <a:ext uri="{91240B29-F687-4f45-9708-019B960494DF}">
-                <a14:hiddenLine xmlns:a14="http://schemas.microsoft.com/office/drawing/2010/main" xmlns:p14="http://schemas.microsoft.com/office/powerpoint/2010/main" xmlns:a16="http://schemas.microsoft.com/office/drawing/2014/main" xmlns="" w="9525">
+                <a14:hiddenLine xmlns="" xmlns:a16="http://schemas.microsoft.com/office/drawing/2014/main" xmlns:p14="http://schemas.microsoft.com/office/powerpoint/2010/main" xmlns:a14="http://schemas.microsoft.com/office/drawing/2010/main" w="9525">
                   <a:solidFill>
                     <a:srgbClr val="000000"/>
                   </a:solidFill>
@@ -36513,7 +36513,7 @@
             </a:ln>
             <a:extLst>
               <a:ext uri="{91240B29-F687-4f45-9708-019B960494DF}">
-                <a14:hiddenLine xmlns:a14="http://schemas.microsoft.com/office/drawing/2010/main" xmlns:p14="http://schemas.microsoft.com/office/powerpoint/2010/main" xmlns:a16="http://schemas.microsoft.com/office/drawing/2014/main" xmlns="" w="9525">
+                <a14:hiddenLine xmlns="" xmlns:a16="http://schemas.microsoft.com/office/drawing/2014/main" xmlns:p14="http://schemas.microsoft.com/office/powerpoint/2010/main" xmlns:a14="http://schemas.microsoft.com/office/drawing/2010/main" w="9525">
                   <a:solidFill>
                     <a:srgbClr val="000000"/>
                   </a:solidFill>
@@ -36590,7 +36590,7 @@
             </a:ln>
             <a:extLst>
               <a:ext uri="{91240B29-F687-4f45-9708-019B960494DF}">
-                <a14:hiddenLine xmlns:a14="http://schemas.microsoft.com/office/drawing/2010/main" xmlns:p14="http://schemas.microsoft.com/office/powerpoint/2010/main" xmlns:a16="http://schemas.microsoft.com/office/drawing/2014/main" xmlns="" w="9525">
+                <a14:hiddenLine xmlns="" xmlns:a16="http://schemas.microsoft.com/office/drawing/2014/main" xmlns:p14="http://schemas.microsoft.com/office/powerpoint/2010/main" xmlns:a14="http://schemas.microsoft.com/office/drawing/2010/main" w="9525">
                   <a:solidFill>
                     <a:srgbClr val="000000"/>
                   </a:solidFill>
@@ -36695,7 +36695,7 @@
             </a:ln>
             <a:extLst>
               <a:ext uri="{91240B29-F687-4f45-9708-019B960494DF}">
-                <a14:hiddenLine xmlns:a14="http://schemas.microsoft.com/office/drawing/2010/main" xmlns:p14="http://schemas.microsoft.com/office/powerpoint/2010/main" xmlns:a16="http://schemas.microsoft.com/office/drawing/2014/main" xmlns="" w="9525">
+                <a14:hiddenLine xmlns="" xmlns:a16="http://schemas.microsoft.com/office/drawing/2014/main" xmlns:p14="http://schemas.microsoft.com/office/powerpoint/2010/main" xmlns:a14="http://schemas.microsoft.com/office/drawing/2010/main" w="9525">
                   <a:solidFill>
                     <a:srgbClr val="000000"/>
                   </a:solidFill>
@@ -36775,7 +36775,7 @@
             </a:ln>
             <a:extLst>
               <a:ext uri="{91240B29-F687-4f45-9708-019B960494DF}">
-                <a14:hiddenLine xmlns:a14="http://schemas.microsoft.com/office/drawing/2010/main" xmlns:p14="http://schemas.microsoft.com/office/powerpoint/2010/main" xmlns:a16="http://schemas.microsoft.com/office/drawing/2014/main" xmlns="" w="9525">
+                <a14:hiddenLine xmlns="" xmlns:a16="http://schemas.microsoft.com/office/drawing/2014/main" xmlns:p14="http://schemas.microsoft.com/office/powerpoint/2010/main" xmlns:a14="http://schemas.microsoft.com/office/drawing/2010/main" w="9525">
                   <a:solidFill>
                     <a:srgbClr val="000000"/>
                   </a:solidFill>
@@ -36852,7 +36852,7 @@
             </a:ln>
             <a:extLst>
               <a:ext uri="{91240B29-F687-4f45-9708-019B960494DF}">
-                <a14:hiddenLine xmlns:a14="http://schemas.microsoft.com/office/drawing/2010/main" xmlns:p14="http://schemas.microsoft.com/office/powerpoint/2010/main" xmlns:a16="http://schemas.microsoft.com/office/drawing/2014/main" xmlns="" w="9525">
+                <a14:hiddenLine xmlns="" xmlns:a16="http://schemas.microsoft.com/office/drawing/2014/main" xmlns:p14="http://schemas.microsoft.com/office/powerpoint/2010/main" xmlns:a14="http://schemas.microsoft.com/office/drawing/2010/main" w="9525">
                   <a:solidFill>
                     <a:srgbClr val="000000"/>
                   </a:solidFill>
@@ -36957,7 +36957,7 @@
             </a:ln>
             <a:extLst>
               <a:ext uri="{91240B29-F687-4f45-9708-019B960494DF}">
-                <a14:hiddenLine xmlns:a14="http://schemas.microsoft.com/office/drawing/2010/main" xmlns:p14="http://schemas.microsoft.com/office/powerpoint/2010/main" xmlns:a16="http://schemas.microsoft.com/office/drawing/2014/main" xmlns="" w="9525">
+                <a14:hiddenLine xmlns="" xmlns:a16="http://schemas.microsoft.com/office/drawing/2014/main" xmlns:p14="http://schemas.microsoft.com/office/powerpoint/2010/main" xmlns:a14="http://schemas.microsoft.com/office/drawing/2010/main" w="9525">
                   <a:solidFill>
                     <a:srgbClr val="000000"/>
                   </a:solidFill>
@@ -37062,7 +37062,7 @@
             </a:ln>
             <a:extLst>
               <a:ext uri="{91240B29-F687-4f45-9708-019B960494DF}">
-                <a14:hiddenLine xmlns:a14="http://schemas.microsoft.com/office/drawing/2010/main" xmlns:p14="http://schemas.microsoft.com/office/powerpoint/2010/main" xmlns:a16="http://schemas.microsoft.com/office/drawing/2014/main" xmlns="" w="9525">
+                <a14:hiddenLine xmlns="" xmlns:a16="http://schemas.microsoft.com/office/drawing/2014/main" xmlns:p14="http://schemas.microsoft.com/office/powerpoint/2010/main" xmlns:a14="http://schemas.microsoft.com/office/drawing/2010/main" w="9525">
                   <a:solidFill>
                     <a:srgbClr val="000000"/>
                   </a:solidFill>
@@ -37142,7 +37142,7 @@
             </a:ln>
             <a:extLst>
               <a:ext uri="{91240B29-F687-4f45-9708-019B960494DF}">
-                <a14:hiddenLine xmlns:a14="http://schemas.microsoft.com/office/drawing/2010/main" xmlns:p14="http://schemas.microsoft.com/office/powerpoint/2010/main" xmlns:a16="http://schemas.microsoft.com/office/drawing/2014/main" xmlns="" w="9525">
+                <a14:hiddenLine xmlns="" xmlns:a16="http://schemas.microsoft.com/office/drawing/2014/main" xmlns:p14="http://schemas.microsoft.com/office/powerpoint/2010/main" xmlns:a14="http://schemas.microsoft.com/office/drawing/2010/main" w="9525">
                   <a:solidFill>
                     <a:srgbClr val="000000"/>
                   </a:solidFill>
@@ -37277,7 +37277,7 @@
             </a:ln>
             <a:extLst>
               <a:ext uri="{91240B29-F687-4f45-9708-019B960494DF}">
-                <a14:hiddenLine xmlns:a14="http://schemas.microsoft.com/office/drawing/2010/main" xmlns:p14="http://schemas.microsoft.com/office/powerpoint/2010/main" xmlns:a16="http://schemas.microsoft.com/office/drawing/2014/main" xmlns="" w="9525">
+                <a14:hiddenLine xmlns="" xmlns:a16="http://schemas.microsoft.com/office/drawing/2014/main" xmlns:p14="http://schemas.microsoft.com/office/powerpoint/2010/main" xmlns:a14="http://schemas.microsoft.com/office/drawing/2010/main" w="9525">
                   <a:solidFill>
                     <a:srgbClr val="000000"/>
                   </a:solidFill>
@@ -37543,7 +37543,7 @@
             </a:ln>
             <a:extLst>
               <a:ext uri="{91240B29-F687-4f45-9708-019B960494DF}">
-                <a14:hiddenLine xmlns:a14="http://schemas.microsoft.com/office/drawing/2010/main" xmlns:p14="http://schemas.microsoft.com/office/powerpoint/2010/main" xmlns:a16="http://schemas.microsoft.com/office/drawing/2014/main" xmlns="" w="9525">
+                <a14:hiddenLine xmlns="" xmlns:a16="http://schemas.microsoft.com/office/drawing/2014/main" xmlns:p14="http://schemas.microsoft.com/office/powerpoint/2010/main" xmlns:a14="http://schemas.microsoft.com/office/drawing/2010/main" w="9525">
                   <a:solidFill>
                     <a:srgbClr val="000000"/>
                   </a:solidFill>
@@ -37673,7 +37673,7 @@
             </a:ln>
             <a:extLst>
               <a:ext uri="{91240B29-F687-4f45-9708-019B960494DF}">
-                <a14:hiddenLine xmlns:a14="http://schemas.microsoft.com/office/drawing/2010/main" xmlns:p14="http://schemas.microsoft.com/office/powerpoint/2010/main" xmlns:a16="http://schemas.microsoft.com/office/drawing/2014/main" xmlns="" w="9525">
+                <a14:hiddenLine xmlns="" xmlns:a16="http://schemas.microsoft.com/office/drawing/2014/main" xmlns:p14="http://schemas.microsoft.com/office/powerpoint/2010/main" xmlns:a14="http://schemas.microsoft.com/office/drawing/2010/main" w="9525">
                   <a:solidFill>
                     <a:srgbClr val="000000"/>
                   </a:solidFill>
@@ -37778,7 +37778,7 @@
             </a:ln>
             <a:extLst>
               <a:ext uri="{91240B29-F687-4f45-9708-019B960494DF}">
-                <a14:hiddenLine xmlns:a14="http://schemas.microsoft.com/office/drawing/2010/main" xmlns:p14="http://schemas.microsoft.com/office/powerpoint/2010/main" xmlns:a16="http://schemas.microsoft.com/office/drawing/2014/main" xmlns="" w="9525">
+                <a14:hiddenLine xmlns="" xmlns:a16="http://schemas.microsoft.com/office/drawing/2014/main" xmlns:p14="http://schemas.microsoft.com/office/powerpoint/2010/main" xmlns:a14="http://schemas.microsoft.com/office/drawing/2010/main" w="9525">
                   <a:solidFill>
                     <a:srgbClr val="000000"/>
                   </a:solidFill>
@@ -37858,7 +37858,7 @@
             </a:ln>
             <a:extLst>
               <a:ext uri="{91240B29-F687-4f45-9708-019B960494DF}">
-                <a14:hiddenLine xmlns:a14="http://schemas.microsoft.com/office/drawing/2010/main" xmlns:p14="http://schemas.microsoft.com/office/powerpoint/2010/main" xmlns:a16="http://schemas.microsoft.com/office/drawing/2014/main" xmlns="" w="9525">
+                <a14:hiddenLine xmlns="" xmlns:a16="http://schemas.microsoft.com/office/drawing/2014/main" xmlns:p14="http://schemas.microsoft.com/office/powerpoint/2010/main" xmlns:a14="http://schemas.microsoft.com/office/drawing/2010/main" w="9525">
                   <a:solidFill>
                     <a:srgbClr val="000000"/>
                   </a:solidFill>
@@ -37963,7 +37963,7 @@
             </a:ln>
             <a:extLst>
               <a:ext uri="{91240B29-F687-4f45-9708-019B960494DF}">
-                <a14:hiddenLine xmlns:a14="http://schemas.microsoft.com/office/drawing/2010/main" xmlns:p14="http://schemas.microsoft.com/office/powerpoint/2010/main" xmlns:a16="http://schemas.microsoft.com/office/drawing/2014/main" xmlns="" w="9525">
+                <a14:hiddenLine xmlns="" xmlns:a16="http://schemas.microsoft.com/office/drawing/2014/main" xmlns:p14="http://schemas.microsoft.com/office/powerpoint/2010/main" xmlns:a14="http://schemas.microsoft.com/office/drawing/2010/main" w="9525">
                   <a:solidFill>
                     <a:srgbClr val="000000"/>
                   </a:solidFill>
@@ -38046,7 +38046,7 @@
             </a:ln>
             <a:extLst>
               <a:ext uri="{91240B29-F687-4f45-9708-019B960494DF}">
-                <a14:hiddenLine xmlns:a14="http://schemas.microsoft.com/office/drawing/2010/main" xmlns:p14="http://schemas.microsoft.com/office/powerpoint/2010/main" xmlns:a16="http://schemas.microsoft.com/office/drawing/2014/main" xmlns="" w="9525">
+                <a14:hiddenLine xmlns="" xmlns:a16="http://schemas.microsoft.com/office/drawing/2014/main" xmlns:p14="http://schemas.microsoft.com/office/powerpoint/2010/main" xmlns:a14="http://schemas.microsoft.com/office/drawing/2010/main" w="9525">
                   <a:solidFill>
                     <a:srgbClr val="000000"/>
                   </a:solidFill>
@@ -38151,7 +38151,7 @@
             </a:ln>
             <a:extLst>
               <a:ext uri="{91240B29-F687-4f45-9708-019B960494DF}">
-                <a14:hiddenLine xmlns:a14="http://schemas.microsoft.com/office/drawing/2010/main" xmlns:p14="http://schemas.microsoft.com/office/powerpoint/2010/main" xmlns:a16="http://schemas.microsoft.com/office/drawing/2014/main" xmlns="" w="9525">
+                <a14:hiddenLine xmlns="" xmlns:a16="http://schemas.microsoft.com/office/drawing/2014/main" xmlns:p14="http://schemas.microsoft.com/office/powerpoint/2010/main" xmlns:a14="http://schemas.microsoft.com/office/drawing/2010/main" w="9525">
                   <a:solidFill>
                     <a:srgbClr val="000000"/>
                   </a:solidFill>
@@ -38234,7 +38234,7 @@
             </a:ln>
             <a:extLst>
               <a:ext uri="{91240B29-F687-4f45-9708-019B960494DF}">
-                <a14:hiddenLine xmlns:a14="http://schemas.microsoft.com/office/drawing/2010/main" xmlns:p14="http://schemas.microsoft.com/office/powerpoint/2010/main" xmlns:a16="http://schemas.microsoft.com/office/drawing/2014/main" xmlns="" w="9525">
+                <a14:hiddenLine xmlns="" xmlns:a16="http://schemas.microsoft.com/office/drawing/2014/main" xmlns:p14="http://schemas.microsoft.com/office/powerpoint/2010/main" xmlns:a14="http://schemas.microsoft.com/office/drawing/2010/main" w="9525">
                   <a:solidFill>
                     <a:srgbClr val="000000"/>
                   </a:solidFill>
@@ -38339,7 +38339,7 @@
             </a:ln>
             <a:extLst>
               <a:ext uri="{91240B29-F687-4f45-9708-019B960494DF}">
-                <a14:hiddenLine xmlns:a14="http://schemas.microsoft.com/office/drawing/2010/main" xmlns:p14="http://schemas.microsoft.com/office/powerpoint/2010/main" xmlns:a16="http://schemas.microsoft.com/office/drawing/2014/main" xmlns="" w="9525">
+                <a14:hiddenLine xmlns="" xmlns:a16="http://schemas.microsoft.com/office/drawing/2014/main" xmlns:p14="http://schemas.microsoft.com/office/powerpoint/2010/main" xmlns:a14="http://schemas.microsoft.com/office/drawing/2010/main" w="9525">
                   <a:solidFill>
                     <a:srgbClr val="000000"/>
                   </a:solidFill>
@@ -38388,7 +38388,7 @@
             </a:ln>
             <a:extLst>
               <a:ext uri="{91240B29-F687-4f45-9708-019B960494DF}">
-                <a14:hiddenLine xmlns:a14="http://schemas.microsoft.com/office/drawing/2010/main" xmlns:p14="http://schemas.microsoft.com/office/powerpoint/2010/main" xmlns:a16="http://schemas.microsoft.com/office/drawing/2014/main" xmlns="" w="9525">
+                <a14:hiddenLine xmlns="" xmlns:a16="http://schemas.microsoft.com/office/drawing/2014/main" xmlns:p14="http://schemas.microsoft.com/office/powerpoint/2010/main" xmlns:a14="http://schemas.microsoft.com/office/drawing/2010/main" w="9525">
                   <a:solidFill>
                     <a:srgbClr val="000000"/>
                   </a:solidFill>

</xml_diff>